<commit_message>
update architecture slides with api connect
</commit_message>
<xml_diff>
--- a/images/architecture.pptx
+++ b/images/architecture.pptx
@@ -5,7 +5,7 @@
     <p:sldMasterId id="2147483648" r:id="rId1"/>
   </p:sldMasterIdLst>
   <p:notesMasterIdLst>
-    <p:notesMasterId r:id="rId18"/>
+    <p:notesMasterId r:id="rId20"/>
   </p:notesMasterIdLst>
   <p:sldIdLst>
     <p:sldId id="325" r:id="rId2"/>
@@ -24,6 +24,8 @@
     <p:sldId id="343" r:id="rId15"/>
     <p:sldId id="342" r:id="rId16"/>
     <p:sldId id="346" r:id="rId17"/>
+    <p:sldId id="349" r:id="rId18"/>
+    <p:sldId id="350" r:id="rId19"/>
   </p:sldIdLst>
   <p:sldSz cx="10058400" cy="7772400"/>
   <p:notesSz cx="6858000" cy="9144000"/>
@@ -103,7 +105,7 @@
   </p:defaultTextStyle>
   <p:extLst>
     <p:ext uri="{EFAFB233-063F-42B5-8137-9DF3F51BA10A}">
-      <p15:sldGuideLst xmlns:p15="http://schemas.microsoft.com/office/powerpoint/2012/main" xmlns="">
+      <p15:sldGuideLst xmlns:p15="http://schemas.microsoft.com/office/powerpoint/2012/main">
         <p15:guide id="1" orient="horz" pos="2112" userDrawn="1">
           <p15:clr>
             <a:srgbClr val="A4A3A4"/>
@@ -525,7 +527,7 @@
   <p:clrMapOvr>
     <a:masterClrMapping/>
   </p:clrMapOvr>
-  <p:transition xmlns:p14="http://schemas.microsoft.com/office/powerpoint/2010/main" spd="med"/>
+  <p:transition spd="med"/>
 </p:sldLayout>
 </file>
 
@@ -565,7 +567,7 @@
           </a:ln>
           <a:extLst>
             <a:ext uri="{C572A759-6A51-4108-AA02-DFA0A04FC94B}">
-              <ma14:wrappingTextBoxFlag xmlns:ma14="http://schemas.microsoft.com/office/mac/drawingml/2011/main" val="1"/>
+              <ma14:wrappingTextBoxFlag xmlns:ma14="http://schemas.microsoft.com/office/mac/drawingml/2011/main" xmlns="" val="1"/>
             </a:ext>
           </a:extLst>
         </p:spPr>
@@ -618,7 +620,7 @@
           </a:ln>
           <a:extLst>
             <a:ext uri="{C572A759-6A51-4108-AA02-DFA0A04FC94B}">
-              <ma14:wrappingTextBoxFlag xmlns:ma14="http://schemas.microsoft.com/office/mac/drawingml/2011/main" val="1"/>
+              <ma14:wrappingTextBoxFlag xmlns:ma14="http://schemas.microsoft.com/office/mac/drawingml/2011/main" xmlns="" val="1"/>
             </a:ext>
           </a:extLst>
         </p:spPr>
@@ -666,7 +668,7 @@
           </a:ln>
           <a:extLst>
             <a:ext uri="{C572A759-6A51-4108-AA02-DFA0A04FC94B}">
-              <ma14:wrappingTextBoxFlag xmlns:ma14="http://schemas.microsoft.com/office/mac/drawingml/2011/main" val="1"/>
+              <ma14:wrappingTextBoxFlag xmlns:ma14="http://schemas.microsoft.com/office/mac/drawingml/2011/main" xmlns="" val="1"/>
             </a:ext>
           </a:extLst>
         </p:spPr>
@@ -790,7 +792,7 @@
   <p:clrMapOvr>
     <a:masterClrMapping/>
   </p:clrMapOvr>
-  <p:transition xmlns:p14="http://schemas.microsoft.com/office/powerpoint/2010/main" spd="med"/>
+  <p:transition spd="med"/>
 </p:sldLayout>
 </file>
 
@@ -830,7 +832,7 @@
           </a:ln>
           <a:extLst>
             <a:ext uri="{C572A759-6A51-4108-AA02-DFA0A04FC94B}">
-              <ma14:wrappingTextBoxFlag xmlns:ma14="http://schemas.microsoft.com/office/mac/drawingml/2011/main" val="1"/>
+              <ma14:wrappingTextBoxFlag xmlns:ma14="http://schemas.microsoft.com/office/mac/drawingml/2011/main" xmlns="" val="1"/>
             </a:ext>
           </a:extLst>
         </p:spPr>
@@ -883,7 +885,7 @@
           </a:ln>
           <a:extLst>
             <a:ext uri="{C572A759-6A51-4108-AA02-DFA0A04FC94B}">
-              <ma14:wrappingTextBoxFlag xmlns:ma14="http://schemas.microsoft.com/office/mac/drawingml/2011/main" val="1"/>
+              <ma14:wrappingTextBoxFlag xmlns:ma14="http://schemas.microsoft.com/office/mac/drawingml/2011/main" xmlns="" val="1"/>
             </a:ext>
           </a:extLst>
         </p:spPr>
@@ -931,7 +933,7 @@
           </a:ln>
           <a:extLst>
             <a:ext uri="{C572A759-6A51-4108-AA02-DFA0A04FC94B}">
-              <ma14:wrappingTextBoxFlag xmlns:ma14="http://schemas.microsoft.com/office/mac/drawingml/2011/main" val="1"/>
+              <ma14:wrappingTextBoxFlag xmlns:ma14="http://schemas.microsoft.com/office/mac/drawingml/2011/main" xmlns="" val="1"/>
             </a:ext>
           </a:extLst>
         </p:spPr>
@@ -1055,7 +1057,7 @@
   <p:clrMapOvr>
     <a:masterClrMapping/>
   </p:clrMapOvr>
-  <p:transition xmlns:p14="http://schemas.microsoft.com/office/powerpoint/2010/main" spd="med"/>
+  <p:transition spd="med"/>
 </p:sldLayout>
 </file>
 
@@ -1081,7 +1083,7 @@
   <p:clrMapOvr>
     <a:masterClrMapping/>
   </p:clrMapOvr>
-  <p:transition xmlns:p14="http://schemas.microsoft.com/office/powerpoint/2010/main" spd="med"/>
+  <p:transition spd="med"/>
 </p:sldLayout>
 </file>
 
@@ -1121,7 +1123,7 @@
           </a:ln>
           <a:extLst>
             <a:ext uri="{C572A759-6A51-4108-AA02-DFA0A04FC94B}">
-              <ma14:wrappingTextBoxFlag xmlns:ma14="http://schemas.microsoft.com/office/mac/drawingml/2011/main" val="1"/>
+              <ma14:wrappingTextBoxFlag xmlns:ma14="http://schemas.microsoft.com/office/mac/drawingml/2011/main" xmlns="" val="1"/>
             </a:ext>
           </a:extLst>
         </p:spPr>
@@ -1259,7 +1261,7 @@
           </a:ln>
           <a:extLst>
             <a:ext uri="{C572A759-6A51-4108-AA02-DFA0A04FC94B}">
-              <ma14:wrappingTextBoxFlag xmlns:ma14="http://schemas.microsoft.com/office/mac/drawingml/2011/main" val="1"/>
+              <ma14:wrappingTextBoxFlag xmlns:ma14="http://schemas.microsoft.com/office/mac/drawingml/2011/main" xmlns="" val="1"/>
             </a:ext>
           </a:extLst>
         </p:spPr>
@@ -1312,7 +1314,7 @@
           </a:ln>
           <a:extLst>
             <a:ext uri="{C572A759-6A51-4108-AA02-DFA0A04FC94B}">
-              <ma14:wrappingTextBoxFlag xmlns:ma14="http://schemas.microsoft.com/office/mac/drawingml/2011/main" val="1"/>
+              <ma14:wrappingTextBoxFlag xmlns:ma14="http://schemas.microsoft.com/office/mac/drawingml/2011/main" xmlns="" val="1"/>
             </a:ext>
           </a:extLst>
         </p:spPr>
@@ -1346,7 +1348,7 @@
   <p:clrMapOvr>
     <a:masterClrMapping/>
   </p:clrMapOvr>
-  <p:transition xmlns:p14="http://schemas.microsoft.com/office/powerpoint/2010/main" spd="med"/>
+  <p:transition spd="med"/>
 </p:sldLayout>
 </file>
 
@@ -1372,7 +1374,7 @@
   <p:clrMapOvr>
     <a:masterClrMapping/>
   </p:clrMapOvr>
-  <p:transition xmlns:p14="http://schemas.microsoft.com/office/powerpoint/2010/main" spd="med"/>
+  <p:transition spd="med"/>
 </p:sldLayout>
 </file>
 
@@ -1541,7 +1543,7 @@
   <p:clrMapOvr>
     <a:masterClrMapping/>
   </p:clrMapOvr>
-  <p:transition xmlns:p14="http://schemas.microsoft.com/office/powerpoint/2010/main" spd="med"/>
+  <p:transition spd="med"/>
 </p:sldLayout>
 </file>
 
@@ -1600,7 +1602,7 @@
   <p:clrMapOvr>
     <a:masterClrMapping/>
   </p:clrMapOvr>
-  <p:transition xmlns:p14="http://schemas.microsoft.com/office/powerpoint/2010/main" spd="med"/>
+  <p:transition spd="med"/>
 </p:sldLayout>
 </file>
 
@@ -1773,7 +1775,7 @@
   <p:clrMapOvr>
     <a:masterClrMapping/>
   </p:clrMapOvr>
-  <p:transition xmlns:p14="http://schemas.microsoft.com/office/powerpoint/2010/main" spd="med"/>
+  <p:transition spd="med"/>
 </p:sldLayout>
 </file>
 
@@ -1828,7 +1830,7 @@
   <p:clrMapOvr>
     <a:masterClrMapping/>
   </p:clrMapOvr>
-  <p:transition xmlns:p14="http://schemas.microsoft.com/office/powerpoint/2010/main" spd="med"/>
+  <p:transition spd="med"/>
 </p:sldLayout>
 </file>
 
@@ -1948,7 +1950,7 @@
   <p:clrMapOvr>
     <a:masterClrMapping/>
   </p:clrMapOvr>
-  <p:transition xmlns:p14="http://schemas.microsoft.com/office/powerpoint/2010/main" spd="med"/>
+  <p:transition spd="med"/>
 </p:sldLayout>
 </file>
 
@@ -2103,7 +2105,7 @@
   <p:clrMapOvr>
     <a:masterClrMapping/>
   </p:clrMapOvr>
-  <p:transition xmlns:p14="http://schemas.microsoft.com/office/powerpoint/2010/main" spd="med"/>
+  <p:transition spd="med"/>
 </p:sldLayout>
 </file>
 
@@ -2129,7 +2131,7 @@
   <p:clrMapOvr>
     <a:masterClrMapping/>
   </p:clrMapOvr>
-  <p:transition xmlns:p14="http://schemas.microsoft.com/office/powerpoint/2010/main" spd="med"/>
+  <p:transition spd="med"/>
 </p:sldLayout>
 </file>
 
@@ -2245,7 +2247,7 @@
           </a:ln>
           <a:extLst>
             <a:ext uri="{C572A759-6A51-4108-AA02-DFA0A04FC94B}">
-              <ma14:wrappingTextBoxFlag xmlns:ma14="http://schemas.microsoft.com/office/mac/drawingml/2011/main" val="1"/>
+              <ma14:wrappingTextBoxFlag xmlns:ma14="http://schemas.microsoft.com/office/mac/drawingml/2011/main" xmlns="" val="1"/>
             </a:ext>
           </a:extLst>
         </p:spPr>
@@ -2298,7 +2300,7 @@
           </a:ln>
           <a:extLst>
             <a:ext uri="{C572A759-6A51-4108-AA02-DFA0A04FC94B}">
-              <ma14:wrappingTextBoxFlag xmlns:ma14="http://schemas.microsoft.com/office/mac/drawingml/2011/main" val="1"/>
+              <ma14:wrappingTextBoxFlag xmlns:ma14="http://schemas.microsoft.com/office/mac/drawingml/2011/main" xmlns="" val="1"/>
             </a:ext>
           </a:extLst>
         </p:spPr>
@@ -2346,7 +2348,7 @@
           </a:ln>
           <a:extLst>
             <a:ext uri="{C572A759-6A51-4108-AA02-DFA0A04FC94B}">
-              <ma14:wrappingTextBoxFlag xmlns:ma14="http://schemas.microsoft.com/office/mac/drawingml/2011/main" val="1"/>
+              <ma14:wrappingTextBoxFlag xmlns:ma14="http://schemas.microsoft.com/office/mac/drawingml/2011/main" xmlns="" val="1"/>
             </a:ext>
           </a:extLst>
         </p:spPr>
@@ -2394,7 +2396,7 @@
   <p:clrMapOvr>
     <a:masterClrMapping/>
   </p:clrMapOvr>
-  <p:transition xmlns:p14="http://schemas.microsoft.com/office/powerpoint/2010/main" spd="med"/>
+  <p:transition spd="med"/>
 </p:sldLayout>
 </file>
 
@@ -2446,7 +2448,7 @@
           </a:ln>
           <a:extLst>
             <a:ext uri="{C572A759-6A51-4108-AA02-DFA0A04FC94B}">
-              <ma14:wrappingTextBoxFlag xmlns:ma14="http://schemas.microsoft.com/office/mac/drawingml/2011/main" val="1"/>
+              <ma14:wrappingTextBoxFlag xmlns:ma14="http://schemas.microsoft.com/office/mac/drawingml/2011/main" xmlns="" val="1"/>
             </a:ext>
           </a:extLst>
         </p:spPr>
@@ -2489,7 +2491,7 @@
           </a:ln>
           <a:extLst>
             <a:ext uri="{C572A759-6A51-4108-AA02-DFA0A04FC94B}">
-              <ma14:wrappingTextBoxFlag xmlns:ma14="http://schemas.microsoft.com/office/mac/drawingml/2011/main" val="1"/>
+              <ma14:wrappingTextBoxFlag xmlns:ma14="http://schemas.microsoft.com/office/mac/drawingml/2011/main" xmlns="" val="1"/>
             </a:ext>
           </a:extLst>
         </p:spPr>
@@ -2564,7 +2566,7 @@
     <p:sldLayoutId id="2147483662" r:id="rId13"/>
     <p:sldLayoutId id="2147483663" r:id="rId14"/>
   </p:sldLayoutIdLst>
-  <p:transition xmlns:p14="http://schemas.microsoft.com/office/powerpoint/2010/main" spd="med"/>
+  <p:transition spd="med"/>
   <p:txStyles>
     <p:titleStyle>
       <a:lvl1pPr algn="ctr" defTabSz="584200">
@@ -2900,7 +2902,7 @@
           </a:ln>
           <a:extLst>
             <a:ext uri="{C572A759-6A51-4108-AA02-DFA0A04FC94B}">
-              <ma14:wrappingTextBoxFlag xmlns:ma14="http://schemas.microsoft.com/office/mac/drawingml/2011/main" val="1"/>
+              <ma14:wrappingTextBoxFlag xmlns:ma14="http://schemas.microsoft.com/office/mac/drawingml/2011/main" xmlns="" val="1"/>
             </a:ext>
           </a:extLst>
         </p:spPr>
@@ -2968,7 +2970,7 @@
           </a:ln>
           <a:extLst>
             <a:ext uri="{C572A759-6A51-4108-AA02-DFA0A04FC94B}">
-              <ma14:wrappingTextBoxFlag xmlns:ma14="http://schemas.microsoft.com/office/mac/drawingml/2011/main" val="1"/>
+              <ma14:wrappingTextBoxFlag xmlns:ma14="http://schemas.microsoft.com/office/mac/drawingml/2011/main" xmlns="" val="1"/>
             </a:ext>
           </a:extLst>
         </p:spPr>
@@ -3634,7 +3636,7 @@
           </a:ln>
           <a:extLst>
             <a:ext uri="{C572A759-6A51-4108-AA02-DFA0A04FC94B}">
-              <ma14:wrappingTextBoxFlag xmlns:ma14="http://schemas.microsoft.com/office/mac/drawingml/2011/main" val="1"/>
+              <ma14:wrappingTextBoxFlag xmlns:ma14="http://schemas.microsoft.com/office/mac/drawingml/2011/main" xmlns="" val="1"/>
             </a:ext>
           </a:extLst>
         </p:spPr>
@@ -4120,7 +4122,7 @@
           </a:ln>
           <a:extLst>
             <a:ext uri="{C572A759-6A51-4108-AA02-DFA0A04FC94B}">
-              <ma14:wrappingTextBoxFlag xmlns:ma14="http://schemas.microsoft.com/office/mac/drawingml/2011/main" val="1"/>
+              <ma14:wrappingTextBoxFlag xmlns:ma14="http://schemas.microsoft.com/office/mac/drawingml/2011/main" xmlns="" val="1"/>
             </a:ext>
           </a:extLst>
         </p:spPr>
@@ -4789,7 +4791,7 @@
               <a:tabLst/>
             </a:pPr>
             <a:r>
-              <a:rPr lang="en-US" sz="1200" dirty="0" smtClean="0">
+              <a:rPr lang="en-US" sz="1200" dirty="0">
                 <a:solidFill>
                   <a:srgbClr val="000000"/>
                 </a:solidFill>
@@ -4834,7 +4836,7 @@
           </a:ln>
           <a:extLst>
             <a:ext uri="{C572A759-6A51-4108-AA02-DFA0A04FC94B}">
-              <ma14:wrappingTextBoxFlag xmlns:ma14="http://schemas.microsoft.com/office/mac/drawingml/2011/main" val="1"/>
+              <ma14:wrappingTextBoxFlag xmlns:ma14="http://schemas.microsoft.com/office/mac/drawingml/2011/main" xmlns="" val="1"/>
             </a:ext>
           </a:extLst>
         </p:spPr>
@@ -5118,7 +5120,7 @@
           </a:ln>
           <a:extLst>
             <a:ext uri="{C572A759-6A51-4108-AA02-DFA0A04FC94B}">
-              <ma14:wrappingTextBoxFlag xmlns:ma14="http://schemas.microsoft.com/office/mac/drawingml/2011/main" val="1"/>
+              <ma14:wrappingTextBoxFlag xmlns:ma14="http://schemas.microsoft.com/office/mac/drawingml/2011/main" xmlns="" val="1"/>
             </a:ext>
           </a:extLst>
         </p:spPr>
@@ -5260,7 +5262,7 @@
           </a:ln>
           <a:extLst>
             <a:ext uri="{C572A759-6A51-4108-AA02-DFA0A04FC94B}">
-              <ma14:wrappingTextBoxFlag xmlns:ma14="http://schemas.microsoft.com/office/mac/drawingml/2011/main" val="1"/>
+              <ma14:wrappingTextBoxFlag xmlns:ma14="http://schemas.microsoft.com/office/mac/drawingml/2011/main" xmlns="" val="1"/>
             </a:ext>
           </a:extLst>
         </p:spPr>
@@ -5436,7 +5438,7 @@
           </a:ln>
           <a:extLst>
             <a:ext uri="{C572A759-6A51-4108-AA02-DFA0A04FC94B}">
-              <ma14:wrappingTextBoxFlag xmlns:ma14="http://schemas.microsoft.com/office/mac/drawingml/2011/main" val="1"/>
+              <ma14:wrappingTextBoxFlag xmlns:ma14="http://schemas.microsoft.com/office/mac/drawingml/2011/main" xmlns="" val="1"/>
             </a:ext>
           </a:extLst>
         </p:spPr>
@@ -5539,7 +5541,7 @@
           </a:ln>
           <a:extLst>
             <a:ext uri="{C572A759-6A51-4108-AA02-DFA0A04FC94B}">
-              <ma14:wrappingTextBoxFlag xmlns:ma14="http://schemas.microsoft.com/office/mac/drawingml/2011/main" val="1"/>
+              <ma14:wrappingTextBoxFlag xmlns:ma14="http://schemas.microsoft.com/office/mac/drawingml/2011/main" xmlns="" val="1"/>
             </a:ext>
           </a:extLst>
         </p:spPr>
@@ -6246,7 +6248,7 @@
   <p:clrMapOvr>
     <a:masterClrMapping/>
   </p:clrMapOvr>
-  <p:transition xmlns:p14="http://schemas.microsoft.com/office/powerpoint/2010/main" spd="med"/>
+  <p:transition spd="med"/>
 </p:sld>
 </file>
 
@@ -6272,7 +6274,7 @@
           <p:cNvPr id="108" name="Rectangle 107">
             <a:extLst>
               <a:ext uri="{FF2B5EF4-FFF2-40B4-BE49-F238E27FC236}">
-                <a16:creationId xmlns:a16="http://schemas.microsoft.com/office/drawing/2014/main" xmlns="" id="{DD3A4E38-E7B5-F444-A041-B81D31F9BE1A}"/>
+                <a16:creationId xmlns:a16="http://schemas.microsoft.com/office/drawing/2014/main" id="{DD3A4E38-E7B5-F444-A041-B81D31F9BE1A}"/>
               </a:ext>
             </a:extLst>
           </p:cNvPr>
@@ -6317,7 +6319,7 @@
           <p:cNvPr id="141" name="Rectangle 140">
             <a:extLst>
               <a:ext uri="{FF2B5EF4-FFF2-40B4-BE49-F238E27FC236}">
-                <a16:creationId xmlns:a16="http://schemas.microsoft.com/office/drawing/2014/main" xmlns="" id="{3C097F3C-09AD-4C48-89F5-8F6682E2A9C7}"/>
+                <a16:creationId xmlns:a16="http://schemas.microsoft.com/office/drawing/2014/main" id="{3C097F3C-09AD-4C48-89F5-8F6682E2A9C7}"/>
               </a:ext>
             </a:extLst>
           </p:cNvPr>
@@ -6360,7 +6362,7 @@
           <p:cNvPr id="132" name="Rectangle 131">
             <a:extLst>
               <a:ext uri="{FF2B5EF4-FFF2-40B4-BE49-F238E27FC236}">
-                <a16:creationId xmlns:a16="http://schemas.microsoft.com/office/drawing/2014/main" xmlns="" id="{A4F70669-E49F-6042-AC95-A1CF22FC2F0E}"/>
+                <a16:creationId xmlns:a16="http://schemas.microsoft.com/office/drawing/2014/main" id="{A4F70669-E49F-6042-AC95-A1CF22FC2F0E}"/>
               </a:ext>
             </a:extLst>
           </p:cNvPr>
@@ -6403,7 +6405,7 @@
           <p:cNvPr id="46" name="Straight Connector 45">
             <a:extLst>
               <a:ext uri="{FF2B5EF4-FFF2-40B4-BE49-F238E27FC236}">
-                <a16:creationId xmlns:a16="http://schemas.microsoft.com/office/drawing/2014/main" xmlns="" id="{B3EF6D8D-E093-9C43-8F06-6465AF5A1A76}"/>
+                <a16:creationId xmlns:a16="http://schemas.microsoft.com/office/drawing/2014/main" id="{B3EF6D8D-E093-9C43-8F06-6465AF5A1A76}"/>
               </a:ext>
             </a:extLst>
           </p:cNvPr>
@@ -6452,7 +6454,7 @@
           <p:cNvPr id="105" name="Rectangle 104">
             <a:extLst>
               <a:ext uri="{FF2B5EF4-FFF2-40B4-BE49-F238E27FC236}">
-                <a16:creationId xmlns:a16="http://schemas.microsoft.com/office/drawing/2014/main" xmlns="" id="{416C123A-D118-B348-B68E-4541B0A407FB}"/>
+                <a16:creationId xmlns:a16="http://schemas.microsoft.com/office/drawing/2014/main" id="{416C123A-D118-B348-B68E-4541B0A407FB}"/>
               </a:ext>
             </a:extLst>
           </p:cNvPr>
@@ -6499,7 +6501,7 @@
           <p:cNvPr id="115" name="Straight Connector 114">
             <a:extLst>
               <a:ext uri="{FF2B5EF4-FFF2-40B4-BE49-F238E27FC236}">
-                <a16:creationId xmlns:a16="http://schemas.microsoft.com/office/drawing/2014/main" xmlns="" id="{8AC6BC2D-6C06-F541-9BC0-006845DF1EA7}"/>
+                <a16:creationId xmlns:a16="http://schemas.microsoft.com/office/drawing/2014/main" id="{8AC6BC2D-6C06-F541-9BC0-006845DF1EA7}"/>
               </a:ext>
             </a:extLst>
           </p:cNvPr>
@@ -6548,7 +6550,7 @@
           <p:cNvPr id="103" name="Rectangle 102">
             <a:extLst>
               <a:ext uri="{FF2B5EF4-FFF2-40B4-BE49-F238E27FC236}">
-                <a16:creationId xmlns:a16="http://schemas.microsoft.com/office/drawing/2014/main" xmlns="" id="{89D06888-A322-F944-B8CD-1354DB6E9863}"/>
+                <a16:creationId xmlns:a16="http://schemas.microsoft.com/office/drawing/2014/main" id="{89D06888-A322-F944-B8CD-1354DB6E9863}"/>
               </a:ext>
             </a:extLst>
           </p:cNvPr>
@@ -6591,7 +6593,7 @@
           <p:cNvPr id="97" name="Rectangle 96">
             <a:extLst>
               <a:ext uri="{FF2B5EF4-FFF2-40B4-BE49-F238E27FC236}">
-                <a16:creationId xmlns:a16="http://schemas.microsoft.com/office/drawing/2014/main" xmlns="" id="{C6F860F7-F7BF-E549-968B-81EB1B326379}"/>
+                <a16:creationId xmlns:a16="http://schemas.microsoft.com/office/drawing/2014/main" id="{C6F860F7-F7BF-E549-968B-81EB1B326379}"/>
               </a:ext>
             </a:extLst>
           </p:cNvPr>
@@ -6636,7 +6638,7 @@
           <p:cNvPr id="88" name="Rectangle 87">
             <a:extLst>
               <a:ext uri="{FF2B5EF4-FFF2-40B4-BE49-F238E27FC236}">
-                <a16:creationId xmlns:a16="http://schemas.microsoft.com/office/drawing/2014/main" xmlns="" id="{52568BAA-8263-FC4A-AB69-A9AE503EA338}"/>
+                <a16:creationId xmlns:a16="http://schemas.microsoft.com/office/drawing/2014/main" id="{52568BAA-8263-FC4A-AB69-A9AE503EA338}"/>
               </a:ext>
             </a:extLst>
           </p:cNvPr>
@@ -6705,7 +6707,7 @@
           <p:cNvPr id="47" name="Rectangle 46">
             <a:extLst>
               <a:ext uri="{FF2B5EF4-FFF2-40B4-BE49-F238E27FC236}">
-                <a16:creationId xmlns:a16="http://schemas.microsoft.com/office/drawing/2014/main" xmlns="" id="{962939E0-A05A-3A44-9ADE-6B594560263B}"/>
+                <a16:creationId xmlns:a16="http://schemas.microsoft.com/office/drawing/2014/main" id="{962939E0-A05A-3A44-9ADE-6B594560263B}"/>
               </a:ext>
             </a:extLst>
           </p:cNvPr>
@@ -6860,7 +6862,7 @@
             </a:ln>
             <a:extLst>
               <a:ext uri="{C572A759-6A51-4108-AA02-DFA0A04FC94B}">
-                <ma14:wrappingTextBoxFlag xmlns:ma14="http://schemas.microsoft.com/office/mac/drawingml/2011/main" val="1"/>
+                <ma14:wrappingTextBoxFlag xmlns:ma14="http://schemas.microsoft.com/office/mac/drawingml/2011/main" xmlns="" val="1"/>
               </a:ext>
             </a:extLst>
           </p:spPr>
@@ -7099,7 +7101,7 @@
           </a:ln>
           <a:extLst>
             <a:ext uri="{C572A759-6A51-4108-AA02-DFA0A04FC94B}">
-              <ma14:wrappingTextBoxFlag xmlns:ma14="http://schemas.microsoft.com/office/mac/drawingml/2011/main" val="1"/>
+              <ma14:wrappingTextBoxFlag xmlns:ma14="http://schemas.microsoft.com/office/mac/drawingml/2011/main" xmlns="" val="1"/>
             </a:ext>
           </a:extLst>
         </p:spPr>
@@ -7167,7 +7169,7 @@
           </a:ln>
           <a:extLst>
             <a:ext uri="{C572A759-6A51-4108-AA02-DFA0A04FC94B}">
-              <ma14:wrappingTextBoxFlag xmlns:ma14="http://schemas.microsoft.com/office/mac/drawingml/2011/main" val="1"/>
+              <ma14:wrappingTextBoxFlag xmlns:ma14="http://schemas.microsoft.com/office/mac/drawingml/2011/main" xmlns="" val="1"/>
             </a:ext>
           </a:extLst>
         </p:spPr>
@@ -7538,7 +7540,7 @@
             <a:effectLst/>
             <a:extLst>
               <a:ext uri="{C572A759-6A51-4108-AA02-DFA0A04FC94B}">
-                <ma14:wrappingTextBoxFlag xmlns:ma14="http://schemas.microsoft.com/office/mac/drawingml/2011/main" val="1"/>
+                <ma14:wrappingTextBoxFlag xmlns:ma14="http://schemas.microsoft.com/office/mac/drawingml/2011/main" xmlns="" val="1"/>
               </a:ext>
             </a:extLst>
           </p:spPr>
@@ -7629,7 +7631,7 @@
           <p:cNvPr id="188" name="Group 187">
             <a:extLst>
               <a:ext uri="{FF2B5EF4-FFF2-40B4-BE49-F238E27FC236}">
-                <a16:creationId xmlns:a16="http://schemas.microsoft.com/office/drawing/2014/main" xmlns="" id="{5938EDDB-B2B2-6642-9D20-6D7C5F9FED31}"/>
+                <a16:creationId xmlns:a16="http://schemas.microsoft.com/office/drawing/2014/main" id="{5938EDDB-B2B2-6642-9D20-6D7C5F9FED31}"/>
               </a:ext>
             </a:extLst>
           </p:cNvPr>
@@ -7649,7 +7651,7 @@
             <p:cNvPr id="189" name="Group 188">
               <a:extLst>
                 <a:ext uri="{FF2B5EF4-FFF2-40B4-BE49-F238E27FC236}">
-                  <a16:creationId xmlns:a16="http://schemas.microsoft.com/office/drawing/2014/main" xmlns="" id="{3527AD53-90A2-7D45-A4B7-509C2FD1C32F}"/>
+                  <a16:creationId xmlns:a16="http://schemas.microsoft.com/office/drawing/2014/main" id="{3527AD53-90A2-7D45-A4B7-509C2FD1C32F}"/>
                 </a:ext>
               </a:extLst>
             </p:cNvPr>
@@ -7669,7 +7671,7 @@
               <p:cNvPr id="191" name="Oval 190">
                 <a:extLst>
                   <a:ext uri="{FF2B5EF4-FFF2-40B4-BE49-F238E27FC236}">
-                    <a16:creationId xmlns:a16="http://schemas.microsoft.com/office/drawing/2014/main" xmlns="" id="{38BE8895-77F2-3F48-BDC0-E7E0559BA7AD}"/>
+                    <a16:creationId xmlns:a16="http://schemas.microsoft.com/office/drawing/2014/main" id="{38BE8895-77F2-3F48-BDC0-E7E0559BA7AD}"/>
                   </a:ext>
                 </a:extLst>
               </p:cNvPr>
@@ -7725,7 +7727,7 @@
               <p:cNvPr id="192" name="Picture 191">
                 <a:extLst>
                   <a:ext uri="{FF2B5EF4-FFF2-40B4-BE49-F238E27FC236}">
-                    <a16:creationId xmlns:a16="http://schemas.microsoft.com/office/drawing/2014/main" xmlns="" id="{1E774A8B-C5DB-534E-8EE3-5D936B2F1BDA}"/>
+                    <a16:creationId xmlns:a16="http://schemas.microsoft.com/office/drawing/2014/main" id="{1E774A8B-C5DB-534E-8EE3-5D936B2F1BDA}"/>
                   </a:ext>
                 </a:extLst>
               </p:cNvPr>
@@ -7762,7 +7764,7 @@
             <p:cNvPr id="190" name="Shape 576">
               <a:extLst>
                 <a:ext uri="{FF2B5EF4-FFF2-40B4-BE49-F238E27FC236}">
-                  <a16:creationId xmlns:a16="http://schemas.microsoft.com/office/drawing/2014/main" xmlns="" id="{8D66F62C-0857-0C4E-B8A3-3F8DBC721692}"/>
+                  <a16:creationId xmlns:a16="http://schemas.microsoft.com/office/drawing/2014/main" id="{8D66F62C-0857-0C4E-B8A3-3F8DBC721692}"/>
                 </a:ext>
               </a:extLst>
             </p:cNvPr>
@@ -7782,7 +7784,7 @@
             </a:ln>
             <a:extLst>
               <a:ext uri="{C572A759-6A51-4108-AA02-DFA0A04FC94B}">
-                <ma14:wrappingTextBoxFlag xmlns:ma14="http://schemas.microsoft.com/office/mac/drawingml/2011/main" val="1"/>
+                <ma14:wrappingTextBoxFlag xmlns:ma14="http://schemas.microsoft.com/office/mac/drawingml/2011/main" xmlns="" val="1"/>
               </a:ext>
             </a:extLst>
           </p:spPr>
@@ -7995,7 +7997,7 @@
           </a:ln>
           <a:extLst>
             <a:ext uri="{C572A759-6A51-4108-AA02-DFA0A04FC94B}">
-              <ma14:wrappingTextBoxFlag xmlns:ma14="http://schemas.microsoft.com/office/mac/drawingml/2011/main" val="1"/>
+              <ma14:wrappingTextBoxFlag xmlns:ma14="http://schemas.microsoft.com/office/mac/drawingml/2011/main" xmlns="" val="1"/>
             </a:ext>
           </a:extLst>
         </p:spPr>
@@ -8284,7 +8286,7 @@
           <p:cNvPr id="58" name="Picture 57">
             <a:extLst>
               <a:ext uri="{FF2B5EF4-FFF2-40B4-BE49-F238E27FC236}">
-                <a16:creationId xmlns:a16="http://schemas.microsoft.com/office/drawing/2014/main" xmlns="" id="{66E030FF-10BA-3E4A-9604-7ADABD19B5C7}"/>
+                <a16:creationId xmlns:a16="http://schemas.microsoft.com/office/drawing/2014/main" id="{66E030FF-10BA-3E4A-9604-7ADABD19B5C7}"/>
               </a:ext>
             </a:extLst>
           </p:cNvPr>
@@ -8314,7 +8316,7 @@
           <p:cNvPr id="64" name="Straight Connector 63">
             <a:extLst>
               <a:ext uri="{FF2B5EF4-FFF2-40B4-BE49-F238E27FC236}">
-                <a16:creationId xmlns:a16="http://schemas.microsoft.com/office/drawing/2014/main" xmlns="" id="{7A922166-BCEA-2342-A0C7-D9B6D48E76B5}"/>
+                <a16:creationId xmlns:a16="http://schemas.microsoft.com/office/drawing/2014/main" id="{7A922166-BCEA-2342-A0C7-D9B6D48E76B5}"/>
               </a:ext>
             </a:extLst>
           </p:cNvPr>
@@ -8363,7 +8365,7 @@
           <p:cNvPr id="83" name="Straight Connector 82">
             <a:extLst>
               <a:ext uri="{FF2B5EF4-FFF2-40B4-BE49-F238E27FC236}">
-                <a16:creationId xmlns:a16="http://schemas.microsoft.com/office/drawing/2014/main" xmlns="" id="{BA3AC09A-2568-7A40-8619-27C921ACE99B}"/>
+                <a16:creationId xmlns:a16="http://schemas.microsoft.com/office/drawing/2014/main" id="{BA3AC09A-2568-7A40-8619-27C921ACE99B}"/>
               </a:ext>
             </a:extLst>
           </p:cNvPr>
@@ -8411,7 +8413,7 @@
           <p:cNvPr id="100" name="TextBox 99">
             <a:extLst>
               <a:ext uri="{FF2B5EF4-FFF2-40B4-BE49-F238E27FC236}">
-                <a16:creationId xmlns:a16="http://schemas.microsoft.com/office/drawing/2014/main" xmlns="" id="{3C80F502-9384-CB47-BE5F-B15677F163F5}"/>
+                <a16:creationId xmlns:a16="http://schemas.microsoft.com/office/drawing/2014/main" id="{3C80F502-9384-CB47-BE5F-B15677F163F5}"/>
               </a:ext>
             </a:extLst>
           </p:cNvPr>
@@ -8492,7 +8494,7 @@
           <p:cNvPr id="102" name="TextBox 101">
             <a:extLst>
               <a:ext uri="{FF2B5EF4-FFF2-40B4-BE49-F238E27FC236}">
-                <a16:creationId xmlns:a16="http://schemas.microsoft.com/office/drawing/2014/main" xmlns="" id="{049DDE7D-2EFF-7541-B9F7-19BEEA5515BE}"/>
+                <a16:creationId xmlns:a16="http://schemas.microsoft.com/office/drawing/2014/main" id="{049DDE7D-2EFF-7541-B9F7-19BEEA5515BE}"/>
               </a:ext>
             </a:extLst>
           </p:cNvPr>
@@ -8573,7 +8575,7 @@
           <p:cNvPr id="107" name="TextBox 106">
             <a:extLst>
               <a:ext uri="{FF2B5EF4-FFF2-40B4-BE49-F238E27FC236}">
-                <a16:creationId xmlns:a16="http://schemas.microsoft.com/office/drawing/2014/main" xmlns="" id="{F073A3D8-220E-7144-A600-F0641A71F37F}"/>
+                <a16:creationId xmlns:a16="http://schemas.microsoft.com/office/drawing/2014/main" id="{F073A3D8-220E-7144-A600-F0641A71F37F}"/>
               </a:ext>
             </a:extLst>
           </p:cNvPr>
@@ -8654,7 +8656,7 @@
           <p:cNvPr id="109" name="TextBox 108">
             <a:extLst>
               <a:ext uri="{FF2B5EF4-FFF2-40B4-BE49-F238E27FC236}">
-                <a16:creationId xmlns:a16="http://schemas.microsoft.com/office/drawing/2014/main" xmlns="" id="{E4BD00C3-AD29-1848-B72C-ABB297C80A44}"/>
+                <a16:creationId xmlns:a16="http://schemas.microsoft.com/office/drawing/2014/main" id="{E4BD00C3-AD29-1848-B72C-ABB297C80A44}"/>
               </a:ext>
             </a:extLst>
           </p:cNvPr>
@@ -8736,7 +8738,7 @@
           <p:cNvPr id="67" name="Picture 66">
             <a:extLst>
               <a:ext uri="{FF2B5EF4-FFF2-40B4-BE49-F238E27FC236}">
-                <a16:creationId xmlns:a16="http://schemas.microsoft.com/office/drawing/2014/main" xmlns="" id="{2CBB9EC6-1F4D-A544-B955-509A162728C6}"/>
+                <a16:creationId xmlns:a16="http://schemas.microsoft.com/office/drawing/2014/main" id="{2CBB9EC6-1F4D-A544-B955-509A162728C6}"/>
               </a:ext>
             </a:extLst>
           </p:cNvPr>
@@ -8772,7 +8774,7 @@
           <p:cNvPr id="116" name="Straight Connector 115">
             <a:extLst>
               <a:ext uri="{FF2B5EF4-FFF2-40B4-BE49-F238E27FC236}">
-                <a16:creationId xmlns:a16="http://schemas.microsoft.com/office/drawing/2014/main" xmlns="" id="{5DA5D267-4395-9C48-8B25-87844AB53687}"/>
+                <a16:creationId xmlns:a16="http://schemas.microsoft.com/office/drawing/2014/main" id="{5DA5D267-4395-9C48-8B25-87844AB53687}"/>
               </a:ext>
             </a:extLst>
           </p:cNvPr>
@@ -8819,7 +8821,7 @@
           <p:cNvPr id="119" name="TextBox 118">
             <a:extLst>
               <a:ext uri="{FF2B5EF4-FFF2-40B4-BE49-F238E27FC236}">
-                <a16:creationId xmlns:a16="http://schemas.microsoft.com/office/drawing/2014/main" xmlns="" id="{2A942E01-9F5A-F646-B3ED-A608F871CF24}"/>
+                <a16:creationId xmlns:a16="http://schemas.microsoft.com/office/drawing/2014/main" id="{2A942E01-9F5A-F646-B3ED-A608F871CF24}"/>
               </a:ext>
             </a:extLst>
           </p:cNvPr>
@@ -8900,7 +8902,7 @@
           <p:cNvPr id="79" name="Picture 78">
             <a:extLst>
               <a:ext uri="{FF2B5EF4-FFF2-40B4-BE49-F238E27FC236}">
-                <a16:creationId xmlns:a16="http://schemas.microsoft.com/office/drawing/2014/main" xmlns="" id="{702BB94C-F70C-5E4B-94D9-B69FE9F302C8}"/>
+                <a16:creationId xmlns:a16="http://schemas.microsoft.com/office/drawing/2014/main" id="{702BB94C-F70C-5E4B-94D9-B69FE9F302C8}"/>
               </a:ext>
             </a:extLst>
           </p:cNvPr>
@@ -8936,7 +8938,7 @@
           <p:cNvPr id="131" name="Straight Connector 130">
             <a:extLst>
               <a:ext uri="{FF2B5EF4-FFF2-40B4-BE49-F238E27FC236}">
-                <a16:creationId xmlns:a16="http://schemas.microsoft.com/office/drawing/2014/main" xmlns="" id="{EA8E957C-3AA4-2547-B191-BA32AA3F3AF2}"/>
+                <a16:creationId xmlns:a16="http://schemas.microsoft.com/office/drawing/2014/main" id="{EA8E957C-3AA4-2547-B191-BA32AA3F3AF2}"/>
               </a:ext>
             </a:extLst>
           </p:cNvPr>
@@ -8984,7 +8986,7 @@
           <p:cNvPr id="134" name="Straight Connector 133">
             <a:extLst>
               <a:ext uri="{FF2B5EF4-FFF2-40B4-BE49-F238E27FC236}">
-                <a16:creationId xmlns:a16="http://schemas.microsoft.com/office/drawing/2014/main" xmlns="" id="{5BE986ED-64D7-A046-BE28-021C8C920B48}"/>
+                <a16:creationId xmlns:a16="http://schemas.microsoft.com/office/drawing/2014/main" id="{5BE986ED-64D7-A046-BE28-021C8C920B48}"/>
               </a:ext>
             </a:extLst>
           </p:cNvPr>
@@ -9032,7 +9034,7 @@
           <p:cNvPr id="138" name="Straight Connector 137">
             <a:extLst>
               <a:ext uri="{FF2B5EF4-FFF2-40B4-BE49-F238E27FC236}">
-                <a16:creationId xmlns:a16="http://schemas.microsoft.com/office/drawing/2014/main" xmlns="" id="{8E1453EF-7DB3-E54F-9665-9C837DE98445}"/>
+                <a16:creationId xmlns:a16="http://schemas.microsoft.com/office/drawing/2014/main" id="{8E1453EF-7DB3-E54F-9665-9C837DE98445}"/>
               </a:ext>
             </a:extLst>
           </p:cNvPr>
@@ -9079,7 +9081,7 @@
           <p:cNvPr id="144" name="TextBox 143">
             <a:extLst>
               <a:ext uri="{FF2B5EF4-FFF2-40B4-BE49-F238E27FC236}">
-                <a16:creationId xmlns:a16="http://schemas.microsoft.com/office/drawing/2014/main" xmlns="" id="{F20B3218-9CCE-2145-9963-A12E6849F8D1}"/>
+                <a16:creationId xmlns:a16="http://schemas.microsoft.com/office/drawing/2014/main" id="{F20B3218-9CCE-2145-9963-A12E6849F8D1}"/>
               </a:ext>
             </a:extLst>
           </p:cNvPr>
@@ -9160,7 +9162,7 @@
           <p:cNvPr id="145" name="TextBox 144">
             <a:extLst>
               <a:ext uri="{FF2B5EF4-FFF2-40B4-BE49-F238E27FC236}">
-                <a16:creationId xmlns:a16="http://schemas.microsoft.com/office/drawing/2014/main" xmlns="" id="{32942C70-4F7F-BB41-A5A2-DABAE9CFA331}"/>
+                <a16:creationId xmlns:a16="http://schemas.microsoft.com/office/drawing/2014/main" id="{32942C70-4F7F-BB41-A5A2-DABAE9CFA331}"/>
               </a:ext>
             </a:extLst>
           </p:cNvPr>
@@ -9241,7 +9243,7 @@
           <p:cNvPr id="146" name="TextBox 145">
             <a:extLst>
               <a:ext uri="{FF2B5EF4-FFF2-40B4-BE49-F238E27FC236}">
-                <a16:creationId xmlns:a16="http://schemas.microsoft.com/office/drawing/2014/main" xmlns="" id="{F3C1C38B-9338-6F4F-B2D5-BD83A6070AEC}"/>
+                <a16:creationId xmlns:a16="http://schemas.microsoft.com/office/drawing/2014/main" id="{F3C1C38B-9338-6F4F-B2D5-BD83A6070AEC}"/>
               </a:ext>
             </a:extLst>
           </p:cNvPr>
@@ -9322,7 +9324,7 @@
           <p:cNvPr id="147" name="TextBox 146">
             <a:extLst>
               <a:ext uri="{FF2B5EF4-FFF2-40B4-BE49-F238E27FC236}">
-                <a16:creationId xmlns:a16="http://schemas.microsoft.com/office/drawing/2014/main" xmlns="" id="{344253DC-9D16-6148-8775-F290DB495E5E}"/>
+                <a16:creationId xmlns:a16="http://schemas.microsoft.com/office/drawing/2014/main" id="{344253DC-9D16-6148-8775-F290DB495E5E}"/>
               </a:ext>
             </a:extLst>
           </p:cNvPr>
@@ -9408,7 +9410,7 @@
   <p:clrMapOvr>
     <a:masterClrMapping/>
   </p:clrMapOvr>
-  <p:transition xmlns:p14="http://schemas.microsoft.com/office/powerpoint/2010/main" spd="med"/>
+  <p:transition spd="med"/>
 </p:sld>
 </file>
 
@@ -9434,7 +9436,7 @@
           <p:cNvPr id="108" name="Rectangle 107">
             <a:extLst>
               <a:ext uri="{FF2B5EF4-FFF2-40B4-BE49-F238E27FC236}">
-                <a16:creationId xmlns:a16="http://schemas.microsoft.com/office/drawing/2014/main" xmlns="" id="{DD3A4E38-E7B5-F444-A041-B81D31F9BE1A}"/>
+                <a16:creationId xmlns:a16="http://schemas.microsoft.com/office/drawing/2014/main" id="{DD3A4E38-E7B5-F444-A041-B81D31F9BE1A}"/>
               </a:ext>
             </a:extLst>
           </p:cNvPr>
@@ -9479,7 +9481,7 @@
           <p:cNvPr id="141" name="Rectangle 140">
             <a:extLst>
               <a:ext uri="{FF2B5EF4-FFF2-40B4-BE49-F238E27FC236}">
-                <a16:creationId xmlns:a16="http://schemas.microsoft.com/office/drawing/2014/main" xmlns="" id="{3C097F3C-09AD-4C48-89F5-8F6682E2A9C7}"/>
+                <a16:creationId xmlns:a16="http://schemas.microsoft.com/office/drawing/2014/main" id="{3C097F3C-09AD-4C48-89F5-8F6682E2A9C7}"/>
               </a:ext>
             </a:extLst>
           </p:cNvPr>
@@ -9522,7 +9524,7 @@
           <p:cNvPr id="132" name="Rectangle 131">
             <a:extLst>
               <a:ext uri="{FF2B5EF4-FFF2-40B4-BE49-F238E27FC236}">
-                <a16:creationId xmlns:a16="http://schemas.microsoft.com/office/drawing/2014/main" xmlns="" id="{A4F70669-E49F-6042-AC95-A1CF22FC2F0E}"/>
+                <a16:creationId xmlns:a16="http://schemas.microsoft.com/office/drawing/2014/main" id="{A4F70669-E49F-6042-AC95-A1CF22FC2F0E}"/>
               </a:ext>
             </a:extLst>
           </p:cNvPr>
@@ -9565,7 +9567,7 @@
           <p:cNvPr id="46" name="Straight Connector 45">
             <a:extLst>
               <a:ext uri="{FF2B5EF4-FFF2-40B4-BE49-F238E27FC236}">
-                <a16:creationId xmlns:a16="http://schemas.microsoft.com/office/drawing/2014/main" xmlns="" id="{B3EF6D8D-E093-9C43-8F06-6465AF5A1A76}"/>
+                <a16:creationId xmlns:a16="http://schemas.microsoft.com/office/drawing/2014/main" id="{B3EF6D8D-E093-9C43-8F06-6465AF5A1A76}"/>
               </a:ext>
             </a:extLst>
           </p:cNvPr>
@@ -9614,7 +9616,7 @@
           <p:cNvPr id="105" name="Rectangle 104">
             <a:extLst>
               <a:ext uri="{FF2B5EF4-FFF2-40B4-BE49-F238E27FC236}">
-                <a16:creationId xmlns:a16="http://schemas.microsoft.com/office/drawing/2014/main" xmlns="" id="{416C123A-D118-B348-B68E-4541B0A407FB}"/>
+                <a16:creationId xmlns:a16="http://schemas.microsoft.com/office/drawing/2014/main" id="{416C123A-D118-B348-B68E-4541B0A407FB}"/>
               </a:ext>
             </a:extLst>
           </p:cNvPr>
@@ -9661,7 +9663,7 @@
           <p:cNvPr id="115" name="Straight Connector 114">
             <a:extLst>
               <a:ext uri="{FF2B5EF4-FFF2-40B4-BE49-F238E27FC236}">
-                <a16:creationId xmlns:a16="http://schemas.microsoft.com/office/drawing/2014/main" xmlns="" id="{8AC6BC2D-6C06-F541-9BC0-006845DF1EA7}"/>
+                <a16:creationId xmlns:a16="http://schemas.microsoft.com/office/drawing/2014/main" id="{8AC6BC2D-6C06-F541-9BC0-006845DF1EA7}"/>
               </a:ext>
             </a:extLst>
           </p:cNvPr>
@@ -9710,7 +9712,7 @@
           <p:cNvPr id="103" name="Rectangle 102">
             <a:extLst>
               <a:ext uri="{FF2B5EF4-FFF2-40B4-BE49-F238E27FC236}">
-                <a16:creationId xmlns:a16="http://schemas.microsoft.com/office/drawing/2014/main" xmlns="" id="{89D06888-A322-F944-B8CD-1354DB6E9863}"/>
+                <a16:creationId xmlns:a16="http://schemas.microsoft.com/office/drawing/2014/main" id="{89D06888-A322-F944-B8CD-1354DB6E9863}"/>
               </a:ext>
             </a:extLst>
           </p:cNvPr>
@@ -9753,7 +9755,7 @@
           <p:cNvPr id="97" name="Rectangle 96">
             <a:extLst>
               <a:ext uri="{FF2B5EF4-FFF2-40B4-BE49-F238E27FC236}">
-                <a16:creationId xmlns:a16="http://schemas.microsoft.com/office/drawing/2014/main" xmlns="" id="{C6F860F7-F7BF-E549-968B-81EB1B326379}"/>
+                <a16:creationId xmlns:a16="http://schemas.microsoft.com/office/drawing/2014/main" id="{C6F860F7-F7BF-E549-968B-81EB1B326379}"/>
               </a:ext>
             </a:extLst>
           </p:cNvPr>
@@ -9798,7 +9800,7 @@
           <p:cNvPr id="88" name="Rectangle 87">
             <a:extLst>
               <a:ext uri="{FF2B5EF4-FFF2-40B4-BE49-F238E27FC236}">
-                <a16:creationId xmlns:a16="http://schemas.microsoft.com/office/drawing/2014/main" xmlns="" id="{52568BAA-8263-FC4A-AB69-A9AE503EA338}"/>
+                <a16:creationId xmlns:a16="http://schemas.microsoft.com/office/drawing/2014/main" id="{52568BAA-8263-FC4A-AB69-A9AE503EA338}"/>
               </a:ext>
             </a:extLst>
           </p:cNvPr>
@@ -9867,7 +9869,7 @@
           <p:cNvPr id="47" name="Rectangle 46">
             <a:extLst>
               <a:ext uri="{FF2B5EF4-FFF2-40B4-BE49-F238E27FC236}">
-                <a16:creationId xmlns:a16="http://schemas.microsoft.com/office/drawing/2014/main" xmlns="" id="{962939E0-A05A-3A44-9ADE-6B594560263B}"/>
+                <a16:creationId xmlns:a16="http://schemas.microsoft.com/office/drawing/2014/main" id="{962939E0-A05A-3A44-9ADE-6B594560263B}"/>
               </a:ext>
             </a:extLst>
           </p:cNvPr>
@@ -10022,7 +10024,7 @@
             </a:ln>
             <a:extLst>
               <a:ext uri="{C572A759-6A51-4108-AA02-DFA0A04FC94B}">
-                <ma14:wrappingTextBoxFlag xmlns:ma14="http://schemas.microsoft.com/office/mac/drawingml/2011/main" val="1"/>
+                <ma14:wrappingTextBoxFlag xmlns:ma14="http://schemas.microsoft.com/office/mac/drawingml/2011/main" xmlns="" val="1"/>
               </a:ext>
             </a:extLst>
           </p:spPr>
@@ -10261,7 +10263,7 @@
           </a:ln>
           <a:extLst>
             <a:ext uri="{C572A759-6A51-4108-AA02-DFA0A04FC94B}">
-              <ma14:wrappingTextBoxFlag xmlns:ma14="http://schemas.microsoft.com/office/mac/drawingml/2011/main" val="1"/>
+              <ma14:wrappingTextBoxFlag xmlns:ma14="http://schemas.microsoft.com/office/mac/drawingml/2011/main" xmlns="" val="1"/>
             </a:ext>
           </a:extLst>
         </p:spPr>
@@ -10329,7 +10331,7 @@
           </a:ln>
           <a:extLst>
             <a:ext uri="{C572A759-6A51-4108-AA02-DFA0A04FC94B}">
-              <ma14:wrappingTextBoxFlag xmlns:ma14="http://schemas.microsoft.com/office/mac/drawingml/2011/main" val="1"/>
+              <ma14:wrappingTextBoxFlag xmlns:ma14="http://schemas.microsoft.com/office/mac/drawingml/2011/main" xmlns="" val="1"/>
             </a:ext>
           </a:extLst>
         </p:spPr>
@@ -10700,7 +10702,7 @@
             <a:effectLst/>
             <a:extLst>
               <a:ext uri="{C572A759-6A51-4108-AA02-DFA0A04FC94B}">
-                <ma14:wrappingTextBoxFlag xmlns:ma14="http://schemas.microsoft.com/office/mac/drawingml/2011/main" val="1"/>
+                <ma14:wrappingTextBoxFlag xmlns:ma14="http://schemas.microsoft.com/office/mac/drawingml/2011/main" xmlns="" val="1"/>
               </a:ext>
             </a:extLst>
           </p:spPr>
@@ -10791,7 +10793,7 @@
           <p:cNvPr id="188" name="Group 187">
             <a:extLst>
               <a:ext uri="{FF2B5EF4-FFF2-40B4-BE49-F238E27FC236}">
-                <a16:creationId xmlns:a16="http://schemas.microsoft.com/office/drawing/2014/main" xmlns="" id="{5938EDDB-B2B2-6642-9D20-6D7C5F9FED31}"/>
+                <a16:creationId xmlns:a16="http://schemas.microsoft.com/office/drawing/2014/main" id="{5938EDDB-B2B2-6642-9D20-6D7C5F9FED31}"/>
               </a:ext>
             </a:extLst>
           </p:cNvPr>
@@ -10811,7 +10813,7 @@
             <p:cNvPr id="189" name="Group 188">
               <a:extLst>
                 <a:ext uri="{FF2B5EF4-FFF2-40B4-BE49-F238E27FC236}">
-                  <a16:creationId xmlns:a16="http://schemas.microsoft.com/office/drawing/2014/main" xmlns="" id="{3527AD53-90A2-7D45-A4B7-509C2FD1C32F}"/>
+                  <a16:creationId xmlns:a16="http://schemas.microsoft.com/office/drawing/2014/main" id="{3527AD53-90A2-7D45-A4B7-509C2FD1C32F}"/>
                 </a:ext>
               </a:extLst>
             </p:cNvPr>
@@ -10831,7 +10833,7 @@
               <p:cNvPr id="191" name="Oval 190">
                 <a:extLst>
                   <a:ext uri="{FF2B5EF4-FFF2-40B4-BE49-F238E27FC236}">
-                    <a16:creationId xmlns:a16="http://schemas.microsoft.com/office/drawing/2014/main" xmlns="" id="{38BE8895-77F2-3F48-BDC0-E7E0559BA7AD}"/>
+                    <a16:creationId xmlns:a16="http://schemas.microsoft.com/office/drawing/2014/main" id="{38BE8895-77F2-3F48-BDC0-E7E0559BA7AD}"/>
                   </a:ext>
                 </a:extLst>
               </p:cNvPr>
@@ -10887,7 +10889,7 @@
               <p:cNvPr id="192" name="Picture 191">
                 <a:extLst>
                   <a:ext uri="{FF2B5EF4-FFF2-40B4-BE49-F238E27FC236}">
-                    <a16:creationId xmlns:a16="http://schemas.microsoft.com/office/drawing/2014/main" xmlns="" id="{1E774A8B-C5DB-534E-8EE3-5D936B2F1BDA}"/>
+                    <a16:creationId xmlns:a16="http://schemas.microsoft.com/office/drawing/2014/main" id="{1E774A8B-C5DB-534E-8EE3-5D936B2F1BDA}"/>
                   </a:ext>
                 </a:extLst>
               </p:cNvPr>
@@ -10924,7 +10926,7 @@
             <p:cNvPr id="190" name="Shape 576">
               <a:extLst>
                 <a:ext uri="{FF2B5EF4-FFF2-40B4-BE49-F238E27FC236}">
-                  <a16:creationId xmlns:a16="http://schemas.microsoft.com/office/drawing/2014/main" xmlns="" id="{8D66F62C-0857-0C4E-B8A3-3F8DBC721692}"/>
+                  <a16:creationId xmlns:a16="http://schemas.microsoft.com/office/drawing/2014/main" id="{8D66F62C-0857-0C4E-B8A3-3F8DBC721692}"/>
                 </a:ext>
               </a:extLst>
             </p:cNvPr>
@@ -10944,7 +10946,7 @@
             </a:ln>
             <a:extLst>
               <a:ext uri="{C572A759-6A51-4108-AA02-DFA0A04FC94B}">
-                <ma14:wrappingTextBoxFlag xmlns:ma14="http://schemas.microsoft.com/office/mac/drawingml/2011/main" val="1"/>
+                <ma14:wrappingTextBoxFlag xmlns:ma14="http://schemas.microsoft.com/office/mac/drawingml/2011/main" xmlns="" val="1"/>
               </a:ext>
             </a:extLst>
           </p:spPr>
@@ -11157,7 +11159,7 @@
           </a:ln>
           <a:extLst>
             <a:ext uri="{C572A759-6A51-4108-AA02-DFA0A04FC94B}">
-              <ma14:wrappingTextBoxFlag xmlns:ma14="http://schemas.microsoft.com/office/mac/drawingml/2011/main" val="1"/>
+              <ma14:wrappingTextBoxFlag xmlns:ma14="http://schemas.microsoft.com/office/mac/drawingml/2011/main" xmlns="" val="1"/>
             </a:ext>
           </a:extLst>
         </p:spPr>
@@ -11446,7 +11448,7 @@
           <p:cNvPr id="58" name="Picture 57">
             <a:extLst>
               <a:ext uri="{FF2B5EF4-FFF2-40B4-BE49-F238E27FC236}">
-                <a16:creationId xmlns:a16="http://schemas.microsoft.com/office/drawing/2014/main" xmlns="" id="{66E030FF-10BA-3E4A-9604-7ADABD19B5C7}"/>
+                <a16:creationId xmlns:a16="http://schemas.microsoft.com/office/drawing/2014/main" id="{66E030FF-10BA-3E4A-9604-7ADABD19B5C7}"/>
               </a:ext>
             </a:extLst>
           </p:cNvPr>
@@ -11476,7 +11478,7 @@
           <p:cNvPr id="64" name="Straight Connector 63">
             <a:extLst>
               <a:ext uri="{FF2B5EF4-FFF2-40B4-BE49-F238E27FC236}">
-                <a16:creationId xmlns:a16="http://schemas.microsoft.com/office/drawing/2014/main" xmlns="" id="{7A922166-BCEA-2342-A0C7-D9B6D48E76B5}"/>
+                <a16:creationId xmlns:a16="http://schemas.microsoft.com/office/drawing/2014/main" id="{7A922166-BCEA-2342-A0C7-D9B6D48E76B5}"/>
               </a:ext>
             </a:extLst>
           </p:cNvPr>
@@ -11525,7 +11527,7 @@
           <p:cNvPr id="83" name="Straight Connector 82">
             <a:extLst>
               <a:ext uri="{FF2B5EF4-FFF2-40B4-BE49-F238E27FC236}">
-                <a16:creationId xmlns:a16="http://schemas.microsoft.com/office/drawing/2014/main" xmlns="" id="{BA3AC09A-2568-7A40-8619-27C921ACE99B}"/>
+                <a16:creationId xmlns:a16="http://schemas.microsoft.com/office/drawing/2014/main" id="{BA3AC09A-2568-7A40-8619-27C921ACE99B}"/>
               </a:ext>
             </a:extLst>
           </p:cNvPr>
@@ -11573,7 +11575,7 @@
           <p:cNvPr id="100" name="TextBox 99">
             <a:extLst>
               <a:ext uri="{FF2B5EF4-FFF2-40B4-BE49-F238E27FC236}">
-                <a16:creationId xmlns:a16="http://schemas.microsoft.com/office/drawing/2014/main" xmlns="" id="{3C80F502-9384-CB47-BE5F-B15677F163F5}"/>
+                <a16:creationId xmlns:a16="http://schemas.microsoft.com/office/drawing/2014/main" id="{3C80F502-9384-CB47-BE5F-B15677F163F5}"/>
               </a:ext>
             </a:extLst>
           </p:cNvPr>
@@ -11654,7 +11656,7 @@
           <p:cNvPr id="102" name="TextBox 101">
             <a:extLst>
               <a:ext uri="{FF2B5EF4-FFF2-40B4-BE49-F238E27FC236}">
-                <a16:creationId xmlns:a16="http://schemas.microsoft.com/office/drawing/2014/main" xmlns="" id="{049DDE7D-2EFF-7541-B9F7-19BEEA5515BE}"/>
+                <a16:creationId xmlns:a16="http://schemas.microsoft.com/office/drawing/2014/main" id="{049DDE7D-2EFF-7541-B9F7-19BEEA5515BE}"/>
               </a:ext>
             </a:extLst>
           </p:cNvPr>
@@ -11735,7 +11737,7 @@
           <p:cNvPr id="107" name="TextBox 106">
             <a:extLst>
               <a:ext uri="{FF2B5EF4-FFF2-40B4-BE49-F238E27FC236}">
-                <a16:creationId xmlns:a16="http://schemas.microsoft.com/office/drawing/2014/main" xmlns="" id="{F073A3D8-220E-7144-A600-F0641A71F37F}"/>
+                <a16:creationId xmlns:a16="http://schemas.microsoft.com/office/drawing/2014/main" id="{F073A3D8-220E-7144-A600-F0641A71F37F}"/>
               </a:ext>
             </a:extLst>
           </p:cNvPr>
@@ -11816,7 +11818,7 @@
           <p:cNvPr id="109" name="TextBox 108">
             <a:extLst>
               <a:ext uri="{FF2B5EF4-FFF2-40B4-BE49-F238E27FC236}">
-                <a16:creationId xmlns:a16="http://schemas.microsoft.com/office/drawing/2014/main" xmlns="" id="{E4BD00C3-AD29-1848-B72C-ABB297C80A44}"/>
+                <a16:creationId xmlns:a16="http://schemas.microsoft.com/office/drawing/2014/main" id="{E4BD00C3-AD29-1848-B72C-ABB297C80A44}"/>
               </a:ext>
             </a:extLst>
           </p:cNvPr>
@@ -11898,7 +11900,7 @@
           <p:cNvPr id="67" name="Picture 66">
             <a:extLst>
               <a:ext uri="{FF2B5EF4-FFF2-40B4-BE49-F238E27FC236}">
-                <a16:creationId xmlns:a16="http://schemas.microsoft.com/office/drawing/2014/main" xmlns="" id="{2CBB9EC6-1F4D-A544-B955-509A162728C6}"/>
+                <a16:creationId xmlns:a16="http://schemas.microsoft.com/office/drawing/2014/main" id="{2CBB9EC6-1F4D-A544-B955-509A162728C6}"/>
               </a:ext>
             </a:extLst>
           </p:cNvPr>
@@ -11934,7 +11936,7 @@
           <p:cNvPr id="116" name="Straight Connector 115">
             <a:extLst>
               <a:ext uri="{FF2B5EF4-FFF2-40B4-BE49-F238E27FC236}">
-                <a16:creationId xmlns:a16="http://schemas.microsoft.com/office/drawing/2014/main" xmlns="" id="{5DA5D267-4395-9C48-8B25-87844AB53687}"/>
+                <a16:creationId xmlns:a16="http://schemas.microsoft.com/office/drawing/2014/main" id="{5DA5D267-4395-9C48-8B25-87844AB53687}"/>
               </a:ext>
             </a:extLst>
           </p:cNvPr>
@@ -11981,7 +11983,7 @@
           <p:cNvPr id="119" name="TextBox 118">
             <a:extLst>
               <a:ext uri="{FF2B5EF4-FFF2-40B4-BE49-F238E27FC236}">
-                <a16:creationId xmlns:a16="http://schemas.microsoft.com/office/drawing/2014/main" xmlns="" id="{2A942E01-9F5A-F646-B3ED-A608F871CF24}"/>
+                <a16:creationId xmlns:a16="http://schemas.microsoft.com/office/drawing/2014/main" id="{2A942E01-9F5A-F646-B3ED-A608F871CF24}"/>
               </a:ext>
             </a:extLst>
           </p:cNvPr>
@@ -12062,7 +12064,7 @@
           <p:cNvPr id="79" name="Picture 78">
             <a:extLst>
               <a:ext uri="{FF2B5EF4-FFF2-40B4-BE49-F238E27FC236}">
-                <a16:creationId xmlns:a16="http://schemas.microsoft.com/office/drawing/2014/main" xmlns="" id="{702BB94C-F70C-5E4B-94D9-B69FE9F302C8}"/>
+                <a16:creationId xmlns:a16="http://schemas.microsoft.com/office/drawing/2014/main" id="{702BB94C-F70C-5E4B-94D9-B69FE9F302C8}"/>
               </a:ext>
             </a:extLst>
           </p:cNvPr>
@@ -12098,7 +12100,7 @@
           <p:cNvPr id="131" name="Straight Connector 130">
             <a:extLst>
               <a:ext uri="{FF2B5EF4-FFF2-40B4-BE49-F238E27FC236}">
-                <a16:creationId xmlns:a16="http://schemas.microsoft.com/office/drawing/2014/main" xmlns="" id="{EA8E957C-3AA4-2547-B191-BA32AA3F3AF2}"/>
+                <a16:creationId xmlns:a16="http://schemas.microsoft.com/office/drawing/2014/main" id="{EA8E957C-3AA4-2547-B191-BA32AA3F3AF2}"/>
               </a:ext>
             </a:extLst>
           </p:cNvPr>
@@ -12146,7 +12148,7 @@
           <p:cNvPr id="134" name="Straight Connector 133">
             <a:extLst>
               <a:ext uri="{FF2B5EF4-FFF2-40B4-BE49-F238E27FC236}">
-                <a16:creationId xmlns:a16="http://schemas.microsoft.com/office/drawing/2014/main" xmlns="" id="{5BE986ED-64D7-A046-BE28-021C8C920B48}"/>
+                <a16:creationId xmlns:a16="http://schemas.microsoft.com/office/drawing/2014/main" id="{5BE986ED-64D7-A046-BE28-021C8C920B48}"/>
               </a:ext>
             </a:extLst>
           </p:cNvPr>
@@ -12194,7 +12196,7 @@
           <p:cNvPr id="138" name="Straight Connector 137">
             <a:extLst>
               <a:ext uri="{FF2B5EF4-FFF2-40B4-BE49-F238E27FC236}">
-                <a16:creationId xmlns:a16="http://schemas.microsoft.com/office/drawing/2014/main" xmlns="" id="{8E1453EF-7DB3-E54F-9665-9C837DE98445}"/>
+                <a16:creationId xmlns:a16="http://schemas.microsoft.com/office/drawing/2014/main" id="{8E1453EF-7DB3-E54F-9665-9C837DE98445}"/>
               </a:ext>
             </a:extLst>
           </p:cNvPr>
@@ -12241,7 +12243,7 @@
           <p:cNvPr id="144" name="TextBox 143">
             <a:extLst>
               <a:ext uri="{FF2B5EF4-FFF2-40B4-BE49-F238E27FC236}">
-                <a16:creationId xmlns:a16="http://schemas.microsoft.com/office/drawing/2014/main" xmlns="" id="{F20B3218-9CCE-2145-9963-A12E6849F8D1}"/>
+                <a16:creationId xmlns:a16="http://schemas.microsoft.com/office/drawing/2014/main" id="{F20B3218-9CCE-2145-9963-A12E6849F8D1}"/>
               </a:ext>
             </a:extLst>
           </p:cNvPr>
@@ -12322,7 +12324,7 @@
           <p:cNvPr id="2" name="Rectangle 1">
             <a:extLst>
               <a:ext uri="{FF2B5EF4-FFF2-40B4-BE49-F238E27FC236}">
-                <a16:creationId xmlns:a16="http://schemas.microsoft.com/office/drawing/2014/main" xmlns="" id="{457F0C94-1AA0-1142-B814-A0B56C12F7AE}"/>
+                <a16:creationId xmlns:a16="http://schemas.microsoft.com/office/drawing/2014/main" id="{457F0C94-1AA0-1142-B814-A0B56C12F7AE}"/>
               </a:ext>
             </a:extLst>
           </p:cNvPr>
@@ -12363,7 +12365,7 @@
           <p:cNvPr id="3" name="Rounded Rectangular Callout 2">
             <a:extLst>
               <a:ext uri="{FF2B5EF4-FFF2-40B4-BE49-F238E27FC236}">
-                <a16:creationId xmlns:a16="http://schemas.microsoft.com/office/drawing/2014/main" xmlns="" id="{63DAE306-87BE-DC43-AD20-7EEF4394EF2D}"/>
+                <a16:creationId xmlns:a16="http://schemas.microsoft.com/office/drawing/2014/main" id="{63DAE306-87BE-DC43-AD20-7EEF4394EF2D}"/>
               </a:ext>
             </a:extLst>
           </p:cNvPr>
@@ -12410,7 +12412,7 @@
           <p:cNvPr id="4" name="TextBox 3">
             <a:extLst>
               <a:ext uri="{FF2B5EF4-FFF2-40B4-BE49-F238E27FC236}">
-                <a16:creationId xmlns:a16="http://schemas.microsoft.com/office/drawing/2014/main" xmlns="" id="{87A33B23-79D2-8C45-85BC-26BA3EBE5E09}"/>
+                <a16:creationId xmlns:a16="http://schemas.microsoft.com/office/drawing/2014/main" id="{87A33B23-79D2-8C45-85BC-26BA3EBE5E09}"/>
               </a:ext>
             </a:extLst>
           </p:cNvPr>
@@ -12491,7 +12493,7 @@
           <p:cNvPr id="63" name="TextBox 62">
             <a:extLst>
               <a:ext uri="{FF2B5EF4-FFF2-40B4-BE49-F238E27FC236}">
-                <a16:creationId xmlns:a16="http://schemas.microsoft.com/office/drawing/2014/main" xmlns="" id="{DF7CBF41-809E-E246-9424-6E940E6F0F01}"/>
+                <a16:creationId xmlns:a16="http://schemas.microsoft.com/office/drawing/2014/main" id="{DF7CBF41-809E-E246-9424-6E940E6F0F01}"/>
               </a:ext>
             </a:extLst>
           </p:cNvPr>
@@ -12572,7 +12574,7 @@
           <p:cNvPr id="65" name="TextBox 64">
             <a:extLst>
               <a:ext uri="{FF2B5EF4-FFF2-40B4-BE49-F238E27FC236}">
-                <a16:creationId xmlns:a16="http://schemas.microsoft.com/office/drawing/2014/main" xmlns="" id="{5241D4CE-929F-D243-9A44-1D0138E4A79E}"/>
+                <a16:creationId xmlns:a16="http://schemas.microsoft.com/office/drawing/2014/main" id="{5241D4CE-929F-D243-9A44-1D0138E4A79E}"/>
               </a:ext>
             </a:extLst>
           </p:cNvPr>
@@ -12653,7 +12655,7 @@
           <p:cNvPr id="66" name="TextBox 65">
             <a:extLst>
               <a:ext uri="{FF2B5EF4-FFF2-40B4-BE49-F238E27FC236}">
-                <a16:creationId xmlns:a16="http://schemas.microsoft.com/office/drawing/2014/main" xmlns="" id="{76BA1A68-812A-9342-8B07-D0FC0DD29AB1}"/>
+                <a16:creationId xmlns:a16="http://schemas.microsoft.com/office/drawing/2014/main" id="{76BA1A68-812A-9342-8B07-D0FC0DD29AB1}"/>
               </a:ext>
             </a:extLst>
           </p:cNvPr>
@@ -12739,7 +12741,7 @@
   <p:clrMapOvr>
     <a:masterClrMapping/>
   </p:clrMapOvr>
-  <p:transition xmlns:p14="http://schemas.microsoft.com/office/powerpoint/2010/main" spd="med"/>
+  <p:transition spd="med"/>
 </p:sld>
 </file>
 
@@ -12765,7 +12767,7 @@
           <p:cNvPr id="108" name="Rectangle 107">
             <a:extLst>
               <a:ext uri="{FF2B5EF4-FFF2-40B4-BE49-F238E27FC236}">
-                <a16:creationId xmlns:a16="http://schemas.microsoft.com/office/drawing/2014/main" xmlns="" id="{DD3A4E38-E7B5-F444-A041-B81D31F9BE1A}"/>
+                <a16:creationId xmlns:a16="http://schemas.microsoft.com/office/drawing/2014/main" id="{DD3A4E38-E7B5-F444-A041-B81D31F9BE1A}"/>
               </a:ext>
             </a:extLst>
           </p:cNvPr>
@@ -12810,7 +12812,7 @@
           <p:cNvPr id="138" name="Straight Connector 137">
             <a:extLst>
               <a:ext uri="{FF2B5EF4-FFF2-40B4-BE49-F238E27FC236}">
-                <a16:creationId xmlns:a16="http://schemas.microsoft.com/office/drawing/2014/main" xmlns="" id="{8E1453EF-7DB3-E54F-9665-9C837DE98445}"/>
+                <a16:creationId xmlns:a16="http://schemas.microsoft.com/office/drawing/2014/main" id="{8E1453EF-7DB3-E54F-9665-9C837DE98445}"/>
               </a:ext>
             </a:extLst>
           </p:cNvPr>
@@ -12858,7 +12860,7 @@
           <p:cNvPr id="55" name="Picture 54">
             <a:extLst>
               <a:ext uri="{FF2B5EF4-FFF2-40B4-BE49-F238E27FC236}">
-                <a16:creationId xmlns:a16="http://schemas.microsoft.com/office/drawing/2014/main" xmlns="" id="{CE881D18-4919-AC4A-8C4E-67FC236952BB}"/>
+                <a16:creationId xmlns:a16="http://schemas.microsoft.com/office/drawing/2014/main" id="{CE881D18-4919-AC4A-8C4E-67FC236952BB}"/>
               </a:ext>
             </a:extLst>
           </p:cNvPr>
@@ -12888,7 +12890,7 @@
           <p:cNvPr id="141" name="Rectangle 140">
             <a:extLst>
               <a:ext uri="{FF2B5EF4-FFF2-40B4-BE49-F238E27FC236}">
-                <a16:creationId xmlns:a16="http://schemas.microsoft.com/office/drawing/2014/main" xmlns="" id="{3C097F3C-09AD-4C48-89F5-8F6682E2A9C7}"/>
+                <a16:creationId xmlns:a16="http://schemas.microsoft.com/office/drawing/2014/main" id="{3C097F3C-09AD-4C48-89F5-8F6682E2A9C7}"/>
               </a:ext>
             </a:extLst>
           </p:cNvPr>
@@ -13067,7 +13069,7 @@
             </a:ln>
             <a:extLst>
               <a:ext uri="{C572A759-6A51-4108-AA02-DFA0A04FC94B}">
-                <ma14:wrappingTextBoxFlag xmlns:ma14="http://schemas.microsoft.com/office/mac/drawingml/2011/main" val="1"/>
+                <ma14:wrappingTextBoxFlag xmlns:ma14="http://schemas.microsoft.com/office/mac/drawingml/2011/main" xmlns="" val="1"/>
               </a:ext>
             </a:extLst>
           </p:spPr>
@@ -13174,7 +13176,7 @@
           </a:ln>
           <a:extLst>
             <a:ext uri="{C572A759-6A51-4108-AA02-DFA0A04FC94B}">
-              <ma14:wrappingTextBoxFlag xmlns:ma14="http://schemas.microsoft.com/office/mac/drawingml/2011/main" val="1"/>
+              <ma14:wrappingTextBoxFlag xmlns:ma14="http://schemas.microsoft.com/office/mac/drawingml/2011/main" xmlns="" val="1"/>
             </a:ext>
           </a:extLst>
         </p:spPr>
@@ -13242,7 +13244,7 @@
           </a:ln>
           <a:extLst>
             <a:ext uri="{C572A759-6A51-4108-AA02-DFA0A04FC94B}">
-              <ma14:wrappingTextBoxFlag xmlns:ma14="http://schemas.microsoft.com/office/mac/drawingml/2011/main" val="1"/>
+              <ma14:wrappingTextBoxFlag xmlns:ma14="http://schemas.microsoft.com/office/mac/drawingml/2011/main" xmlns="" val="1"/>
             </a:ext>
           </a:extLst>
         </p:spPr>
@@ -13453,7 +13455,7 @@
           <p:cNvPr id="109" name="TextBox 108">
             <a:extLst>
               <a:ext uri="{FF2B5EF4-FFF2-40B4-BE49-F238E27FC236}">
-                <a16:creationId xmlns:a16="http://schemas.microsoft.com/office/drawing/2014/main" xmlns="" id="{E4BD00C3-AD29-1848-B72C-ABB297C80A44}"/>
+                <a16:creationId xmlns:a16="http://schemas.microsoft.com/office/drawing/2014/main" id="{E4BD00C3-AD29-1848-B72C-ABB297C80A44}"/>
               </a:ext>
             </a:extLst>
           </p:cNvPr>
@@ -13534,7 +13536,7 @@
           <p:cNvPr id="67" name="Picture 66">
             <a:extLst>
               <a:ext uri="{FF2B5EF4-FFF2-40B4-BE49-F238E27FC236}">
-                <a16:creationId xmlns:a16="http://schemas.microsoft.com/office/drawing/2014/main" xmlns="" id="{2CBB9EC6-1F4D-A544-B955-509A162728C6}"/>
+                <a16:creationId xmlns:a16="http://schemas.microsoft.com/office/drawing/2014/main" id="{2CBB9EC6-1F4D-A544-B955-509A162728C6}"/>
               </a:ext>
             </a:extLst>
           </p:cNvPr>
@@ -13570,7 +13572,7 @@
           <p:cNvPr id="116" name="Straight Connector 115">
             <a:extLst>
               <a:ext uri="{FF2B5EF4-FFF2-40B4-BE49-F238E27FC236}">
-                <a16:creationId xmlns:a16="http://schemas.microsoft.com/office/drawing/2014/main" xmlns="" id="{5DA5D267-4395-9C48-8B25-87844AB53687}"/>
+                <a16:creationId xmlns:a16="http://schemas.microsoft.com/office/drawing/2014/main" id="{5DA5D267-4395-9C48-8B25-87844AB53687}"/>
               </a:ext>
             </a:extLst>
           </p:cNvPr>
@@ -13617,7 +13619,7 @@
           <p:cNvPr id="119" name="TextBox 118">
             <a:extLst>
               <a:ext uri="{FF2B5EF4-FFF2-40B4-BE49-F238E27FC236}">
-                <a16:creationId xmlns:a16="http://schemas.microsoft.com/office/drawing/2014/main" xmlns="" id="{2A942E01-9F5A-F646-B3ED-A608F871CF24}"/>
+                <a16:creationId xmlns:a16="http://schemas.microsoft.com/office/drawing/2014/main" id="{2A942E01-9F5A-F646-B3ED-A608F871CF24}"/>
               </a:ext>
             </a:extLst>
           </p:cNvPr>
@@ -13698,7 +13700,7 @@
           <p:cNvPr id="79" name="Picture 78">
             <a:extLst>
               <a:ext uri="{FF2B5EF4-FFF2-40B4-BE49-F238E27FC236}">
-                <a16:creationId xmlns:a16="http://schemas.microsoft.com/office/drawing/2014/main" xmlns="" id="{702BB94C-F70C-5E4B-94D9-B69FE9F302C8}"/>
+                <a16:creationId xmlns:a16="http://schemas.microsoft.com/office/drawing/2014/main" id="{702BB94C-F70C-5E4B-94D9-B69FE9F302C8}"/>
               </a:ext>
             </a:extLst>
           </p:cNvPr>
@@ -13734,7 +13736,7 @@
           <p:cNvPr id="56" name="TextBox 55">
             <a:extLst>
               <a:ext uri="{FF2B5EF4-FFF2-40B4-BE49-F238E27FC236}">
-                <a16:creationId xmlns:a16="http://schemas.microsoft.com/office/drawing/2014/main" xmlns="" id="{EC9D555A-9361-8C4D-B121-23370991E14A}"/>
+                <a16:creationId xmlns:a16="http://schemas.microsoft.com/office/drawing/2014/main" id="{EC9D555A-9361-8C4D-B121-23370991E14A}"/>
               </a:ext>
             </a:extLst>
           </p:cNvPr>
@@ -13815,7 +13817,7 @@
           <p:cNvPr id="57" name="Picture 56">
             <a:extLst>
               <a:ext uri="{FF2B5EF4-FFF2-40B4-BE49-F238E27FC236}">
-                <a16:creationId xmlns:a16="http://schemas.microsoft.com/office/drawing/2014/main" xmlns="" id="{0E7372C8-1262-6840-B431-DDDFC66573C0}"/>
+                <a16:creationId xmlns:a16="http://schemas.microsoft.com/office/drawing/2014/main" id="{0E7372C8-1262-6840-B431-DDDFC66573C0}"/>
               </a:ext>
             </a:extLst>
           </p:cNvPr>
@@ -13850,7 +13852,7 @@
   <p:clrMapOvr>
     <a:masterClrMapping/>
   </p:clrMapOvr>
-  <p:transition xmlns:p14="http://schemas.microsoft.com/office/powerpoint/2010/main" spd="med"/>
+  <p:transition spd="med"/>
 </p:sld>
 </file>
 
@@ -13876,7 +13878,7 @@
           <p:cNvPr id="108" name="Rectangle 107">
             <a:extLst>
               <a:ext uri="{FF2B5EF4-FFF2-40B4-BE49-F238E27FC236}">
-                <a16:creationId xmlns:a16="http://schemas.microsoft.com/office/drawing/2014/main" xmlns="" id="{DD3A4E38-E7B5-F444-A041-B81D31F9BE1A}"/>
+                <a16:creationId xmlns:a16="http://schemas.microsoft.com/office/drawing/2014/main" id="{DD3A4E38-E7B5-F444-A041-B81D31F9BE1A}"/>
               </a:ext>
             </a:extLst>
           </p:cNvPr>
@@ -13921,7 +13923,7 @@
           <p:cNvPr id="141" name="Rectangle 140">
             <a:extLst>
               <a:ext uri="{FF2B5EF4-FFF2-40B4-BE49-F238E27FC236}">
-                <a16:creationId xmlns:a16="http://schemas.microsoft.com/office/drawing/2014/main" xmlns="" id="{3C097F3C-09AD-4C48-89F5-8F6682E2A9C7}"/>
+                <a16:creationId xmlns:a16="http://schemas.microsoft.com/office/drawing/2014/main" id="{3C097F3C-09AD-4C48-89F5-8F6682E2A9C7}"/>
               </a:ext>
             </a:extLst>
           </p:cNvPr>
@@ -13964,7 +13966,7 @@
           <p:cNvPr id="132" name="Rectangle 131">
             <a:extLst>
               <a:ext uri="{FF2B5EF4-FFF2-40B4-BE49-F238E27FC236}">
-                <a16:creationId xmlns:a16="http://schemas.microsoft.com/office/drawing/2014/main" xmlns="" id="{A4F70669-E49F-6042-AC95-A1CF22FC2F0E}"/>
+                <a16:creationId xmlns:a16="http://schemas.microsoft.com/office/drawing/2014/main" id="{A4F70669-E49F-6042-AC95-A1CF22FC2F0E}"/>
               </a:ext>
             </a:extLst>
           </p:cNvPr>
@@ -14007,7 +14009,7 @@
           <p:cNvPr id="46" name="Straight Connector 45">
             <a:extLst>
               <a:ext uri="{FF2B5EF4-FFF2-40B4-BE49-F238E27FC236}">
-                <a16:creationId xmlns:a16="http://schemas.microsoft.com/office/drawing/2014/main" xmlns="" id="{B3EF6D8D-E093-9C43-8F06-6465AF5A1A76}"/>
+                <a16:creationId xmlns:a16="http://schemas.microsoft.com/office/drawing/2014/main" id="{B3EF6D8D-E093-9C43-8F06-6465AF5A1A76}"/>
               </a:ext>
             </a:extLst>
           </p:cNvPr>
@@ -14056,7 +14058,7 @@
           <p:cNvPr id="105" name="Rectangle 104">
             <a:extLst>
               <a:ext uri="{FF2B5EF4-FFF2-40B4-BE49-F238E27FC236}">
-                <a16:creationId xmlns:a16="http://schemas.microsoft.com/office/drawing/2014/main" xmlns="" id="{416C123A-D118-B348-B68E-4541B0A407FB}"/>
+                <a16:creationId xmlns:a16="http://schemas.microsoft.com/office/drawing/2014/main" id="{416C123A-D118-B348-B68E-4541B0A407FB}"/>
               </a:ext>
             </a:extLst>
           </p:cNvPr>
@@ -14103,7 +14105,7 @@
           <p:cNvPr id="115" name="Straight Connector 114">
             <a:extLst>
               <a:ext uri="{FF2B5EF4-FFF2-40B4-BE49-F238E27FC236}">
-                <a16:creationId xmlns:a16="http://schemas.microsoft.com/office/drawing/2014/main" xmlns="" id="{8AC6BC2D-6C06-F541-9BC0-006845DF1EA7}"/>
+                <a16:creationId xmlns:a16="http://schemas.microsoft.com/office/drawing/2014/main" id="{8AC6BC2D-6C06-F541-9BC0-006845DF1EA7}"/>
               </a:ext>
             </a:extLst>
           </p:cNvPr>
@@ -14152,7 +14154,7 @@
           <p:cNvPr id="103" name="Rectangle 102">
             <a:extLst>
               <a:ext uri="{FF2B5EF4-FFF2-40B4-BE49-F238E27FC236}">
-                <a16:creationId xmlns:a16="http://schemas.microsoft.com/office/drawing/2014/main" xmlns="" id="{89D06888-A322-F944-B8CD-1354DB6E9863}"/>
+                <a16:creationId xmlns:a16="http://schemas.microsoft.com/office/drawing/2014/main" id="{89D06888-A322-F944-B8CD-1354DB6E9863}"/>
               </a:ext>
             </a:extLst>
           </p:cNvPr>
@@ -14195,7 +14197,7 @@
           <p:cNvPr id="97" name="Rectangle 96">
             <a:extLst>
               <a:ext uri="{FF2B5EF4-FFF2-40B4-BE49-F238E27FC236}">
-                <a16:creationId xmlns:a16="http://schemas.microsoft.com/office/drawing/2014/main" xmlns="" id="{C6F860F7-F7BF-E549-968B-81EB1B326379}"/>
+                <a16:creationId xmlns:a16="http://schemas.microsoft.com/office/drawing/2014/main" id="{C6F860F7-F7BF-E549-968B-81EB1B326379}"/>
               </a:ext>
             </a:extLst>
           </p:cNvPr>
@@ -14240,7 +14242,7 @@
           <p:cNvPr id="88" name="Rectangle 87">
             <a:extLst>
               <a:ext uri="{FF2B5EF4-FFF2-40B4-BE49-F238E27FC236}">
-                <a16:creationId xmlns:a16="http://schemas.microsoft.com/office/drawing/2014/main" xmlns="" id="{52568BAA-8263-FC4A-AB69-A9AE503EA338}"/>
+                <a16:creationId xmlns:a16="http://schemas.microsoft.com/office/drawing/2014/main" id="{52568BAA-8263-FC4A-AB69-A9AE503EA338}"/>
               </a:ext>
             </a:extLst>
           </p:cNvPr>
@@ -14309,7 +14311,7 @@
           <p:cNvPr id="47" name="Rectangle 46">
             <a:extLst>
               <a:ext uri="{FF2B5EF4-FFF2-40B4-BE49-F238E27FC236}">
-                <a16:creationId xmlns:a16="http://schemas.microsoft.com/office/drawing/2014/main" xmlns="" id="{962939E0-A05A-3A44-9ADE-6B594560263B}"/>
+                <a16:creationId xmlns:a16="http://schemas.microsoft.com/office/drawing/2014/main" id="{962939E0-A05A-3A44-9ADE-6B594560263B}"/>
               </a:ext>
             </a:extLst>
           </p:cNvPr>
@@ -14464,7 +14466,7 @@
             </a:ln>
             <a:extLst>
               <a:ext uri="{C572A759-6A51-4108-AA02-DFA0A04FC94B}">
-                <ma14:wrappingTextBoxFlag xmlns:ma14="http://schemas.microsoft.com/office/mac/drawingml/2011/main" val="1"/>
+                <ma14:wrappingTextBoxFlag xmlns:ma14="http://schemas.microsoft.com/office/mac/drawingml/2011/main" xmlns="" val="1"/>
               </a:ext>
             </a:extLst>
           </p:spPr>
@@ -14703,7 +14705,7 @@
           </a:ln>
           <a:extLst>
             <a:ext uri="{C572A759-6A51-4108-AA02-DFA0A04FC94B}">
-              <ma14:wrappingTextBoxFlag xmlns:ma14="http://schemas.microsoft.com/office/mac/drawingml/2011/main" val="1"/>
+              <ma14:wrappingTextBoxFlag xmlns:ma14="http://schemas.microsoft.com/office/mac/drawingml/2011/main" xmlns="" val="1"/>
             </a:ext>
           </a:extLst>
         </p:spPr>
@@ -14771,7 +14773,7 @@
           </a:ln>
           <a:extLst>
             <a:ext uri="{C572A759-6A51-4108-AA02-DFA0A04FC94B}">
-              <ma14:wrappingTextBoxFlag xmlns:ma14="http://schemas.microsoft.com/office/mac/drawingml/2011/main" val="1"/>
+              <ma14:wrappingTextBoxFlag xmlns:ma14="http://schemas.microsoft.com/office/mac/drawingml/2011/main" xmlns="" val="1"/>
             </a:ext>
           </a:extLst>
         </p:spPr>
@@ -15142,7 +15144,7 @@
             <a:effectLst/>
             <a:extLst>
               <a:ext uri="{C572A759-6A51-4108-AA02-DFA0A04FC94B}">
-                <ma14:wrappingTextBoxFlag xmlns:ma14="http://schemas.microsoft.com/office/mac/drawingml/2011/main" val="1"/>
+                <ma14:wrappingTextBoxFlag xmlns:ma14="http://schemas.microsoft.com/office/mac/drawingml/2011/main" xmlns="" val="1"/>
               </a:ext>
             </a:extLst>
           </p:spPr>
@@ -15233,7 +15235,7 @@
           <p:cNvPr id="188" name="Group 187">
             <a:extLst>
               <a:ext uri="{FF2B5EF4-FFF2-40B4-BE49-F238E27FC236}">
-                <a16:creationId xmlns:a16="http://schemas.microsoft.com/office/drawing/2014/main" xmlns="" id="{5938EDDB-B2B2-6642-9D20-6D7C5F9FED31}"/>
+                <a16:creationId xmlns:a16="http://schemas.microsoft.com/office/drawing/2014/main" id="{5938EDDB-B2B2-6642-9D20-6D7C5F9FED31}"/>
               </a:ext>
             </a:extLst>
           </p:cNvPr>
@@ -15253,7 +15255,7 @@
             <p:cNvPr id="189" name="Group 188">
               <a:extLst>
                 <a:ext uri="{FF2B5EF4-FFF2-40B4-BE49-F238E27FC236}">
-                  <a16:creationId xmlns:a16="http://schemas.microsoft.com/office/drawing/2014/main" xmlns="" id="{3527AD53-90A2-7D45-A4B7-509C2FD1C32F}"/>
+                  <a16:creationId xmlns:a16="http://schemas.microsoft.com/office/drawing/2014/main" id="{3527AD53-90A2-7D45-A4B7-509C2FD1C32F}"/>
                 </a:ext>
               </a:extLst>
             </p:cNvPr>
@@ -15273,7 +15275,7 @@
               <p:cNvPr id="191" name="Oval 190">
                 <a:extLst>
                   <a:ext uri="{FF2B5EF4-FFF2-40B4-BE49-F238E27FC236}">
-                    <a16:creationId xmlns:a16="http://schemas.microsoft.com/office/drawing/2014/main" xmlns="" id="{38BE8895-77F2-3F48-BDC0-E7E0559BA7AD}"/>
+                    <a16:creationId xmlns:a16="http://schemas.microsoft.com/office/drawing/2014/main" id="{38BE8895-77F2-3F48-BDC0-E7E0559BA7AD}"/>
                   </a:ext>
                 </a:extLst>
               </p:cNvPr>
@@ -15329,7 +15331,7 @@
               <p:cNvPr id="192" name="Picture 191">
                 <a:extLst>
                   <a:ext uri="{FF2B5EF4-FFF2-40B4-BE49-F238E27FC236}">
-                    <a16:creationId xmlns:a16="http://schemas.microsoft.com/office/drawing/2014/main" xmlns="" id="{1E774A8B-C5DB-534E-8EE3-5D936B2F1BDA}"/>
+                    <a16:creationId xmlns:a16="http://schemas.microsoft.com/office/drawing/2014/main" id="{1E774A8B-C5DB-534E-8EE3-5D936B2F1BDA}"/>
                   </a:ext>
                 </a:extLst>
               </p:cNvPr>
@@ -15366,7 +15368,7 @@
             <p:cNvPr id="190" name="Shape 576">
               <a:extLst>
                 <a:ext uri="{FF2B5EF4-FFF2-40B4-BE49-F238E27FC236}">
-                  <a16:creationId xmlns:a16="http://schemas.microsoft.com/office/drawing/2014/main" xmlns="" id="{8D66F62C-0857-0C4E-B8A3-3F8DBC721692}"/>
+                  <a16:creationId xmlns:a16="http://schemas.microsoft.com/office/drawing/2014/main" id="{8D66F62C-0857-0C4E-B8A3-3F8DBC721692}"/>
                 </a:ext>
               </a:extLst>
             </p:cNvPr>
@@ -15386,7 +15388,7 @@
             </a:ln>
             <a:extLst>
               <a:ext uri="{C572A759-6A51-4108-AA02-DFA0A04FC94B}">
-                <ma14:wrappingTextBoxFlag xmlns:ma14="http://schemas.microsoft.com/office/mac/drawingml/2011/main" val="1"/>
+                <ma14:wrappingTextBoxFlag xmlns:ma14="http://schemas.microsoft.com/office/mac/drawingml/2011/main" xmlns="" val="1"/>
               </a:ext>
             </a:extLst>
           </p:spPr>
@@ -15599,7 +15601,7 @@
           </a:ln>
           <a:extLst>
             <a:ext uri="{C572A759-6A51-4108-AA02-DFA0A04FC94B}">
-              <ma14:wrappingTextBoxFlag xmlns:ma14="http://schemas.microsoft.com/office/mac/drawingml/2011/main" val="1"/>
+              <ma14:wrappingTextBoxFlag xmlns:ma14="http://schemas.microsoft.com/office/mac/drawingml/2011/main" xmlns="" val="1"/>
             </a:ext>
           </a:extLst>
         </p:spPr>
@@ -15888,7 +15890,7 @@
           <p:cNvPr id="58" name="Picture 57">
             <a:extLst>
               <a:ext uri="{FF2B5EF4-FFF2-40B4-BE49-F238E27FC236}">
-                <a16:creationId xmlns:a16="http://schemas.microsoft.com/office/drawing/2014/main" xmlns="" id="{66E030FF-10BA-3E4A-9604-7ADABD19B5C7}"/>
+                <a16:creationId xmlns:a16="http://schemas.microsoft.com/office/drawing/2014/main" id="{66E030FF-10BA-3E4A-9604-7ADABD19B5C7}"/>
               </a:ext>
             </a:extLst>
           </p:cNvPr>
@@ -15918,7 +15920,7 @@
           <p:cNvPr id="64" name="Straight Connector 63">
             <a:extLst>
               <a:ext uri="{FF2B5EF4-FFF2-40B4-BE49-F238E27FC236}">
-                <a16:creationId xmlns:a16="http://schemas.microsoft.com/office/drawing/2014/main" xmlns="" id="{7A922166-BCEA-2342-A0C7-D9B6D48E76B5}"/>
+                <a16:creationId xmlns:a16="http://schemas.microsoft.com/office/drawing/2014/main" id="{7A922166-BCEA-2342-A0C7-D9B6D48E76B5}"/>
               </a:ext>
             </a:extLst>
           </p:cNvPr>
@@ -15967,7 +15969,7 @@
           <p:cNvPr id="83" name="Straight Connector 82">
             <a:extLst>
               <a:ext uri="{FF2B5EF4-FFF2-40B4-BE49-F238E27FC236}">
-                <a16:creationId xmlns:a16="http://schemas.microsoft.com/office/drawing/2014/main" xmlns="" id="{BA3AC09A-2568-7A40-8619-27C921ACE99B}"/>
+                <a16:creationId xmlns:a16="http://schemas.microsoft.com/office/drawing/2014/main" id="{BA3AC09A-2568-7A40-8619-27C921ACE99B}"/>
               </a:ext>
             </a:extLst>
           </p:cNvPr>
@@ -16015,7 +16017,7 @@
           <p:cNvPr id="100" name="TextBox 99">
             <a:extLst>
               <a:ext uri="{FF2B5EF4-FFF2-40B4-BE49-F238E27FC236}">
-                <a16:creationId xmlns:a16="http://schemas.microsoft.com/office/drawing/2014/main" xmlns="" id="{3C80F502-9384-CB47-BE5F-B15677F163F5}"/>
+                <a16:creationId xmlns:a16="http://schemas.microsoft.com/office/drawing/2014/main" id="{3C80F502-9384-CB47-BE5F-B15677F163F5}"/>
               </a:ext>
             </a:extLst>
           </p:cNvPr>
@@ -16096,7 +16098,7 @@
           <p:cNvPr id="102" name="TextBox 101">
             <a:extLst>
               <a:ext uri="{FF2B5EF4-FFF2-40B4-BE49-F238E27FC236}">
-                <a16:creationId xmlns:a16="http://schemas.microsoft.com/office/drawing/2014/main" xmlns="" id="{049DDE7D-2EFF-7541-B9F7-19BEEA5515BE}"/>
+                <a16:creationId xmlns:a16="http://schemas.microsoft.com/office/drawing/2014/main" id="{049DDE7D-2EFF-7541-B9F7-19BEEA5515BE}"/>
               </a:ext>
             </a:extLst>
           </p:cNvPr>
@@ -16177,7 +16179,7 @@
           <p:cNvPr id="107" name="TextBox 106">
             <a:extLst>
               <a:ext uri="{FF2B5EF4-FFF2-40B4-BE49-F238E27FC236}">
-                <a16:creationId xmlns:a16="http://schemas.microsoft.com/office/drawing/2014/main" xmlns="" id="{F073A3D8-220E-7144-A600-F0641A71F37F}"/>
+                <a16:creationId xmlns:a16="http://schemas.microsoft.com/office/drawing/2014/main" id="{F073A3D8-220E-7144-A600-F0641A71F37F}"/>
               </a:ext>
             </a:extLst>
           </p:cNvPr>
@@ -16258,7 +16260,7 @@
           <p:cNvPr id="109" name="TextBox 108">
             <a:extLst>
               <a:ext uri="{FF2B5EF4-FFF2-40B4-BE49-F238E27FC236}">
-                <a16:creationId xmlns:a16="http://schemas.microsoft.com/office/drawing/2014/main" xmlns="" id="{E4BD00C3-AD29-1848-B72C-ABB297C80A44}"/>
+                <a16:creationId xmlns:a16="http://schemas.microsoft.com/office/drawing/2014/main" id="{E4BD00C3-AD29-1848-B72C-ABB297C80A44}"/>
               </a:ext>
             </a:extLst>
           </p:cNvPr>
@@ -16340,7 +16342,7 @@
           <p:cNvPr id="67" name="Picture 66">
             <a:extLst>
               <a:ext uri="{FF2B5EF4-FFF2-40B4-BE49-F238E27FC236}">
-                <a16:creationId xmlns:a16="http://schemas.microsoft.com/office/drawing/2014/main" xmlns="" id="{2CBB9EC6-1F4D-A544-B955-509A162728C6}"/>
+                <a16:creationId xmlns:a16="http://schemas.microsoft.com/office/drawing/2014/main" id="{2CBB9EC6-1F4D-A544-B955-509A162728C6}"/>
               </a:ext>
             </a:extLst>
           </p:cNvPr>
@@ -16376,7 +16378,7 @@
           <p:cNvPr id="116" name="Straight Connector 115">
             <a:extLst>
               <a:ext uri="{FF2B5EF4-FFF2-40B4-BE49-F238E27FC236}">
-                <a16:creationId xmlns:a16="http://schemas.microsoft.com/office/drawing/2014/main" xmlns="" id="{5DA5D267-4395-9C48-8B25-87844AB53687}"/>
+                <a16:creationId xmlns:a16="http://schemas.microsoft.com/office/drawing/2014/main" id="{5DA5D267-4395-9C48-8B25-87844AB53687}"/>
               </a:ext>
             </a:extLst>
           </p:cNvPr>
@@ -16423,7 +16425,7 @@
           <p:cNvPr id="119" name="TextBox 118">
             <a:extLst>
               <a:ext uri="{FF2B5EF4-FFF2-40B4-BE49-F238E27FC236}">
-                <a16:creationId xmlns:a16="http://schemas.microsoft.com/office/drawing/2014/main" xmlns="" id="{2A942E01-9F5A-F646-B3ED-A608F871CF24}"/>
+                <a16:creationId xmlns:a16="http://schemas.microsoft.com/office/drawing/2014/main" id="{2A942E01-9F5A-F646-B3ED-A608F871CF24}"/>
               </a:ext>
             </a:extLst>
           </p:cNvPr>
@@ -16504,7 +16506,7 @@
           <p:cNvPr id="79" name="Picture 78">
             <a:extLst>
               <a:ext uri="{FF2B5EF4-FFF2-40B4-BE49-F238E27FC236}">
-                <a16:creationId xmlns:a16="http://schemas.microsoft.com/office/drawing/2014/main" xmlns="" id="{702BB94C-F70C-5E4B-94D9-B69FE9F302C8}"/>
+                <a16:creationId xmlns:a16="http://schemas.microsoft.com/office/drawing/2014/main" id="{702BB94C-F70C-5E4B-94D9-B69FE9F302C8}"/>
               </a:ext>
             </a:extLst>
           </p:cNvPr>
@@ -16540,7 +16542,7 @@
           <p:cNvPr id="131" name="Straight Connector 130">
             <a:extLst>
               <a:ext uri="{FF2B5EF4-FFF2-40B4-BE49-F238E27FC236}">
-                <a16:creationId xmlns:a16="http://schemas.microsoft.com/office/drawing/2014/main" xmlns="" id="{EA8E957C-3AA4-2547-B191-BA32AA3F3AF2}"/>
+                <a16:creationId xmlns:a16="http://schemas.microsoft.com/office/drawing/2014/main" id="{EA8E957C-3AA4-2547-B191-BA32AA3F3AF2}"/>
               </a:ext>
             </a:extLst>
           </p:cNvPr>
@@ -16588,7 +16590,7 @@
           <p:cNvPr id="134" name="Straight Connector 133">
             <a:extLst>
               <a:ext uri="{FF2B5EF4-FFF2-40B4-BE49-F238E27FC236}">
-                <a16:creationId xmlns:a16="http://schemas.microsoft.com/office/drawing/2014/main" xmlns="" id="{5BE986ED-64D7-A046-BE28-021C8C920B48}"/>
+                <a16:creationId xmlns:a16="http://schemas.microsoft.com/office/drawing/2014/main" id="{5BE986ED-64D7-A046-BE28-021C8C920B48}"/>
               </a:ext>
             </a:extLst>
           </p:cNvPr>
@@ -16636,7 +16638,7 @@
           <p:cNvPr id="138" name="Straight Connector 137">
             <a:extLst>
               <a:ext uri="{FF2B5EF4-FFF2-40B4-BE49-F238E27FC236}">
-                <a16:creationId xmlns:a16="http://schemas.microsoft.com/office/drawing/2014/main" xmlns="" id="{8E1453EF-7DB3-E54F-9665-9C837DE98445}"/>
+                <a16:creationId xmlns:a16="http://schemas.microsoft.com/office/drawing/2014/main" id="{8E1453EF-7DB3-E54F-9665-9C837DE98445}"/>
               </a:ext>
             </a:extLst>
           </p:cNvPr>
@@ -16683,7 +16685,7 @@
           <p:cNvPr id="144" name="TextBox 143">
             <a:extLst>
               <a:ext uri="{FF2B5EF4-FFF2-40B4-BE49-F238E27FC236}">
-                <a16:creationId xmlns:a16="http://schemas.microsoft.com/office/drawing/2014/main" xmlns="" id="{F20B3218-9CCE-2145-9963-A12E6849F8D1}"/>
+                <a16:creationId xmlns:a16="http://schemas.microsoft.com/office/drawing/2014/main" id="{F20B3218-9CCE-2145-9963-A12E6849F8D1}"/>
               </a:ext>
             </a:extLst>
           </p:cNvPr>
@@ -16764,7 +16766,7 @@
           <p:cNvPr id="2" name="Rectangle 1">
             <a:extLst>
               <a:ext uri="{FF2B5EF4-FFF2-40B4-BE49-F238E27FC236}">
-                <a16:creationId xmlns:a16="http://schemas.microsoft.com/office/drawing/2014/main" xmlns="" id="{457F0C94-1AA0-1142-B814-A0B56C12F7AE}"/>
+                <a16:creationId xmlns:a16="http://schemas.microsoft.com/office/drawing/2014/main" id="{457F0C94-1AA0-1142-B814-A0B56C12F7AE}"/>
               </a:ext>
             </a:extLst>
           </p:cNvPr>
@@ -16805,7 +16807,7 @@
           <p:cNvPr id="3" name="Rounded Rectangular Callout 2">
             <a:extLst>
               <a:ext uri="{FF2B5EF4-FFF2-40B4-BE49-F238E27FC236}">
-                <a16:creationId xmlns:a16="http://schemas.microsoft.com/office/drawing/2014/main" xmlns="" id="{63DAE306-87BE-DC43-AD20-7EEF4394EF2D}"/>
+                <a16:creationId xmlns:a16="http://schemas.microsoft.com/office/drawing/2014/main" id="{63DAE306-87BE-DC43-AD20-7EEF4394EF2D}"/>
               </a:ext>
             </a:extLst>
           </p:cNvPr>
@@ -16852,7 +16854,7 @@
           <p:cNvPr id="4" name="TextBox 3">
             <a:extLst>
               <a:ext uri="{FF2B5EF4-FFF2-40B4-BE49-F238E27FC236}">
-                <a16:creationId xmlns:a16="http://schemas.microsoft.com/office/drawing/2014/main" xmlns="" id="{87A33B23-79D2-8C45-85BC-26BA3EBE5E09}"/>
+                <a16:creationId xmlns:a16="http://schemas.microsoft.com/office/drawing/2014/main" id="{87A33B23-79D2-8C45-85BC-26BA3EBE5E09}"/>
               </a:ext>
             </a:extLst>
           </p:cNvPr>
@@ -16933,7 +16935,7 @@
           <p:cNvPr id="63" name="TextBox 62">
             <a:extLst>
               <a:ext uri="{FF2B5EF4-FFF2-40B4-BE49-F238E27FC236}">
-                <a16:creationId xmlns:a16="http://schemas.microsoft.com/office/drawing/2014/main" xmlns="" id="{306CF3AF-E59E-8546-B957-80629FF6D5D6}"/>
+                <a16:creationId xmlns:a16="http://schemas.microsoft.com/office/drawing/2014/main" id="{306CF3AF-E59E-8546-B957-80629FF6D5D6}"/>
               </a:ext>
             </a:extLst>
           </p:cNvPr>
@@ -17014,7 +17016,7 @@
           <p:cNvPr id="65" name="TextBox 64">
             <a:extLst>
               <a:ext uri="{FF2B5EF4-FFF2-40B4-BE49-F238E27FC236}">
-                <a16:creationId xmlns:a16="http://schemas.microsoft.com/office/drawing/2014/main" xmlns="" id="{51EA37F3-23D9-7444-8208-BC61C81C897E}"/>
+                <a16:creationId xmlns:a16="http://schemas.microsoft.com/office/drawing/2014/main" id="{51EA37F3-23D9-7444-8208-BC61C81C897E}"/>
               </a:ext>
             </a:extLst>
           </p:cNvPr>
@@ -17095,7 +17097,7 @@
           <p:cNvPr id="66" name="TextBox 65">
             <a:extLst>
               <a:ext uri="{FF2B5EF4-FFF2-40B4-BE49-F238E27FC236}">
-                <a16:creationId xmlns:a16="http://schemas.microsoft.com/office/drawing/2014/main" xmlns="" id="{6C5C9E8F-6618-2548-8398-7834573A2827}"/>
+                <a16:creationId xmlns:a16="http://schemas.microsoft.com/office/drawing/2014/main" id="{6C5C9E8F-6618-2548-8398-7834573A2827}"/>
               </a:ext>
             </a:extLst>
           </p:cNvPr>
@@ -17181,7 +17183,7 @@
   <p:clrMapOvr>
     <a:masterClrMapping/>
   </p:clrMapOvr>
-  <p:transition xmlns:p14="http://schemas.microsoft.com/office/powerpoint/2010/main" spd="med"/>
+  <p:transition spd="med"/>
 </p:sld>
 </file>
 
@@ -17207,7 +17209,7 @@
           <p:cNvPr id="108" name="Rectangle 107">
             <a:extLst>
               <a:ext uri="{FF2B5EF4-FFF2-40B4-BE49-F238E27FC236}">
-                <a16:creationId xmlns:a16="http://schemas.microsoft.com/office/drawing/2014/main" xmlns="" id="{DD3A4E38-E7B5-F444-A041-B81D31F9BE1A}"/>
+                <a16:creationId xmlns:a16="http://schemas.microsoft.com/office/drawing/2014/main" id="{DD3A4E38-E7B5-F444-A041-B81D31F9BE1A}"/>
               </a:ext>
             </a:extLst>
           </p:cNvPr>
@@ -17252,7 +17254,7 @@
           <p:cNvPr id="141" name="Rectangle 140">
             <a:extLst>
               <a:ext uri="{FF2B5EF4-FFF2-40B4-BE49-F238E27FC236}">
-                <a16:creationId xmlns:a16="http://schemas.microsoft.com/office/drawing/2014/main" xmlns="" id="{3C097F3C-09AD-4C48-89F5-8F6682E2A9C7}"/>
+                <a16:creationId xmlns:a16="http://schemas.microsoft.com/office/drawing/2014/main" id="{3C097F3C-09AD-4C48-89F5-8F6682E2A9C7}"/>
               </a:ext>
             </a:extLst>
           </p:cNvPr>
@@ -17295,7 +17297,7 @@
           <p:cNvPr id="132" name="Rectangle 131">
             <a:extLst>
               <a:ext uri="{FF2B5EF4-FFF2-40B4-BE49-F238E27FC236}">
-                <a16:creationId xmlns:a16="http://schemas.microsoft.com/office/drawing/2014/main" xmlns="" id="{A4F70669-E49F-6042-AC95-A1CF22FC2F0E}"/>
+                <a16:creationId xmlns:a16="http://schemas.microsoft.com/office/drawing/2014/main" id="{A4F70669-E49F-6042-AC95-A1CF22FC2F0E}"/>
               </a:ext>
             </a:extLst>
           </p:cNvPr>
@@ -17338,7 +17340,7 @@
           <p:cNvPr id="46" name="Straight Connector 45">
             <a:extLst>
               <a:ext uri="{FF2B5EF4-FFF2-40B4-BE49-F238E27FC236}">
-                <a16:creationId xmlns:a16="http://schemas.microsoft.com/office/drawing/2014/main" xmlns="" id="{B3EF6D8D-E093-9C43-8F06-6465AF5A1A76}"/>
+                <a16:creationId xmlns:a16="http://schemas.microsoft.com/office/drawing/2014/main" id="{B3EF6D8D-E093-9C43-8F06-6465AF5A1A76}"/>
               </a:ext>
             </a:extLst>
           </p:cNvPr>
@@ -17387,7 +17389,7 @@
           <p:cNvPr id="105" name="Rectangle 104">
             <a:extLst>
               <a:ext uri="{FF2B5EF4-FFF2-40B4-BE49-F238E27FC236}">
-                <a16:creationId xmlns:a16="http://schemas.microsoft.com/office/drawing/2014/main" xmlns="" id="{416C123A-D118-B348-B68E-4541B0A407FB}"/>
+                <a16:creationId xmlns:a16="http://schemas.microsoft.com/office/drawing/2014/main" id="{416C123A-D118-B348-B68E-4541B0A407FB}"/>
               </a:ext>
             </a:extLst>
           </p:cNvPr>
@@ -17434,7 +17436,7 @@
           <p:cNvPr id="115" name="Straight Connector 114">
             <a:extLst>
               <a:ext uri="{FF2B5EF4-FFF2-40B4-BE49-F238E27FC236}">
-                <a16:creationId xmlns:a16="http://schemas.microsoft.com/office/drawing/2014/main" xmlns="" id="{8AC6BC2D-6C06-F541-9BC0-006845DF1EA7}"/>
+                <a16:creationId xmlns:a16="http://schemas.microsoft.com/office/drawing/2014/main" id="{8AC6BC2D-6C06-F541-9BC0-006845DF1EA7}"/>
               </a:ext>
             </a:extLst>
           </p:cNvPr>
@@ -17483,7 +17485,7 @@
           <p:cNvPr id="103" name="Rectangle 102">
             <a:extLst>
               <a:ext uri="{FF2B5EF4-FFF2-40B4-BE49-F238E27FC236}">
-                <a16:creationId xmlns:a16="http://schemas.microsoft.com/office/drawing/2014/main" xmlns="" id="{89D06888-A322-F944-B8CD-1354DB6E9863}"/>
+                <a16:creationId xmlns:a16="http://schemas.microsoft.com/office/drawing/2014/main" id="{89D06888-A322-F944-B8CD-1354DB6E9863}"/>
               </a:ext>
             </a:extLst>
           </p:cNvPr>
@@ -17526,7 +17528,7 @@
           <p:cNvPr id="97" name="Rectangle 96">
             <a:extLst>
               <a:ext uri="{FF2B5EF4-FFF2-40B4-BE49-F238E27FC236}">
-                <a16:creationId xmlns:a16="http://schemas.microsoft.com/office/drawing/2014/main" xmlns="" id="{C6F860F7-F7BF-E549-968B-81EB1B326379}"/>
+                <a16:creationId xmlns:a16="http://schemas.microsoft.com/office/drawing/2014/main" id="{C6F860F7-F7BF-E549-968B-81EB1B326379}"/>
               </a:ext>
             </a:extLst>
           </p:cNvPr>
@@ -17571,7 +17573,7 @@
           <p:cNvPr id="88" name="Rectangle 87">
             <a:extLst>
               <a:ext uri="{FF2B5EF4-FFF2-40B4-BE49-F238E27FC236}">
-                <a16:creationId xmlns:a16="http://schemas.microsoft.com/office/drawing/2014/main" xmlns="" id="{52568BAA-8263-FC4A-AB69-A9AE503EA338}"/>
+                <a16:creationId xmlns:a16="http://schemas.microsoft.com/office/drawing/2014/main" id="{52568BAA-8263-FC4A-AB69-A9AE503EA338}"/>
               </a:ext>
             </a:extLst>
           </p:cNvPr>
@@ -17640,7 +17642,7 @@
           <p:cNvPr id="47" name="Rectangle 46">
             <a:extLst>
               <a:ext uri="{FF2B5EF4-FFF2-40B4-BE49-F238E27FC236}">
-                <a16:creationId xmlns:a16="http://schemas.microsoft.com/office/drawing/2014/main" xmlns="" id="{962939E0-A05A-3A44-9ADE-6B594560263B}"/>
+                <a16:creationId xmlns:a16="http://schemas.microsoft.com/office/drawing/2014/main" id="{962939E0-A05A-3A44-9ADE-6B594560263B}"/>
               </a:ext>
             </a:extLst>
           </p:cNvPr>
@@ -17795,7 +17797,7 @@
             </a:ln>
             <a:extLst>
               <a:ext uri="{C572A759-6A51-4108-AA02-DFA0A04FC94B}">
-                <ma14:wrappingTextBoxFlag xmlns:ma14="http://schemas.microsoft.com/office/mac/drawingml/2011/main" val="1"/>
+                <ma14:wrappingTextBoxFlag xmlns:ma14="http://schemas.microsoft.com/office/mac/drawingml/2011/main" xmlns="" val="1"/>
               </a:ext>
             </a:extLst>
           </p:spPr>
@@ -18034,7 +18036,7 @@
           </a:ln>
           <a:extLst>
             <a:ext uri="{C572A759-6A51-4108-AA02-DFA0A04FC94B}">
-              <ma14:wrappingTextBoxFlag xmlns:ma14="http://schemas.microsoft.com/office/mac/drawingml/2011/main" val="1"/>
+              <ma14:wrappingTextBoxFlag xmlns:ma14="http://schemas.microsoft.com/office/mac/drawingml/2011/main" xmlns="" val="1"/>
             </a:ext>
           </a:extLst>
         </p:spPr>
@@ -18102,7 +18104,7 @@
           </a:ln>
           <a:extLst>
             <a:ext uri="{C572A759-6A51-4108-AA02-DFA0A04FC94B}">
-              <ma14:wrappingTextBoxFlag xmlns:ma14="http://schemas.microsoft.com/office/mac/drawingml/2011/main" val="1"/>
+              <ma14:wrappingTextBoxFlag xmlns:ma14="http://schemas.microsoft.com/office/mac/drawingml/2011/main" xmlns="" val="1"/>
             </a:ext>
           </a:extLst>
         </p:spPr>
@@ -18473,7 +18475,7 @@
             <a:effectLst/>
             <a:extLst>
               <a:ext uri="{C572A759-6A51-4108-AA02-DFA0A04FC94B}">
-                <ma14:wrappingTextBoxFlag xmlns:ma14="http://schemas.microsoft.com/office/mac/drawingml/2011/main" val="1"/>
+                <ma14:wrappingTextBoxFlag xmlns:ma14="http://schemas.microsoft.com/office/mac/drawingml/2011/main" xmlns="" val="1"/>
               </a:ext>
             </a:extLst>
           </p:spPr>
@@ -18564,7 +18566,7 @@
           <p:cNvPr id="188" name="Group 187">
             <a:extLst>
               <a:ext uri="{FF2B5EF4-FFF2-40B4-BE49-F238E27FC236}">
-                <a16:creationId xmlns:a16="http://schemas.microsoft.com/office/drawing/2014/main" xmlns="" id="{5938EDDB-B2B2-6642-9D20-6D7C5F9FED31}"/>
+                <a16:creationId xmlns:a16="http://schemas.microsoft.com/office/drawing/2014/main" id="{5938EDDB-B2B2-6642-9D20-6D7C5F9FED31}"/>
               </a:ext>
             </a:extLst>
           </p:cNvPr>
@@ -18584,7 +18586,7 @@
             <p:cNvPr id="189" name="Group 188">
               <a:extLst>
                 <a:ext uri="{FF2B5EF4-FFF2-40B4-BE49-F238E27FC236}">
-                  <a16:creationId xmlns:a16="http://schemas.microsoft.com/office/drawing/2014/main" xmlns="" id="{3527AD53-90A2-7D45-A4B7-509C2FD1C32F}"/>
+                  <a16:creationId xmlns:a16="http://schemas.microsoft.com/office/drawing/2014/main" id="{3527AD53-90A2-7D45-A4B7-509C2FD1C32F}"/>
                 </a:ext>
               </a:extLst>
             </p:cNvPr>
@@ -18604,7 +18606,7 @@
               <p:cNvPr id="191" name="Oval 190">
                 <a:extLst>
                   <a:ext uri="{FF2B5EF4-FFF2-40B4-BE49-F238E27FC236}">
-                    <a16:creationId xmlns:a16="http://schemas.microsoft.com/office/drawing/2014/main" xmlns="" id="{38BE8895-77F2-3F48-BDC0-E7E0559BA7AD}"/>
+                    <a16:creationId xmlns:a16="http://schemas.microsoft.com/office/drawing/2014/main" id="{38BE8895-77F2-3F48-BDC0-E7E0559BA7AD}"/>
                   </a:ext>
                 </a:extLst>
               </p:cNvPr>
@@ -18660,7 +18662,7 @@
               <p:cNvPr id="192" name="Picture 191">
                 <a:extLst>
                   <a:ext uri="{FF2B5EF4-FFF2-40B4-BE49-F238E27FC236}">
-                    <a16:creationId xmlns:a16="http://schemas.microsoft.com/office/drawing/2014/main" xmlns="" id="{1E774A8B-C5DB-534E-8EE3-5D936B2F1BDA}"/>
+                    <a16:creationId xmlns:a16="http://schemas.microsoft.com/office/drawing/2014/main" id="{1E774A8B-C5DB-534E-8EE3-5D936B2F1BDA}"/>
                   </a:ext>
                 </a:extLst>
               </p:cNvPr>
@@ -18697,7 +18699,7 @@
             <p:cNvPr id="190" name="Shape 576">
               <a:extLst>
                 <a:ext uri="{FF2B5EF4-FFF2-40B4-BE49-F238E27FC236}">
-                  <a16:creationId xmlns:a16="http://schemas.microsoft.com/office/drawing/2014/main" xmlns="" id="{8D66F62C-0857-0C4E-B8A3-3F8DBC721692}"/>
+                  <a16:creationId xmlns:a16="http://schemas.microsoft.com/office/drawing/2014/main" id="{8D66F62C-0857-0C4E-B8A3-3F8DBC721692}"/>
                 </a:ext>
               </a:extLst>
             </p:cNvPr>
@@ -18717,7 +18719,7 @@
             </a:ln>
             <a:extLst>
               <a:ext uri="{C572A759-6A51-4108-AA02-DFA0A04FC94B}">
-                <ma14:wrappingTextBoxFlag xmlns:ma14="http://schemas.microsoft.com/office/mac/drawingml/2011/main" val="1"/>
+                <ma14:wrappingTextBoxFlag xmlns:ma14="http://schemas.microsoft.com/office/mac/drawingml/2011/main" xmlns="" val="1"/>
               </a:ext>
             </a:extLst>
           </p:spPr>
@@ -18930,7 +18932,7 @@
           </a:ln>
           <a:extLst>
             <a:ext uri="{C572A759-6A51-4108-AA02-DFA0A04FC94B}">
-              <ma14:wrappingTextBoxFlag xmlns:ma14="http://schemas.microsoft.com/office/mac/drawingml/2011/main" val="1"/>
+              <ma14:wrappingTextBoxFlag xmlns:ma14="http://schemas.microsoft.com/office/mac/drawingml/2011/main" xmlns="" val="1"/>
             </a:ext>
           </a:extLst>
         </p:spPr>
@@ -19219,7 +19221,7 @@
           <p:cNvPr id="58" name="Picture 57">
             <a:extLst>
               <a:ext uri="{FF2B5EF4-FFF2-40B4-BE49-F238E27FC236}">
-                <a16:creationId xmlns:a16="http://schemas.microsoft.com/office/drawing/2014/main" xmlns="" id="{66E030FF-10BA-3E4A-9604-7ADABD19B5C7}"/>
+                <a16:creationId xmlns:a16="http://schemas.microsoft.com/office/drawing/2014/main" id="{66E030FF-10BA-3E4A-9604-7ADABD19B5C7}"/>
               </a:ext>
             </a:extLst>
           </p:cNvPr>
@@ -19249,7 +19251,7 @@
           <p:cNvPr id="64" name="Straight Connector 63">
             <a:extLst>
               <a:ext uri="{FF2B5EF4-FFF2-40B4-BE49-F238E27FC236}">
-                <a16:creationId xmlns:a16="http://schemas.microsoft.com/office/drawing/2014/main" xmlns="" id="{7A922166-BCEA-2342-A0C7-D9B6D48E76B5}"/>
+                <a16:creationId xmlns:a16="http://schemas.microsoft.com/office/drawing/2014/main" id="{7A922166-BCEA-2342-A0C7-D9B6D48E76B5}"/>
               </a:ext>
             </a:extLst>
           </p:cNvPr>
@@ -19298,7 +19300,7 @@
           <p:cNvPr id="83" name="Straight Connector 82">
             <a:extLst>
               <a:ext uri="{FF2B5EF4-FFF2-40B4-BE49-F238E27FC236}">
-                <a16:creationId xmlns:a16="http://schemas.microsoft.com/office/drawing/2014/main" xmlns="" id="{BA3AC09A-2568-7A40-8619-27C921ACE99B}"/>
+                <a16:creationId xmlns:a16="http://schemas.microsoft.com/office/drawing/2014/main" id="{BA3AC09A-2568-7A40-8619-27C921ACE99B}"/>
               </a:ext>
             </a:extLst>
           </p:cNvPr>
@@ -19346,7 +19348,7 @@
           <p:cNvPr id="100" name="TextBox 99">
             <a:extLst>
               <a:ext uri="{FF2B5EF4-FFF2-40B4-BE49-F238E27FC236}">
-                <a16:creationId xmlns:a16="http://schemas.microsoft.com/office/drawing/2014/main" xmlns="" id="{3C80F502-9384-CB47-BE5F-B15677F163F5}"/>
+                <a16:creationId xmlns:a16="http://schemas.microsoft.com/office/drawing/2014/main" id="{3C80F502-9384-CB47-BE5F-B15677F163F5}"/>
               </a:ext>
             </a:extLst>
           </p:cNvPr>
@@ -19427,7 +19429,7 @@
           <p:cNvPr id="102" name="TextBox 101">
             <a:extLst>
               <a:ext uri="{FF2B5EF4-FFF2-40B4-BE49-F238E27FC236}">
-                <a16:creationId xmlns:a16="http://schemas.microsoft.com/office/drawing/2014/main" xmlns="" id="{049DDE7D-2EFF-7541-B9F7-19BEEA5515BE}"/>
+                <a16:creationId xmlns:a16="http://schemas.microsoft.com/office/drawing/2014/main" id="{049DDE7D-2EFF-7541-B9F7-19BEEA5515BE}"/>
               </a:ext>
             </a:extLst>
           </p:cNvPr>
@@ -19508,7 +19510,7 @@
           <p:cNvPr id="107" name="TextBox 106">
             <a:extLst>
               <a:ext uri="{FF2B5EF4-FFF2-40B4-BE49-F238E27FC236}">
-                <a16:creationId xmlns:a16="http://schemas.microsoft.com/office/drawing/2014/main" xmlns="" id="{F073A3D8-220E-7144-A600-F0641A71F37F}"/>
+                <a16:creationId xmlns:a16="http://schemas.microsoft.com/office/drawing/2014/main" id="{F073A3D8-220E-7144-A600-F0641A71F37F}"/>
               </a:ext>
             </a:extLst>
           </p:cNvPr>
@@ -19589,7 +19591,7 @@
           <p:cNvPr id="109" name="TextBox 108">
             <a:extLst>
               <a:ext uri="{FF2B5EF4-FFF2-40B4-BE49-F238E27FC236}">
-                <a16:creationId xmlns:a16="http://schemas.microsoft.com/office/drawing/2014/main" xmlns="" id="{E4BD00C3-AD29-1848-B72C-ABB297C80A44}"/>
+                <a16:creationId xmlns:a16="http://schemas.microsoft.com/office/drawing/2014/main" id="{E4BD00C3-AD29-1848-B72C-ABB297C80A44}"/>
               </a:ext>
             </a:extLst>
           </p:cNvPr>
@@ -19671,7 +19673,7 @@
           <p:cNvPr id="67" name="Picture 66">
             <a:extLst>
               <a:ext uri="{FF2B5EF4-FFF2-40B4-BE49-F238E27FC236}">
-                <a16:creationId xmlns:a16="http://schemas.microsoft.com/office/drawing/2014/main" xmlns="" id="{2CBB9EC6-1F4D-A544-B955-509A162728C6}"/>
+                <a16:creationId xmlns:a16="http://schemas.microsoft.com/office/drawing/2014/main" id="{2CBB9EC6-1F4D-A544-B955-509A162728C6}"/>
               </a:ext>
             </a:extLst>
           </p:cNvPr>
@@ -19707,7 +19709,7 @@
           <p:cNvPr id="116" name="Straight Connector 115">
             <a:extLst>
               <a:ext uri="{FF2B5EF4-FFF2-40B4-BE49-F238E27FC236}">
-                <a16:creationId xmlns:a16="http://schemas.microsoft.com/office/drawing/2014/main" xmlns="" id="{5DA5D267-4395-9C48-8B25-87844AB53687}"/>
+                <a16:creationId xmlns:a16="http://schemas.microsoft.com/office/drawing/2014/main" id="{5DA5D267-4395-9C48-8B25-87844AB53687}"/>
               </a:ext>
             </a:extLst>
           </p:cNvPr>
@@ -19754,7 +19756,7 @@
           <p:cNvPr id="119" name="TextBox 118">
             <a:extLst>
               <a:ext uri="{FF2B5EF4-FFF2-40B4-BE49-F238E27FC236}">
-                <a16:creationId xmlns:a16="http://schemas.microsoft.com/office/drawing/2014/main" xmlns="" id="{2A942E01-9F5A-F646-B3ED-A608F871CF24}"/>
+                <a16:creationId xmlns:a16="http://schemas.microsoft.com/office/drawing/2014/main" id="{2A942E01-9F5A-F646-B3ED-A608F871CF24}"/>
               </a:ext>
             </a:extLst>
           </p:cNvPr>
@@ -19835,7 +19837,7 @@
           <p:cNvPr id="79" name="Picture 78">
             <a:extLst>
               <a:ext uri="{FF2B5EF4-FFF2-40B4-BE49-F238E27FC236}">
-                <a16:creationId xmlns:a16="http://schemas.microsoft.com/office/drawing/2014/main" xmlns="" id="{702BB94C-F70C-5E4B-94D9-B69FE9F302C8}"/>
+                <a16:creationId xmlns:a16="http://schemas.microsoft.com/office/drawing/2014/main" id="{702BB94C-F70C-5E4B-94D9-B69FE9F302C8}"/>
               </a:ext>
             </a:extLst>
           </p:cNvPr>
@@ -19871,7 +19873,7 @@
           <p:cNvPr id="131" name="Straight Connector 130">
             <a:extLst>
               <a:ext uri="{FF2B5EF4-FFF2-40B4-BE49-F238E27FC236}">
-                <a16:creationId xmlns:a16="http://schemas.microsoft.com/office/drawing/2014/main" xmlns="" id="{EA8E957C-3AA4-2547-B191-BA32AA3F3AF2}"/>
+                <a16:creationId xmlns:a16="http://schemas.microsoft.com/office/drawing/2014/main" id="{EA8E957C-3AA4-2547-B191-BA32AA3F3AF2}"/>
               </a:ext>
             </a:extLst>
           </p:cNvPr>
@@ -19919,7 +19921,7 @@
           <p:cNvPr id="134" name="Straight Connector 133">
             <a:extLst>
               <a:ext uri="{FF2B5EF4-FFF2-40B4-BE49-F238E27FC236}">
-                <a16:creationId xmlns:a16="http://schemas.microsoft.com/office/drawing/2014/main" xmlns="" id="{5BE986ED-64D7-A046-BE28-021C8C920B48}"/>
+                <a16:creationId xmlns:a16="http://schemas.microsoft.com/office/drawing/2014/main" id="{5BE986ED-64D7-A046-BE28-021C8C920B48}"/>
               </a:ext>
             </a:extLst>
           </p:cNvPr>
@@ -19967,7 +19969,7 @@
           <p:cNvPr id="138" name="Straight Connector 137">
             <a:extLst>
               <a:ext uri="{FF2B5EF4-FFF2-40B4-BE49-F238E27FC236}">
-                <a16:creationId xmlns:a16="http://schemas.microsoft.com/office/drawing/2014/main" xmlns="" id="{8E1453EF-7DB3-E54F-9665-9C837DE98445}"/>
+                <a16:creationId xmlns:a16="http://schemas.microsoft.com/office/drawing/2014/main" id="{8E1453EF-7DB3-E54F-9665-9C837DE98445}"/>
               </a:ext>
             </a:extLst>
           </p:cNvPr>
@@ -20014,7 +20016,7 @@
           <p:cNvPr id="144" name="TextBox 143">
             <a:extLst>
               <a:ext uri="{FF2B5EF4-FFF2-40B4-BE49-F238E27FC236}">
-                <a16:creationId xmlns:a16="http://schemas.microsoft.com/office/drawing/2014/main" xmlns="" id="{F20B3218-9CCE-2145-9963-A12E6849F8D1}"/>
+                <a16:creationId xmlns:a16="http://schemas.microsoft.com/office/drawing/2014/main" id="{F20B3218-9CCE-2145-9963-A12E6849F8D1}"/>
               </a:ext>
             </a:extLst>
           </p:cNvPr>
@@ -20095,7 +20097,7 @@
           <p:cNvPr id="2" name="Rectangle 1">
             <a:extLst>
               <a:ext uri="{FF2B5EF4-FFF2-40B4-BE49-F238E27FC236}">
-                <a16:creationId xmlns:a16="http://schemas.microsoft.com/office/drawing/2014/main" xmlns="" id="{457F0C94-1AA0-1142-B814-A0B56C12F7AE}"/>
+                <a16:creationId xmlns:a16="http://schemas.microsoft.com/office/drawing/2014/main" id="{457F0C94-1AA0-1142-B814-A0B56C12F7AE}"/>
               </a:ext>
             </a:extLst>
           </p:cNvPr>
@@ -20136,7 +20138,7 @@
           <p:cNvPr id="61" name="Rounded Rectangular Callout 60">
             <a:extLst>
               <a:ext uri="{FF2B5EF4-FFF2-40B4-BE49-F238E27FC236}">
-                <a16:creationId xmlns:a16="http://schemas.microsoft.com/office/drawing/2014/main" xmlns="" id="{D7E99A70-5439-BF45-8269-EEE528805121}"/>
+                <a16:creationId xmlns:a16="http://schemas.microsoft.com/office/drawing/2014/main" id="{D7E99A70-5439-BF45-8269-EEE528805121}"/>
               </a:ext>
             </a:extLst>
           </p:cNvPr>
@@ -20183,7 +20185,7 @@
           <p:cNvPr id="62" name="TextBox 61">
             <a:extLst>
               <a:ext uri="{FF2B5EF4-FFF2-40B4-BE49-F238E27FC236}">
-                <a16:creationId xmlns:a16="http://schemas.microsoft.com/office/drawing/2014/main" xmlns="" id="{B2FA279C-2389-314F-96A0-75C391BCED42}"/>
+                <a16:creationId xmlns:a16="http://schemas.microsoft.com/office/drawing/2014/main" id="{B2FA279C-2389-314F-96A0-75C391BCED42}"/>
               </a:ext>
             </a:extLst>
           </p:cNvPr>
@@ -20264,7 +20266,7 @@
           <p:cNvPr id="63" name="TextBox 62">
             <a:extLst>
               <a:ext uri="{FF2B5EF4-FFF2-40B4-BE49-F238E27FC236}">
-                <a16:creationId xmlns:a16="http://schemas.microsoft.com/office/drawing/2014/main" xmlns="" id="{B966C2C0-42A7-EB4F-A310-A4BBAE52C667}"/>
+                <a16:creationId xmlns:a16="http://schemas.microsoft.com/office/drawing/2014/main" id="{B966C2C0-42A7-EB4F-A310-A4BBAE52C667}"/>
               </a:ext>
             </a:extLst>
           </p:cNvPr>
@@ -20345,7 +20347,7 @@
           <p:cNvPr id="65" name="TextBox 64">
             <a:extLst>
               <a:ext uri="{FF2B5EF4-FFF2-40B4-BE49-F238E27FC236}">
-                <a16:creationId xmlns:a16="http://schemas.microsoft.com/office/drawing/2014/main" xmlns="" id="{1C0E4A92-BCD0-6041-8850-A0E492A35FB0}"/>
+                <a16:creationId xmlns:a16="http://schemas.microsoft.com/office/drawing/2014/main" id="{1C0E4A92-BCD0-6041-8850-A0E492A35FB0}"/>
               </a:ext>
             </a:extLst>
           </p:cNvPr>
@@ -20426,7 +20428,7 @@
           <p:cNvPr id="66" name="TextBox 65">
             <a:extLst>
               <a:ext uri="{FF2B5EF4-FFF2-40B4-BE49-F238E27FC236}">
-                <a16:creationId xmlns:a16="http://schemas.microsoft.com/office/drawing/2014/main" xmlns="" id="{42CA0D39-3AE2-874C-865B-36176AF42CCD}"/>
+                <a16:creationId xmlns:a16="http://schemas.microsoft.com/office/drawing/2014/main" id="{42CA0D39-3AE2-874C-865B-36176AF42CCD}"/>
               </a:ext>
             </a:extLst>
           </p:cNvPr>
@@ -20512,7 +20514,7 @@
   <p:clrMapOvr>
     <a:masterClrMapping/>
   </p:clrMapOvr>
-  <p:transition xmlns:p14="http://schemas.microsoft.com/office/powerpoint/2010/main" spd="med"/>
+  <p:transition spd="med"/>
 </p:sld>
 </file>
 
@@ -20538,7 +20540,7 @@
           <p:cNvPr id="108" name="Rectangle 107">
             <a:extLst>
               <a:ext uri="{FF2B5EF4-FFF2-40B4-BE49-F238E27FC236}">
-                <a16:creationId xmlns:a16="http://schemas.microsoft.com/office/drawing/2014/main" xmlns="" id="{DD3A4E38-E7B5-F444-A041-B81D31F9BE1A}"/>
+                <a16:creationId xmlns:a16="http://schemas.microsoft.com/office/drawing/2014/main" id="{DD3A4E38-E7B5-F444-A041-B81D31F9BE1A}"/>
               </a:ext>
             </a:extLst>
           </p:cNvPr>
@@ -20583,7 +20585,7 @@
           <p:cNvPr id="141" name="Rectangle 140">
             <a:extLst>
               <a:ext uri="{FF2B5EF4-FFF2-40B4-BE49-F238E27FC236}">
-                <a16:creationId xmlns:a16="http://schemas.microsoft.com/office/drawing/2014/main" xmlns="" id="{3C097F3C-09AD-4C48-89F5-8F6682E2A9C7}"/>
+                <a16:creationId xmlns:a16="http://schemas.microsoft.com/office/drawing/2014/main" id="{3C097F3C-09AD-4C48-89F5-8F6682E2A9C7}"/>
               </a:ext>
             </a:extLst>
           </p:cNvPr>
@@ -20626,7 +20628,7 @@
           <p:cNvPr id="132" name="Rectangle 131">
             <a:extLst>
               <a:ext uri="{FF2B5EF4-FFF2-40B4-BE49-F238E27FC236}">
-                <a16:creationId xmlns:a16="http://schemas.microsoft.com/office/drawing/2014/main" xmlns="" id="{A4F70669-E49F-6042-AC95-A1CF22FC2F0E}"/>
+                <a16:creationId xmlns:a16="http://schemas.microsoft.com/office/drawing/2014/main" id="{A4F70669-E49F-6042-AC95-A1CF22FC2F0E}"/>
               </a:ext>
             </a:extLst>
           </p:cNvPr>
@@ -20669,7 +20671,7 @@
           <p:cNvPr id="46" name="Straight Connector 45">
             <a:extLst>
               <a:ext uri="{FF2B5EF4-FFF2-40B4-BE49-F238E27FC236}">
-                <a16:creationId xmlns:a16="http://schemas.microsoft.com/office/drawing/2014/main" xmlns="" id="{B3EF6D8D-E093-9C43-8F06-6465AF5A1A76}"/>
+                <a16:creationId xmlns:a16="http://schemas.microsoft.com/office/drawing/2014/main" id="{B3EF6D8D-E093-9C43-8F06-6465AF5A1A76}"/>
               </a:ext>
             </a:extLst>
           </p:cNvPr>
@@ -20718,7 +20720,7 @@
           <p:cNvPr id="105" name="Rectangle 104">
             <a:extLst>
               <a:ext uri="{FF2B5EF4-FFF2-40B4-BE49-F238E27FC236}">
-                <a16:creationId xmlns:a16="http://schemas.microsoft.com/office/drawing/2014/main" xmlns="" id="{416C123A-D118-B348-B68E-4541B0A407FB}"/>
+                <a16:creationId xmlns:a16="http://schemas.microsoft.com/office/drawing/2014/main" id="{416C123A-D118-B348-B68E-4541B0A407FB}"/>
               </a:ext>
             </a:extLst>
           </p:cNvPr>
@@ -20765,7 +20767,7 @@
           <p:cNvPr id="115" name="Straight Connector 114">
             <a:extLst>
               <a:ext uri="{FF2B5EF4-FFF2-40B4-BE49-F238E27FC236}">
-                <a16:creationId xmlns:a16="http://schemas.microsoft.com/office/drawing/2014/main" xmlns="" id="{8AC6BC2D-6C06-F541-9BC0-006845DF1EA7}"/>
+                <a16:creationId xmlns:a16="http://schemas.microsoft.com/office/drawing/2014/main" id="{8AC6BC2D-6C06-F541-9BC0-006845DF1EA7}"/>
               </a:ext>
             </a:extLst>
           </p:cNvPr>
@@ -20814,7 +20816,7 @@
           <p:cNvPr id="103" name="Rectangle 102">
             <a:extLst>
               <a:ext uri="{FF2B5EF4-FFF2-40B4-BE49-F238E27FC236}">
-                <a16:creationId xmlns:a16="http://schemas.microsoft.com/office/drawing/2014/main" xmlns="" id="{89D06888-A322-F944-B8CD-1354DB6E9863}"/>
+                <a16:creationId xmlns:a16="http://schemas.microsoft.com/office/drawing/2014/main" id="{89D06888-A322-F944-B8CD-1354DB6E9863}"/>
               </a:ext>
             </a:extLst>
           </p:cNvPr>
@@ -20857,7 +20859,7 @@
           <p:cNvPr id="88" name="Rectangle 87">
             <a:extLst>
               <a:ext uri="{FF2B5EF4-FFF2-40B4-BE49-F238E27FC236}">
-                <a16:creationId xmlns:a16="http://schemas.microsoft.com/office/drawing/2014/main" xmlns="" id="{52568BAA-8263-FC4A-AB69-A9AE503EA338}"/>
+                <a16:creationId xmlns:a16="http://schemas.microsoft.com/office/drawing/2014/main" id="{52568BAA-8263-FC4A-AB69-A9AE503EA338}"/>
               </a:ext>
             </a:extLst>
           </p:cNvPr>
@@ -20926,7 +20928,7 @@
           <p:cNvPr id="47" name="Rectangle 46">
             <a:extLst>
               <a:ext uri="{FF2B5EF4-FFF2-40B4-BE49-F238E27FC236}">
-                <a16:creationId xmlns:a16="http://schemas.microsoft.com/office/drawing/2014/main" xmlns="" id="{962939E0-A05A-3A44-9ADE-6B594560263B}"/>
+                <a16:creationId xmlns:a16="http://schemas.microsoft.com/office/drawing/2014/main" id="{962939E0-A05A-3A44-9ADE-6B594560263B}"/>
               </a:ext>
             </a:extLst>
           </p:cNvPr>
@@ -21081,7 +21083,7 @@
             </a:ln>
             <a:extLst>
               <a:ext uri="{C572A759-6A51-4108-AA02-DFA0A04FC94B}">
-                <ma14:wrappingTextBoxFlag xmlns:ma14="http://schemas.microsoft.com/office/mac/drawingml/2011/main" val="1"/>
+                <ma14:wrappingTextBoxFlag xmlns:ma14="http://schemas.microsoft.com/office/mac/drawingml/2011/main" xmlns="" val="1"/>
               </a:ext>
             </a:extLst>
           </p:spPr>
@@ -21320,7 +21322,7 @@
           </a:ln>
           <a:extLst>
             <a:ext uri="{C572A759-6A51-4108-AA02-DFA0A04FC94B}">
-              <ma14:wrappingTextBoxFlag xmlns:ma14="http://schemas.microsoft.com/office/mac/drawingml/2011/main" val="1"/>
+              <ma14:wrappingTextBoxFlag xmlns:ma14="http://schemas.microsoft.com/office/mac/drawingml/2011/main" xmlns="" val="1"/>
             </a:ext>
           </a:extLst>
         </p:spPr>
@@ -21388,7 +21390,7 @@
           </a:ln>
           <a:extLst>
             <a:ext uri="{C572A759-6A51-4108-AA02-DFA0A04FC94B}">
-              <ma14:wrappingTextBoxFlag xmlns:ma14="http://schemas.microsoft.com/office/mac/drawingml/2011/main" val="1"/>
+              <ma14:wrappingTextBoxFlag xmlns:ma14="http://schemas.microsoft.com/office/mac/drawingml/2011/main" xmlns="" val="1"/>
             </a:ext>
           </a:extLst>
         </p:spPr>
@@ -21759,7 +21761,7 @@
             <a:effectLst/>
             <a:extLst>
               <a:ext uri="{C572A759-6A51-4108-AA02-DFA0A04FC94B}">
-                <ma14:wrappingTextBoxFlag xmlns:ma14="http://schemas.microsoft.com/office/mac/drawingml/2011/main" val="1"/>
+                <ma14:wrappingTextBoxFlag xmlns:ma14="http://schemas.microsoft.com/office/mac/drawingml/2011/main" xmlns="" val="1"/>
               </a:ext>
             </a:extLst>
           </p:spPr>
@@ -21850,7 +21852,7 @@
           <p:cNvPr id="188" name="Group 187">
             <a:extLst>
               <a:ext uri="{FF2B5EF4-FFF2-40B4-BE49-F238E27FC236}">
-                <a16:creationId xmlns:a16="http://schemas.microsoft.com/office/drawing/2014/main" xmlns="" id="{5938EDDB-B2B2-6642-9D20-6D7C5F9FED31}"/>
+                <a16:creationId xmlns:a16="http://schemas.microsoft.com/office/drawing/2014/main" id="{5938EDDB-B2B2-6642-9D20-6D7C5F9FED31}"/>
               </a:ext>
             </a:extLst>
           </p:cNvPr>
@@ -21870,7 +21872,7 @@
             <p:cNvPr id="189" name="Group 188">
               <a:extLst>
                 <a:ext uri="{FF2B5EF4-FFF2-40B4-BE49-F238E27FC236}">
-                  <a16:creationId xmlns:a16="http://schemas.microsoft.com/office/drawing/2014/main" xmlns="" id="{3527AD53-90A2-7D45-A4B7-509C2FD1C32F}"/>
+                  <a16:creationId xmlns:a16="http://schemas.microsoft.com/office/drawing/2014/main" id="{3527AD53-90A2-7D45-A4B7-509C2FD1C32F}"/>
                 </a:ext>
               </a:extLst>
             </p:cNvPr>
@@ -21890,7 +21892,7 @@
               <p:cNvPr id="191" name="Oval 190">
                 <a:extLst>
                   <a:ext uri="{FF2B5EF4-FFF2-40B4-BE49-F238E27FC236}">
-                    <a16:creationId xmlns:a16="http://schemas.microsoft.com/office/drawing/2014/main" xmlns="" id="{38BE8895-77F2-3F48-BDC0-E7E0559BA7AD}"/>
+                    <a16:creationId xmlns:a16="http://schemas.microsoft.com/office/drawing/2014/main" id="{38BE8895-77F2-3F48-BDC0-E7E0559BA7AD}"/>
                   </a:ext>
                 </a:extLst>
               </p:cNvPr>
@@ -21946,7 +21948,7 @@
               <p:cNvPr id="192" name="Picture 191">
                 <a:extLst>
                   <a:ext uri="{FF2B5EF4-FFF2-40B4-BE49-F238E27FC236}">
-                    <a16:creationId xmlns:a16="http://schemas.microsoft.com/office/drawing/2014/main" xmlns="" id="{1E774A8B-C5DB-534E-8EE3-5D936B2F1BDA}"/>
+                    <a16:creationId xmlns:a16="http://schemas.microsoft.com/office/drawing/2014/main" id="{1E774A8B-C5DB-534E-8EE3-5D936B2F1BDA}"/>
                   </a:ext>
                 </a:extLst>
               </p:cNvPr>
@@ -21983,7 +21985,7 @@
             <p:cNvPr id="190" name="Shape 576">
               <a:extLst>
                 <a:ext uri="{FF2B5EF4-FFF2-40B4-BE49-F238E27FC236}">
-                  <a16:creationId xmlns:a16="http://schemas.microsoft.com/office/drawing/2014/main" xmlns="" id="{8D66F62C-0857-0C4E-B8A3-3F8DBC721692}"/>
+                  <a16:creationId xmlns:a16="http://schemas.microsoft.com/office/drawing/2014/main" id="{8D66F62C-0857-0C4E-B8A3-3F8DBC721692}"/>
                 </a:ext>
               </a:extLst>
             </p:cNvPr>
@@ -22003,7 +22005,7 @@
             </a:ln>
             <a:extLst>
               <a:ext uri="{C572A759-6A51-4108-AA02-DFA0A04FC94B}">
-                <ma14:wrappingTextBoxFlag xmlns:ma14="http://schemas.microsoft.com/office/mac/drawingml/2011/main" val="1"/>
+                <ma14:wrappingTextBoxFlag xmlns:ma14="http://schemas.microsoft.com/office/mac/drawingml/2011/main" xmlns="" val="1"/>
               </a:ext>
             </a:extLst>
           </p:spPr>
@@ -22139,7 +22141,7 @@
           </a:ln>
           <a:extLst>
             <a:ext uri="{C572A759-6A51-4108-AA02-DFA0A04FC94B}">
-              <ma14:wrappingTextBoxFlag xmlns:ma14="http://schemas.microsoft.com/office/mac/drawingml/2011/main" val="1"/>
+              <ma14:wrappingTextBoxFlag xmlns:ma14="http://schemas.microsoft.com/office/mac/drawingml/2011/main" xmlns="" val="1"/>
             </a:ext>
           </a:extLst>
         </p:spPr>
@@ -22428,7 +22430,7 @@
           <p:cNvPr id="58" name="Picture 57">
             <a:extLst>
               <a:ext uri="{FF2B5EF4-FFF2-40B4-BE49-F238E27FC236}">
-                <a16:creationId xmlns:a16="http://schemas.microsoft.com/office/drawing/2014/main" xmlns="" id="{66E030FF-10BA-3E4A-9604-7ADABD19B5C7}"/>
+                <a16:creationId xmlns:a16="http://schemas.microsoft.com/office/drawing/2014/main" id="{66E030FF-10BA-3E4A-9604-7ADABD19B5C7}"/>
               </a:ext>
             </a:extLst>
           </p:cNvPr>
@@ -22458,7 +22460,7 @@
           <p:cNvPr id="64" name="Straight Connector 63">
             <a:extLst>
               <a:ext uri="{FF2B5EF4-FFF2-40B4-BE49-F238E27FC236}">
-                <a16:creationId xmlns:a16="http://schemas.microsoft.com/office/drawing/2014/main" xmlns="" id="{7A922166-BCEA-2342-A0C7-D9B6D48E76B5}"/>
+                <a16:creationId xmlns:a16="http://schemas.microsoft.com/office/drawing/2014/main" id="{7A922166-BCEA-2342-A0C7-D9B6D48E76B5}"/>
               </a:ext>
             </a:extLst>
           </p:cNvPr>
@@ -22506,7 +22508,7 @@
           <p:cNvPr id="102" name="TextBox 101">
             <a:extLst>
               <a:ext uri="{FF2B5EF4-FFF2-40B4-BE49-F238E27FC236}">
-                <a16:creationId xmlns:a16="http://schemas.microsoft.com/office/drawing/2014/main" xmlns="" id="{049DDE7D-2EFF-7541-B9F7-19BEEA5515BE}"/>
+                <a16:creationId xmlns:a16="http://schemas.microsoft.com/office/drawing/2014/main" id="{049DDE7D-2EFF-7541-B9F7-19BEEA5515BE}"/>
               </a:ext>
             </a:extLst>
           </p:cNvPr>
@@ -22587,7 +22589,7 @@
           <p:cNvPr id="107" name="TextBox 106">
             <a:extLst>
               <a:ext uri="{FF2B5EF4-FFF2-40B4-BE49-F238E27FC236}">
-                <a16:creationId xmlns:a16="http://schemas.microsoft.com/office/drawing/2014/main" xmlns="" id="{F073A3D8-220E-7144-A600-F0641A71F37F}"/>
+                <a16:creationId xmlns:a16="http://schemas.microsoft.com/office/drawing/2014/main" id="{F073A3D8-220E-7144-A600-F0641A71F37F}"/>
               </a:ext>
             </a:extLst>
           </p:cNvPr>
@@ -22668,7 +22670,7 @@
           <p:cNvPr id="109" name="TextBox 108">
             <a:extLst>
               <a:ext uri="{FF2B5EF4-FFF2-40B4-BE49-F238E27FC236}">
-                <a16:creationId xmlns:a16="http://schemas.microsoft.com/office/drawing/2014/main" xmlns="" id="{E4BD00C3-AD29-1848-B72C-ABB297C80A44}"/>
+                <a16:creationId xmlns:a16="http://schemas.microsoft.com/office/drawing/2014/main" id="{E4BD00C3-AD29-1848-B72C-ABB297C80A44}"/>
               </a:ext>
             </a:extLst>
           </p:cNvPr>
@@ -22750,7 +22752,7 @@
           <p:cNvPr id="67" name="Picture 66">
             <a:extLst>
               <a:ext uri="{FF2B5EF4-FFF2-40B4-BE49-F238E27FC236}">
-                <a16:creationId xmlns:a16="http://schemas.microsoft.com/office/drawing/2014/main" xmlns="" id="{2CBB9EC6-1F4D-A544-B955-509A162728C6}"/>
+                <a16:creationId xmlns:a16="http://schemas.microsoft.com/office/drawing/2014/main" id="{2CBB9EC6-1F4D-A544-B955-509A162728C6}"/>
               </a:ext>
             </a:extLst>
           </p:cNvPr>
@@ -22786,7 +22788,7 @@
           <p:cNvPr id="116" name="Straight Connector 115">
             <a:extLst>
               <a:ext uri="{FF2B5EF4-FFF2-40B4-BE49-F238E27FC236}">
-                <a16:creationId xmlns:a16="http://schemas.microsoft.com/office/drawing/2014/main" xmlns="" id="{5DA5D267-4395-9C48-8B25-87844AB53687}"/>
+                <a16:creationId xmlns:a16="http://schemas.microsoft.com/office/drawing/2014/main" id="{5DA5D267-4395-9C48-8B25-87844AB53687}"/>
               </a:ext>
             </a:extLst>
           </p:cNvPr>
@@ -22833,7 +22835,7 @@
           <p:cNvPr id="119" name="TextBox 118">
             <a:extLst>
               <a:ext uri="{FF2B5EF4-FFF2-40B4-BE49-F238E27FC236}">
-                <a16:creationId xmlns:a16="http://schemas.microsoft.com/office/drawing/2014/main" xmlns="" id="{2A942E01-9F5A-F646-B3ED-A608F871CF24}"/>
+                <a16:creationId xmlns:a16="http://schemas.microsoft.com/office/drawing/2014/main" id="{2A942E01-9F5A-F646-B3ED-A608F871CF24}"/>
               </a:ext>
             </a:extLst>
           </p:cNvPr>
@@ -22914,7 +22916,7 @@
           <p:cNvPr id="79" name="Picture 78">
             <a:extLst>
               <a:ext uri="{FF2B5EF4-FFF2-40B4-BE49-F238E27FC236}">
-                <a16:creationId xmlns:a16="http://schemas.microsoft.com/office/drawing/2014/main" xmlns="" id="{702BB94C-F70C-5E4B-94D9-B69FE9F302C8}"/>
+                <a16:creationId xmlns:a16="http://schemas.microsoft.com/office/drawing/2014/main" id="{702BB94C-F70C-5E4B-94D9-B69FE9F302C8}"/>
               </a:ext>
             </a:extLst>
           </p:cNvPr>
@@ -22950,7 +22952,7 @@
           <p:cNvPr id="131" name="Straight Connector 130">
             <a:extLst>
               <a:ext uri="{FF2B5EF4-FFF2-40B4-BE49-F238E27FC236}">
-                <a16:creationId xmlns:a16="http://schemas.microsoft.com/office/drawing/2014/main" xmlns="" id="{EA8E957C-3AA4-2547-B191-BA32AA3F3AF2}"/>
+                <a16:creationId xmlns:a16="http://schemas.microsoft.com/office/drawing/2014/main" id="{EA8E957C-3AA4-2547-B191-BA32AA3F3AF2}"/>
               </a:ext>
             </a:extLst>
           </p:cNvPr>
@@ -22998,7 +23000,7 @@
           <p:cNvPr id="134" name="Straight Connector 133">
             <a:extLst>
               <a:ext uri="{FF2B5EF4-FFF2-40B4-BE49-F238E27FC236}">
-                <a16:creationId xmlns:a16="http://schemas.microsoft.com/office/drawing/2014/main" xmlns="" id="{5BE986ED-64D7-A046-BE28-021C8C920B48}"/>
+                <a16:creationId xmlns:a16="http://schemas.microsoft.com/office/drawing/2014/main" id="{5BE986ED-64D7-A046-BE28-021C8C920B48}"/>
               </a:ext>
             </a:extLst>
           </p:cNvPr>
@@ -23046,7 +23048,7 @@
           <p:cNvPr id="138" name="Straight Connector 137">
             <a:extLst>
               <a:ext uri="{FF2B5EF4-FFF2-40B4-BE49-F238E27FC236}">
-                <a16:creationId xmlns:a16="http://schemas.microsoft.com/office/drawing/2014/main" xmlns="" id="{8E1453EF-7DB3-E54F-9665-9C837DE98445}"/>
+                <a16:creationId xmlns:a16="http://schemas.microsoft.com/office/drawing/2014/main" id="{8E1453EF-7DB3-E54F-9665-9C837DE98445}"/>
               </a:ext>
             </a:extLst>
           </p:cNvPr>
@@ -23093,7 +23095,7 @@
           <p:cNvPr id="4" name="TextBox 3">
             <a:extLst>
               <a:ext uri="{FF2B5EF4-FFF2-40B4-BE49-F238E27FC236}">
-                <a16:creationId xmlns:a16="http://schemas.microsoft.com/office/drawing/2014/main" xmlns="" id="{B36E56F0-CDF9-6644-BF16-C03BDAA1914C}"/>
+                <a16:creationId xmlns:a16="http://schemas.microsoft.com/office/drawing/2014/main" id="{B36E56F0-CDF9-6644-BF16-C03BDAA1914C}"/>
               </a:ext>
             </a:extLst>
           </p:cNvPr>
@@ -23174,7 +23176,7 @@
           <p:cNvPr id="62" name="Rectangle 61">
             <a:extLst>
               <a:ext uri="{FF2B5EF4-FFF2-40B4-BE49-F238E27FC236}">
-                <a16:creationId xmlns:a16="http://schemas.microsoft.com/office/drawing/2014/main" xmlns="" id="{500A7179-A62E-1F47-8EAE-B56A36D87A89}"/>
+                <a16:creationId xmlns:a16="http://schemas.microsoft.com/office/drawing/2014/main" id="{500A7179-A62E-1F47-8EAE-B56A36D87A89}"/>
               </a:ext>
             </a:extLst>
           </p:cNvPr>
@@ -23215,7 +23217,7 @@
           <p:cNvPr id="65" name="Rounded Rectangular Callout 64">
             <a:extLst>
               <a:ext uri="{FF2B5EF4-FFF2-40B4-BE49-F238E27FC236}">
-                <a16:creationId xmlns:a16="http://schemas.microsoft.com/office/drawing/2014/main" xmlns="" id="{C44345DB-F74B-FF42-9EB7-3CBE195CD4F8}"/>
+                <a16:creationId xmlns:a16="http://schemas.microsoft.com/office/drawing/2014/main" id="{C44345DB-F74B-FF42-9EB7-3CBE195CD4F8}"/>
               </a:ext>
             </a:extLst>
           </p:cNvPr>
@@ -23262,7 +23264,7 @@
           <p:cNvPr id="66" name="TextBox 65">
             <a:extLst>
               <a:ext uri="{FF2B5EF4-FFF2-40B4-BE49-F238E27FC236}">
-                <a16:creationId xmlns:a16="http://schemas.microsoft.com/office/drawing/2014/main" xmlns="" id="{2267DF7E-8C5A-4C47-B0A9-0BB8AB712538}"/>
+                <a16:creationId xmlns:a16="http://schemas.microsoft.com/office/drawing/2014/main" id="{2267DF7E-8C5A-4C47-B0A9-0BB8AB712538}"/>
               </a:ext>
             </a:extLst>
           </p:cNvPr>
@@ -23343,7 +23345,7 @@
           <p:cNvPr id="68" name="TextBox 67">
             <a:extLst>
               <a:ext uri="{FF2B5EF4-FFF2-40B4-BE49-F238E27FC236}">
-                <a16:creationId xmlns:a16="http://schemas.microsoft.com/office/drawing/2014/main" xmlns="" id="{01979ACF-D7A0-5B4F-9ACA-94A20BC0BF3D}"/>
+                <a16:creationId xmlns:a16="http://schemas.microsoft.com/office/drawing/2014/main" id="{01979ACF-D7A0-5B4F-9ACA-94A20BC0BF3D}"/>
               </a:ext>
             </a:extLst>
           </p:cNvPr>
@@ -23424,7 +23426,7 @@
           <p:cNvPr id="69" name="TextBox 68">
             <a:extLst>
               <a:ext uri="{FF2B5EF4-FFF2-40B4-BE49-F238E27FC236}">
-                <a16:creationId xmlns:a16="http://schemas.microsoft.com/office/drawing/2014/main" xmlns="" id="{B657F783-5383-0846-8E9C-E3A00EDBA592}"/>
+                <a16:creationId xmlns:a16="http://schemas.microsoft.com/office/drawing/2014/main" id="{B657F783-5383-0846-8E9C-E3A00EDBA592}"/>
               </a:ext>
             </a:extLst>
           </p:cNvPr>
@@ -23505,7 +23507,7 @@
           <p:cNvPr id="70" name="TextBox 69">
             <a:extLst>
               <a:ext uri="{FF2B5EF4-FFF2-40B4-BE49-F238E27FC236}">
-                <a16:creationId xmlns:a16="http://schemas.microsoft.com/office/drawing/2014/main" xmlns="" id="{BA12F770-EC95-3649-832F-ADDDD75EEAAF}"/>
+                <a16:creationId xmlns:a16="http://schemas.microsoft.com/office/drawing/2014/main" id="{BA12F770-EC95-3649-832F-ADDDD75EEAAF}"/>
               </a:ext>
             </a:extLst>
           </p:cNvPr>
@@ -23591,7 +23593,7 @@
   <p:clrMapOvr>
     <a:masterClrMapping/>
   </p:clrMapOvr>
-  <p:transition xmlns:p14="http://schemas.microsoft.com/office/powerpoint/2010/main" spd="med"/>
+  <p:transition spd="med"/>
 </p:sld>
 </file>
 
@@ -23617,7 +23619,7 @@
           <p:cNvPr id="108" name="Rectangle 107">
             <a:extLst>
               <a:ext uri="{FF2B5EF4-FFF2-40B4-BE49-F238E27FC236}">
-                <a16:creationId xmlns:a16="http://schemas.microsoft.com/office/drawing/2014/main" xmlns="" id="{DD3A4E38-E7B5-F444-A041-B81D31F9BE1A}"/>
+                <a16:creationId xmlns:a16="http://schemas.microsoft.com/office/drawing/2014/main" id="{DD3A4E38-E7B5-F444-A041-B81D31F9BE1A}"/>
               </a:ext>
             </a:extLst>
           </p:cNvPr>
@@ -23662,7 +23664,7 @@
           <p:cNvPr id="141" name="Rectangle 140">
             <a:extLst>
               <a:ext uri="{FF2B5EF4-FFF2-40B4-BE49-F238E27FC236}">
-                <a16:creationId xmlns:a16="http://schemas.microsoft.com/office/drawing/2014/main" xmlns="" id="{3C097F3C-09AD-4C48-89F5-8F6682E2A9C7}"/>
+                <a16:creationId xmlns:a16="http://schemas.microsoft.com/office/drawing/2014/main" id="{3C097F3C-09AD-4C48-89F5-8F6682E2A9C7}"/>
               </a:ext>
             </a:extLst>
           </p:cNvPr>
@@ -23705,7 +23707,7 @@
           <p:cNvPr id="132" name="Rectangle 131">
             <a:extLst>
               <a:ext uri="{FF2B5EF4-FFF2-40B4-BE49-F238E27FC236}">
-                <a16:creationId xmlns:a16="http://schemas.microsoft.com/office/drawing/2014/main" xmlns="" id="{A4F70669-E49F-6042-AC95-A1CF22FC2F0E}"/>
+                <a16:creationId xmlns:a16="http://schemas.microsoft.com/office/drawing/2014/main" id="{A4F70669-E49F-6042-AC95-A1CF22FC2F0E}"/>
               </a:ext>
             </a:extLst>
           </p:cNvPr>
@@ -23748,7 +23750,7 @@
           <p:cNvPr id="46" name="Straight Connector 45">
             <a:extLst>
               <a:ext uri="{FF2B5EF4-FFF2-40B4-BE49-F238E27FC236}">
-                <a16:creationId xmlns:a16="http://schemas.microsoft.com/office/drawing/2014/main" xmlns="" id="{B3EF6D8D-E093-9C43-8F06-6465AF5A1A76}"/>
+                <a16:creationId xmlns:a16="http://schemas.microsoft.com/office/drawing/2014/main" id="{B3EF6D8D-E093-9C43-8F06-6465AF5A1A76}"/>
               </a:ext>
             </a:extLst>
           </p:cNvPr>
@@ -23797,7 +23799,7 @@
           <p:cNvPr id="105" name="Rectangle 104">
             <a:extLst>
               <a:ext uri="{FF2B5EF4-FFF2-40B4-BE49-F238E27FC236}">
-                <a16:creationId xmlns:a16="http://schemas.microsoft.com/office/drawing/2014/main" xmlns="" id="{416C123A-D118-B348-B68E-4541B0A407FB}"/>
+                <a16:creationId xmlns:a16="http://schemas.microsoft.com/office/drawing/2014/main" id="{416C123A-D118-B348-B68E-4541B0A407FB}"/>
               </a:ext>
             </a:extLst>
           </p:cNvPr>
@@ -23844,7 +23846,7 @@
           <p:cNvPr id="115" name="Straight Connector 114">
             <a:extLst>
               <a:ext uri="{FF2B5EF4-FFF2-40B4-BE49-F238E27FC236}">
-                <a16:creationId xmlns:a16="http://schemas.microsoft.com/office/drawing/2014/main" xmlns="" id="{8AC6BC2D-6C06-F541-9BC0-006845DF1EA7}"/>
+                <a16:creationId xmlns:a16="http://schemas.microsoft.com/office/drawing/2014/main" id="{8AC6BC2D-6C06-F541-9BC0-006845DF1EA7}"/>
               </a:ext>
             </a:extLst>
           </p:cNvPr>
@@ -23893,7 +23895,7 @@
           <p:cNvPr id="103" name="Rectangle 102">
             <a:extLst>
               <a:ext uri="{FF2B5EF4-FFF2-40B4-BE49-F238E27FC236}">
-                <a16:creationId xmlns:a16="http://schemas.microsoft.com/office/drawing/2014/main" xmlns="" id="{89D06888-A322-F944-B8CD-1354DB6E9863}"/>
+                <a16:creationId xmlns:a16="http://schemas.microsoft.com/office/drawing/2014/main" id="{89D06888-A322-F944-B8CD-1354DB6E9863}"/>
               </a:ext>
             </a:extLst>
           </p:cNvPr>
@@ -23936,7 +23938,7 @@
           <p:cNvPr id="97" name="Rectangle 96">
             <a:extLst>
               <a:ext uri="{FF2B5EF4-FFF2-40B4-BE49-F238E27FC236}">
-                <a16:creationId xmlns:a16="http://schemas.microsoft.com/office/drawing/2014/main" xmlns="" id="{C6F860F7-F7BF-E549-968B-81EB1B326379}"/>
+                <a16:creationId xmlns:a16="http://schemas.microsoft.com/office/drawing/2014/main" id="{C6F860F7-F7BF-E549-968B-81EB1B326379}"/>
               </a:ext>
             </a:extLst>
           </p:cNvPr>
@@ -23981,7 +23983,7 @@
           <p:cNvPr id="88" name="Rectangle 87">
             <a:extLst>
               <a:ext uri="{FF2B5EF4-FFF2-40B4-BE49-F238E27FC236}">
-                <a16:creationId xmlns:a16="http://schemas.microsoft.com/office/drawing/2014/main" xmlns="" id="{52568BAA-8263-FC4A-AB69-A9AE503EA338}"/>
+                <a16:creationId xmlns:a16="http://schemas.microsoft.com/office/drawing/2014/main" id="{52568BAA-8263-FC4A-AB69-A9AE503EA338}"/>
               </a:ext>
             </a:extLst>
           </p:cNvPr>
@@ -24050,7 +24052,7 @@
           <p:cNvPr id="47" name="Rectangle 46">
             <a:extLst>
               <a:ext uri="{FF2B5EF4-FFF2-40B4-BE49-F238E27FC236}">
-                <a16:creationId xmlns:a16="http://schemas.microsoft.com/office/drawing/2014/main" xmlns="" id="{962939E0-A05A-3A44-9ADE-6B594560263B}"/>
+                <a16:creationId xmlns:a16="http://schemas.microsoft.com/office/drawing/2014/main" id="{962939E0-A05A-3A44-9ADE-6B594560263B}"/>
               </a:ext>
             </a:extLst>
           </p:cNvPr>
@@ -24205,7 +24207,7 @@
             </a:ln>
             <a:extLst>
               <a:ext uri="{C572A759-6A51-4108-AA02-DFA0A04FC94B}">
-                <ma14:wrappingTextBoxFlag xmlns:ma14="http://schemas.microsoft.com/office/mac/drawingml/2011/main" val="1"/>
+                <ma14:wrappingTextBoxFlag xmlns:ma14="http://schemas.microsoft.com/office/mac/drawingml/2011/main" xmlns="" val="1"/>
               </a:ext>
             </a:extLst>
           </p:spPr>
@@ -24444,7 +24446,7 @@
           </a:ln>
           <a:extLst>
             <a:ext uri="{C572A759-6A51-4108-AA02-DFA0A04FC94B}">
-              <ma14:wrappingTextBoxFlag xmlns:ma14="http://schemas.microsoft.com/office/mac/drawingml/2011/main" val="1"/>
+              <ma14:wrappingTextBoxFlag xmlns:ma14="http://schemas.microsoft.com/office/mac/drawingml/2011/main" xmlns="" val="1"/>
             </a:ext>
           </a:extLst>
         </p:spPr>
@@ -24512,7 +24514,7 @@
           </a:ln>
           <a:extLst>
             <a:ext uri="{C572A759-6A51-4108-AA02-DFA0A04FC94B}">
-              <ma14:wrappingTextBoxFlag xmlns:ma14="http://schemas.microsoft.com/office/mac/drawingml/2011/main" val="1"/>
+              <ma14:wrappingTextBoxFlag xmlns:ma14="http://schemas.microsoft.com/office/mac/drawingml/2011/main" xmlns="" val="1"/>
             </a:ext>
           </a:extLst>
         </p:spPr>
@@ -24883,7 +24885,7 @@
             <a:effectLst/>
             <a:extLst>
               <a:ext uri="{C572A759-6A51-4108-AA02-DFA0A04FC94B}">
-                <ma14:wrappingTextBoxFlag xmlns:ma14="http://schemas.microsoft.com/office/mac/drawingml/2011/main" val="1"/>
+                <ma14:wrappingTextBoxFlag xmlns:ma14="http://schemas.microsoft.com/office/mac/drawingml/2011/main" xmlns="" val="1"/>
               </a:ext>
             </a:extLst>
           </p:spPr>
@@ -24974,7 +24976,7 @@
           <p:cNvPr id="188" name="Group 187">
             <a:extLst>
               <a:ext uri="{FF2B5EF4-FFF2-40B4-BE49-F238E27FC236}">
-                <a16:creationId xmlns:a16="http://schemas.microsoft.com/office/drawing/2014/main" xmlns="" id="{5938EDDB-B2B2-6642-9D20-6D7C5F9FED31}"/>
+                <a16:creationId xmlns:a16="http://schemas.microsoft.com/office/drawing/2014/main" id="{5938EDDB-B2B2-6642-9D20-6D7C5F9FED31}"/>
               </a:ext>
             </a:extLst>
           </p:cNvPr>
@@ -24994,7 +24996,7 @@
             <p:cNvPr id="189" name="Group 188">
               <a:extLst>
                 <a:ext uri="{FF2B5EF4-FFF2-40B4-BE49-F238E27FC236}">
-                  <a16:creationId xmlns:a16="http://schemas.microsoft.com/office/drawing/2014/main" xmlns="" id="{3527AD53-90A2-7D45-A4B7-509C2FD1C32F}"/>
+                  <a16:creationId xmlns:a16="http://schemas.microsoft.com/office/drawing/2014/main" id="{3527AD53-90A2-7D45-A4B7-509C2FD1C32F}"/>
                 </a:ext>
               </a:extLst>
             </p:cNvPr>
@@ -25014,7 +25016,7 @@
               <p:cNvPr id="191" name="Oval 190">
                 <a:extLst>
                   <a:ext uri="{FF2B5EF4-FFF2-40B4-BE49-F238E27FC236}">
-                    <a16:creationId xmlns:a16="http://schemas.microsoft.com/office/drawing/2014/main" xmlns="" id="{38BE8895-77F2-3F48-BDC0-E7E0559BA7AD}"/>
+                    <a16:creationId xmlns:a16="http://schemas.microsoft.com/office/drawing/2014/main" id="{38BE8895-77F2-3F48-BDC0-E7E0559BA7AD}"/>
                   </a:ext>
                 </a:extLst>
               </p:cNvPr>
@@ -25070,7 +25072,7 @@
               <p:cNvPr id="192" name="Picture 191">
                 <a:extLst>
                   <a:ext uri="{FF2B5EF4-FFF2-40B4-BE49-F238E27FC236}">
-                    <a16:creationId xmlns:a16="http://schemas.microsoft.com/office/drawing/2014/main" xmlns="" id="{1E774A8B-C5DB-534E-8EE3-5D936B2F1BDA}"/>
+                    <a16:creationId xmlns:a16="http://schemas.microsoft.com/office/drawing/2014/main" id="{1E774A8B-C5DB-534E-8EE3-5D936B2F1BDA}"/>
                   </a:ext>
                 </a:extLst>
               </p:cNvPr>
@@ -25107,7 +25109,7 @@
             <p:cNvPr id="190" name="Shape 576">
               <a:extLst>
                 <a:ext uri="{FF2B5EF4-FFF2-40B4-BE49-F238E27FC236}">
-                  <a16:creationId xmlns:a16="http://schemas.microsoft.com/office/drawing/2014/main" xmlns="" id="{8D66F62C-0857-0C4E-B8A3-3F8DBC721692}"/>
+                  <a16:creationId xmlns:a16="http://schemas.microsoft.com/office/drawing/2014/main" id="{8D66F62C-0857-0C4E-B8A3-3F8DBC721692}"/>
                 </a:ext>
               </a:extLst>
             </p:cNvPr>
@@ -25127,7 +25129,7 @@
             </a:ln>
             <a:extLst>
               <a:ext uri="{C572A759-6A51-4108-AA02-DFA0A04FC94B}">
-                <ma14:wrappingTextBoxFlag xmlns:ma14="http://schemas.microsoft.com/office/mac/drawingml/2011/main" val="1"/>
+                <ma14:wrappingTextBoxFlag xmlns:ma14="http://schemas.microsoft.com/office/mac/drawingml/2011/main" xmlns="" val="1"/>
               </a:ext>
             </a:extLst>
           </p:spPr>
@@ -25340,7 +25342,7 @@
           </a:ln>
           <a:extLst>
             <a:ext uri="{C572A759-6A51-4108-AA02-DFA0A04FC94B}">
-              <ma14:wrappingTextBoxFlag xmlns:ma14="http://schemas.microsoft.com/office/mac/drawingml/2011/main" val="1"/>
+              <ma14:wrappingTextBoxFlag xmlns:ma14="http://schemas.microsoft.com/office/mac/drawingml/2011/main" xmlns="" val="1"/>
             </a:ext>
           </a:extLst>
         </p:spPr>
@@ -25629,7 +25631,7 @@
           <p:cNvPr id="58" name="Picture 57">
             <a:extLst>
               <a:ext uri="{FF2B5EF4-FFF2-40B4-BE49-F238E27FC236}">
-                <a16:creationId xmlns:a16="http://schemas.microsoft.com/office/drawing/2014/main" xmlns="" id="{66E030FF-10BA-3E4A-9604-7ADABD19B5C7}"/>
+                <a16:creationId xmlns:a16="http://schemas.microsoft.com/office/drawing/2014/main" id="{66E030FF-10BA-3E4A-9604-7ADABD19B5C7}"/>
               </a:ext>
             </a:extLst>
           </p:cNvPr>
@@ -25659,7 +25661,7 @@
           <p:cNvPr id="64" name="Straight Connector 63">
             <a:extLst>
               <a:ext uri="{FF2B5EF4-FFF2-40B4-BE49-F238E27FC236}">
-                <a16:creationId xmlns:a16="http://schemas.microsoft.com/office/drawing/2014/main" xmlns="" id="{7A922166-BCEA-2342-A0C7-D9B6D48E76B5}"/>
+                <a16:creationId xmlns:a16="http://schemas.microsoft.com/office/drawing/2014/main" id="{7A922166-BCEA-2342-A0C7-D9B6D48E76B5}"/>
               </a:ext>
             </a:extLst>
           </p:cNvPr>
@@ -25708,7 +25710,7 @@
           <p:cNvPr id="83" name="Straight Connector 82">
             <a:extLst>
               <a:ext uri="{FF2B5EF4-FFF2-40B4-BE49-F238E27FC236}">
-                <a16:creationId xmlns:a16="http://schemas.microsoft.com/office/drawing/2014/main" xmlns="" id="{BA3AC09A-2568-7A40-8619-27C921ACE99B}"/>
+                <a16:creationId xmlns:a16="http://schemas.microsoft.com/office/drawing/2014/main" id="{BA3AC09A-2568-7A40-8619-27C921ACE99B}"/>
               </a:ext>
             </a:extLst>
           </p:cNvPr>
@@ -25756,7 +25758,7 @@
           <p:cNvPr id="100" name="TextBox 99">
             <a:extLst>
               <a:ext uri="{FF2B5EF4-FFF2-40B4-BE49-F238E27FC236}">
-                <a16:creationId xmlns:a16="http://schemas.microsoft.com/office/drawing/2014/main" xmlns="" id="{3C80F502-9384-CB47-BE5F-B15677F163F5}"/>
+                <a16:creationId xmlns:a16="http://schemas.microsoft.com/office/drawing/2014/main" id="{3C80F502-9384-CB47-BE5F-B15677F163F5}"/>
               </a:ext>
             </a:extLst>
           </p:cNvPr>
@@ -25837,7 +25839,7 @@
           <p:cNvPr id="102" name="TextBox 101">
             <a:extLst>
               <a:ext uri="{FF2B5EF4-FFF2-40B4-BE49-F238E27FC236}">
-                <a16:creationId xmlns:a16="http://schemas.microsoft.com/office/drawing/2014/main" xmlns="" id="{049DDE7D-2EFF-7541-B9F7-19BEEA5515BE}"/>
+                <a16:creationId xmlns:a16="http://schemas.microsoft.com/office/drawing/2014/main" id="{049DDE7D-2EFF-7541-B9F7-19BEEA5515BE}"/>
               </a:ext>
             </a:extLst>
           </p:cNvPr>
@@ -25918,7 +25920,7 @@
           <p:cNvPr id="107" name="TextBox 106">
             <a:extLst>
               <a:ext uri="{FF2B5EF4-FFF2-40B4-BE49-F238E27FC236}">
-                <a16:creationId xmlns:a16="http://schemas.microsoft.com/office/drawing/2014/main" xmlns="" id="{F073A3D8-220E-7144-A600-F0641A71F37F}"/>
+                <a16:creationId xmlns:a16="http://schemas.microsoft.com/office/drawing/2014/main" id="{F073A3D8-220E-7144-A600-F0641A71F37F}"/>
               </a:ext>
             </a:extLst>
           </p:cNvPr>
@@ -25999,7 +26001,7 @@
           <p:cNvPr id="109" name="TextBox 108">
             <a:extLst>
               <a:ext uri="{FF2B5EF4-FFF2-40B4-BE49-F238E27FC236}">
-                <a16:creationId xmlns:a16="http://schemas.microsoft.com/office/drawing/2014/main" xmlns="" id="{E4BD00C3-AD29-1848-B72C-ABB297C80A44}"/>
+                <a16:creationId xmlns:a16="http://schemas.microsoft.com/office/drawing/2014/main" id="{E4BD00C3-AD29-1848-B72C-ABB297C80A44}"/>
               </a:ext>
             </a:extLst>
           </p:cNvPr>
@@ -26081,7 +26083,7 @@
           <p:cNvPr id="67" name="Picture 66">
             <a:extLst>
               <a:ext uri="{FF2B5EF4-FFF2-40B4-BE49-F238E27FC236}">
-                <a16:creationId xmlns:a16="http://schemas.microsoft.com/office/drawing/2014/main" xmlns="" id="{2CBB9EC6-1F4D-A544-B955-509A162728C6}"/>
+                <a16:creationId xmlns:a16="http://schemas.microsoft.com/office/drawing/2014/main" id="{2CBB9EC6-1F4D-A544-B955-509A162728C6}"/>
               </a:ext>
             </a:extLst>
           </p:cNvPr>
@@ -26117,7 +26119,7 @@
           <p:cNvPr id="116" name="Straight Connector 115">
             <a:extLst>
               <a:ext uri="{FF2B5EF4-FFF2-40B4-BE49-F238E27FC236}">
-                <a16:creationId xmlns:a16="http://schemas.microsoft.com/office/drawing/2014/main" xmlns="" id="{5DA5D267-4395-9C48-8B25-87844AB53687}"/>
+                <a16:creationId xmlns:a16="http://schemas.microsoft.com/office/drawing/2014/main" id="{5DA5D267-4395-9C48-8B25-87844AB53687}"/>
               </a:ext>
             </a:extLst>
           </p:cNvPr>
@@ -26164,7 +26166,7 @@
           <p:cNvPr id="119" name="TextBox 118">
             <a:extLst>
               <a:ext uri="{FF2B5EF4-FFF2-40B4-BE49-F238E27FC236}">
-                <a16:creationId xmlns:a16="http://schemas.microsoft.com/office/drawing/2014/main" xmlns="" id="{2A942E01-9F5A-F646-B3ED-A608F871CF24}"/>
+                <a16:creationId xmlns:a16="http://schemas.microsoft.com/office/drawing/2014/main" id="{2A942E01-9F5A-F646-B3ED-A608F871CF24}"/>
               </a:ext>
             </a:extLst>
           </p:cNvPr>
@@ -26245,7 +26247,7 @@
           <p:cNvPr id="79" name="Picture 78">
             <a:extLst>
               <a:ext uri="{FF2B5EF4-FFF2-40B4-BE49-F238E27FC236}">
-                <a16:creationId xmlns:a16="http://schemas.microsoft.com/office/drawing/2014/main" xmlns="" id="{702BB94C-F70C-5E4B-94D9-B69FE9F302C8}"/>
+                <a16:creationId xmlns:a16="http://schemas.microsoft.com/office/drawing/2014/main" id="{702BB94C-F70C-5E4B-94D9-B69FE9F302C8}"/>
               </a:ext>
             </a:extLst>
           </p:cNvPr>
@@ -26281,7 +26283,7 @@
           <p:cNvPr id="131" name="Straight Connector 130">
             <a:extLst>
               <a:ext uri="{FF2B5EF4-FFF2-40B4-BE49-F238E27FC236}">
-                <a16:creationId xmlns:a16="http://schemas.microsoft.com/office/drawing/2014/main" xmlns="" id="{EA8E957C-3AA4-2547-B191-BA32AA3F3AF2}"/>
+                <a16:creationId xmlns:a16="http://schemas.microsoft.com/office/drawing/2014/main" id="{EA8E957C-3AA4-2547-B191-BA32AA3F3AF2}"/>
               </a:ext>
             </a:extLst>
           </p:cNvPr>
@@ -26329,7 +26331,7 @@
           <p:cNvPr id="134" name="Straight Connector 133">
             <a:extLst>
               <a:ext uri="{FF2B5EF4-FFF2-40B4-BE49-F238E27FC236}">
-                <a16:creationId xmlns:a16="http://schemas.microsoft.com/office/drawing/2014/main" xmlns="" id="{5BE986ED-64D7-A046-BE28-021C8C920B48}"/>
+                <a16:creationId xmlns:a16="http://schemas.microsoft.com/office/drawing/2014/main" id="{5BE986ED-64D7-A046-BE28-021C8C920B48}"/>
               </a:ext>
             </a:extLst>
           </p:cNvPr>
@@ -26377,7 +26379,7 @@
           <p:cNvPr id="138" name="Straight Connector 137">
             <a:extLst>
               <a:ext uri="{FF2B5EF4-FFF2-40B4-BE49-F238E27FC236}">
-                <a16:creationId xmlns:a16="http://schemas.microsoft.com/office/drawing/2014/main" xmlns="" id="{8E1453EF-7DB3-E54F-9665-9C837DE98445}"/>
+                <a16:creationId xmlns:a16="http://schemas.microsoft.com/office/drawing/2014/main" id="{8E1453EF-7DB3-E54F-9665-9C837DE98445}"/>
               </a:ext>
             </a:extLst>
           </p:cNvPr>
@@ -26424,7 +26426,7 @@
           <p:cNvPr id="144" name="TextBox 143">
             <a:extLst>
               <a:ext uri="{FF2B5EF4-FFF2-40B4-BE49-F238E27FC236}">
-                <a16:creationId xmlns:a16="http://schemas.microsoft.com/office/drawing/2014/main" xmlns="" id="{F20B3218-9CCE-2145-9963-A12E6849F8D1}"/>
+                <a16:creationId xmlns:a16="http://schemas.microsoft.com/office/drawing/2014/main" id="{F20B3218-9CCE-2145-9963-A12E6849F8D1}"/>
               </a:ext>
             </a:extLst>
           </p:cNvPr>
@@ -26505,7 +26507,7 @@
           <p:cNvPr id="2" name="Rectangle 1">
             <a:extLst>
               <a:ext uri="{FF2B5EF4-FFF2-40B4-BE49-F238E27FC236}">
-                <a16:creationId xmlns:a16="http://schemas.microsoft.com/office/drawing/2014/main" xmlns="" id="{457F0C94-1AA0-1142-B814-A0B56C12F7AE}"/>
+                <a16:creationId xmlns:a16="http://schemas.microsoft.com/office/drawing/2014/main" id="{457F0C94-1AA0-1142-B814-A0B56C12F7AE}"/>
               </a:ext>
             </a:extLst>
           </p:cNvPr>
@@ -26546,7 +26548,7 @@
           <p:cNvPr id="61" name="Rounded Rectangular Callout 60">
             <a:extLst>
               <a:ext uri="{FF2B5EF4-FFF2-40B4-BE49-F238E27FC236}">
-                <a16:creationId xmlns:a16="http://schemas.microsoft.com/office/drawing/2014/main" xmlns="" id="{D7E99A70-5439-BF45-8269-EEE528805121}"/>
+                <a16:creationId xmlns:a16="http://schemas.microsoft.com/office/drawing/2014/main" id="{D7E99A70-5439-BF45-8269-EEE528805121}"/>
               </a:ext>
             </a:extLst>
           </p:cNvPr>
@@ -26593,7 +26595,7 @@
           <p:cNvPr id="62" name="TextBox 61">
             <a:extLst>
               <a:ext uri="{FF2B5EF4-FFF2-40B4-BE49-F238E27FC236}">
-                <a16:creationId xmlns:a16="http://schemas.microsoft.com/office/drawing/2014/main" xmlns="" id="{B2FA279C-2389-314F-96A0-75C391BCED42}"/>
+                <a16:creationId xmlns:a16="http://schemas.microsoft.com/office/drawing/2014/main" id="{B2FA279C-2389-314F-96A0-75C391BCED42}"/>
               </a:ext>
             </a:extLst>
           </p:cNvPr>
@@ -26674,7 +26676,7 @@
           <p:cNvPr id="63" name="TextBox 62">
             <a:extLst>
               <a:ext uri="{FF2B5EF4-FFF2-40B4-BE49-F238E27FC236}">
-                <a16:creationId xmlns:a16="http://schemas.microsoft.com/office/drawing/2014/main" xmlns="" id="{CCC8B027-4074-C041-B567-8879BBEAE9F0}"/>
+                <a16:creationId xmlns:a16="http://schemas.microsoft.com/office/drawing/2014/main" id="{CCC8B027-4074-C041-B567-8879BBEAE9F0}"/>
               </a:ext>
             </a:extLst>
           </p:cNvPr>
@@ -26755,7 +26757,7 @@
           <p:cNvPr id="65" name="TextBox 64">
             <a:extLst>
               <a:ext uri="{FF2B5EF4-FFF2-40B4-BE49-F238E27FC236}">
-                <a16:creationId xmlns:a16="http://schemas.microsoft.com/office/drawing/2014/main" xmlns="" id="{E313D3AB-A03B-F44F-B0CC-29A68B6112F1}"/>
+                <a16:creationId xmlns:a16="http://schemas.microsoft.com/office/drawing/2014/main" id="{E313D3AB-A03B-F44F-B0CC-29A68B6112F1}"/>
               </a:ext>
             </a:extLst>
           </p:cNvPr>
@@ -26836,7 +26838,7 @@
           <p:cNvPr id="66" name="TextBox 65">
             <a:extLst>
               <a:ext uri="{FF2B5EF4-FFF2-40B4-BE49-F238E27FC236}">
-                <a16:creationId xmlns:a16="http://schemas.microsoft.com/office/drawing/2014/main" xmlns="" id="{A90B4428-252A-874A-A27C-612D5FC7102A}"/>
+                <a16:creationId xmlns:a16="http://schemas.microsoft.com/office/drawing/2014/main" id="{A90B4428-252A-874A-A27C-612D5FC7102A}"/>
               </a:ext>
             </a:extLst>
           </p:cNvPr>
@@ -26922,7 +26924,901 @@
   <p:clrMapOvr>
     <a:masterClrMapping/>
   </p:clrMapOvr>
-  <p:transition xmlns:p14="http://schemas.microsoft.com/office/powerpoint/2010/main" spd="med"/>
+  <p:transition spd="med"/>
+</p:sld>
+</file>
+
+<file path=ppt/slides/slide17.xml><?xml version="1.0" encoding="utf-8"?>
+<p:sld xmlns:a="http://schemas.openxmlformats.org/drawingml/2006/main" xmlns:r="http://schemas.openxmlformats.org/officeDocument/2006/relationships" xmlns:p="http://schemas.openxmlformats.org/presentationml/2006/main">
+  <p:cSld>
+    <p:spTree>
+      <p:nvGrpSpPr>
+        <p:cNvPr id="1" name=""/>
+        <p:cNvGrpSpPr/>
+        <p:nvPr/>
+      </p:nvGrpSpPr>
+      <p:grpSpPr>
+        <a:xfrm>
+          <a:off x="0" y="0"/>
+          <a:ext cx="0" cy="0"/>
+          <a:chOff x="0" y="0"/>
+          <a:chExt cx="0" cy="0"/>
+        </a:xfrm>
+      </p:grpSpPr>
+      <p:sp>
+        <p:nvSpPr>
+          <p:cNvPr id="2" name="TextBox 1">
+            <a:extLst>
+              <a:ext uri="{FF2B5EF4-FFF2-40B4-BE49-F238E27FC236}">
+                <a16:creationId xmlns:a16="http://schemas.microsoft.com/office/drawing/2014/main" id="{87C07FF8-CBD9-BE44-A19C-3A5A734DAEA8}"/>
+              </a:ext>
+            </a:extLst>
+          </p:cNvPr>
+          <p:cNvSpPr txBox="1"/>
+          <p:nvPr/>
+        </p:nvSpPr>
+        <p:spPr>
+          <a:xfrm>
+            <a:off x="2519300" y="3083578"/>
+            <a:ext cx="5019803" cy="1095010"/>
+          </a:xfrm>
+          <a:prstGeom prst="rect">
+            <a:avLst/>
+          </a:prstGeom>
+          <a:noFill/>
+          <a:ln w="3175" cap="flat">
+            <a:noFill/>
+            <a:miter lim="400000"/>
+          </a:ln>
+          <a:effectLst/>
+        </p:spPr>
+        <p:style>
+          <a:lnRef idx="0">
+            <a:scrgbClr r="0" g="0" b="0"/>
+          </a:lnRef>
+          <a:fillRef idx="0">
+            <a:scrgbClr r="0" g="0" b="0"/>
+          </a:fillRef>
+          <a:effectRef idx="0">
+            <a:scrgbClr r="0" g="0" b="0"/>
+          </a:effectRef>
+          <a:fontRef idx="none"/>
+        </p:style>
+        <p:txBody>
+          <a:bodyPr rot="0" spcFirstLastPara="1" vertOverflow="overflow" horzOverflow="overflow" vert="horz" wrap="none" lIns="39290" tIns="39290" rIns="39290" bIns="39290" numCol="1" spcCol="38100" rtlCol="0" anchor="ctr">
+            <a:spAutoFit/>
+          </a:bodyPr>
+          <a:lstStyle/>
+          <a:p>
+            <a:pPr marL="0" marR="0" indent="0" algn="ctr" defTabSz="584200" rtl="0" fontAlgn="auto" latinLnBrk="1" hangingPunct="0">
+              <a:lnSpc>
+                <a:spcPct val="100000"/>
+              </a:lnSpc>
+              <a:spcBef>
+                <a:spcPts val="0"/>
+              </a:spcBef>
+              <a:spcAft>
+                <a:spcPts val="0"/>
+              </a:spcAft>
+              <a:buClrTx/>
+              <a:buSzTx/>
+              <a:buFontTx/>
+              <a:buNone/>
+              <a:tabLst/>
+            </a:pPr>
+            <a:r>
+              <a:rPr kumimoji="0" lang="de-DE" sz="6600" b="0" i="0" u="none" strike="noStrike" cap="none" spc="0" normalizeH="0" baseline="0" dirty="0">
+                <a:ln>
+                  <a:noFill/>
+                </a:ln>
+                <a:solidFill>
+                  <a:srgbClr val="000000"/>
+                </a:solidFill>
+                <a:effectLst/>
+                <a:uFillTx/>
+                <a:latin typeface="+mn-lt"/>
+                <a:ea typeface="+mn-ea"/>
+                <a:cs typeface="+mn-cs"/>
+                <a:sym typeface="Helvetica Light"/>
+              </a:rPr>
+              <a:t>SCORES API</a:t>
+            </a:r>
+          </a:p>
+        </p:txBody>
+      </p:sp>
+    </p:spTree>
+    <p:extLst>
+      <p:ext uri="{BB962C8B-B14F-4D97-AF65-F5344CB8AC3E}">
+        <p14:creationId xmlns:p14="http://schemas.microsoft.com/office/powerpoint/2010/main" val="413445721"/>
+      </p:ext>
+    </p:extLst>
+  </p:cSld>
+  <p:clrMapOvr>
+    <a:masterClrMapping/>
+  </p:clrMapOvr>
+  <p:transition spd="med"/>
+</p:sld>
+</file>
+
+<file path=ppt/slides/slide18.xml><?xml version="1.0" encoding="utf-8"?>
+<p:sld xmlns:a="http://schemas.openxmlformats.org/drawingml/2006/main" xmlns:r="http://schemas.openxmlformats.org/officeDocument/2006/relationships" xmlns:p="http://schemas.openxmlformats.org/presentationml/2006/main">
+  <p:cSld>
+    <p:spTree>
+      <p:nvGrpSpPr>
+        <p:cNvPr id="1" name=""/>
+        <p:cNvGrpSpPr/>
+        <p:nvPr/>
+      </p:nvGrpSpPr>
+      <p:grpSpPr>
+        <a:xfrm>
+          <a:off x="0" y="0"/>
+          <a:ext cx="0" cy="0"/>
+          <a:chOff x="0" y="0"/>
+          <a:chExt cx="0" cy="0"/>
+        </a:xfrm>
+      </p:grpSpPr>
+      <p:sp>
+        <p:nvSpPr>
+          <p:cNvPr id="2" name="TextBox 1">
+            <a:extLst>
+              <a:ext uri="{FF2B5EF4-FFF2-40B4-BE49-F238E27FC236}">
+                <a16:creationId xmlns:a16="http://schemas.microsoft.com/office/drawing/2014/main" id="{D02B0D28-6CA7-284D-960D-6AB0F1F43675}"/>
+              </a:ext>
+            </a:extLst>
+          </p:cNvPr>
+          <p:cNvSpPr txBox="1"/>
+          <p:nvPr/>
+        </p:nvSpPr>
+        <p:spPr>
+          <a:xfrm>
+            <a:off x="1556068" y="2584495"/>
+            <a:ext cx="2248525" cy="510235"/>
+          </a:xfrm>
+          <a:prstGeom prst="rect">
+            <a:avLst/>
+          </a:prstGeom>
+          <a:solidFill>
+            <a:schemeClr val="accent1">
+              <a:lumMod val="20000"/>
+              <a:lumOff val="80000"/>
+            </a:schemeClr>
+          </a:solidFill>
+          <a:ln w="3175" cap="flat">
+            <a:solidFill>
+              <a:schemeClr val="accent1"/>
+            </a:solidFill>
+            <a:miter lim="400000"/>
+          </a:ln>
+          <a:effectLst/>
+        </p:spPr>
+        <p:style>
+          <a:lnRef idx="0">
+            <a:scrgbClr r="0" g="0" b="0"/>
+          </a:lnRef>
+          <a:fillRef idx="0">
+            <a:scrgbClr r="0" g="0" b="0"/>
+          </a:fillRef>
+          <a:effectRef idx="0">
+            <a:scrgbClr r="0" g="0" b="0"/>
+          </a:effectRef>
+          <a:fontRef idx="none"/>
+        </p:style>
+        <p:txBody>
+          <a:bodyPr rot="0" spcFirstLastPara="1" vertOverflow="overflow" horzOverflow="overflow" vert="horz" wrap="square" lIns="39290" tIns="39290" rIns="39290" bIns="39290" numCol="1" spcCol="38100" rtlCol="0" anchor="ctr">
+            <a:spAutoFit/>
+          </a:bodyPr>
+          <a:lstStyle/>
+          <a:p>
+            <a:pPr marL="0" marR="0" indent="0" algn="ctr" defTabSz="584200" rtl="0" fontAlgn="auto" latinLnBrk="1" hangingPunct="0">
+              <a:lnSpc>
+                <a:spcPct val="100000"/>
+              </a:lnSpc>
+              <a:spcBef>
+                <a:spcPts val="0"/>
+              </a:spcBef>
+              <a:spcAft>
+                <a:spcPts val="0"/>
+              </a:spcAft>
+              <a:buClrTx/>
+              <a:buSzTx/>
+              <a:buFontTx/>
+              <a:buNone/>
+              <a:tabLst/>
+            </a:pPr>
+            <a:r>
+              <a:rPr kumimoji="0" lang="en-US" sz="2800" b="0" i="0" u="none" strike="noStrike" cap="none" spc="0" normalizeH="0" baseline="0" dirty="0">
+                <a:ln>
+                  <a:noFill/>
+                </a:ln>
+                <a:solidFill>
+                  <a:srgbClr val="000000"/>
+                </a:solidFill>
+                <a:effectLst/>
+                <a:uFillTx/>
+                <a:latin typeface="Arial" panose="020B0604020202020204" pitchFamily="34" charset="0"/>
+                <a:cs typeface="Arial" panose="020B0604020202020204" pitchFamily="34" charset="0"/>
+                <a:sym typeface="Helvetica Light"/>
+              </a:rPr>
+              <a:t>Catalog</a:t>
+            </a:r>
+          </a:p>
+        </p:txBody>
+      </p:sp>
+      <p:sp>
+        <p:nvSpPr>
+          <p:cNvPr id="3" name="TextBox 2">
+            <a:extLst>
+              <a:ext uri="{FF2B5EF4-FFF2-40B4-BE49-F238E27FC236}">
+                <a16:creationId xmlns:a16="http://schemas.microsoft.com/office/drawing/2014/main" id="{BC579910-9B59-4241-ADD8-EA21DC5380DB}"/>
+              </a:ext>
+            </a:extLst>
+          </p:cNvPr>
+          <p:cNvSpPr txBox="1"/>
+          <p:nvPr/>
+        </p:nvSpPr>
+        <p:spPr>
+          <a:xfrm>
+            <a:off x="1556069" y="3375965"/>
+            <a:ext cx="2248525" cy="510235"/>
+          </a:xfrm>
+          <a:prstGeom prst="rect">
+            <a:avLst/>
+          </a:prstGeom>
+          <a:solidFill>
+            <a:schemeClr val="accent1">
+              <a:lumMod val="20000"/>
+              <a:lumOff val="80000"/>
+            </a:schemeClr>
+          </a:solidFill>
+          <a:ln w="3175" cap="flat">
+            <a:solidFill>
+              <a:schemeClr val="accent1"/>
+            </a:solidFill>
+            <a:miter lim="400000"/>
+          </a:ln>
+          <a:effectLst/>
+        </p:spPr>
+        <p:style>
+          <a:lnRef idx="0">
+            <a:scrgbClr r="0" g="0" b="0"/>
+          </a:lnRef>
+          <a:fillRef idx="0">
+            <a:scrgbClr r="0" g="0" b="0"/>
+          </a:fillRef>
+          <a:effectRef idx="0">
+            <a:scrgbClr r="0" g="0" b="0"/>
+          </a:effectRef>
+          <a:fontRef idx="none"/>
+        </p:style>
+        <p:txBody>
+          <a:bodyPr rot="0" spcFirstLastPara="1" vertOverflow="overflow" horzOverflow="overflow" vert="horz" wrap="square" lIns="39290" tIns="39290" rIns="39290" bIns="39290" numCol="1" spcCol="38100" rtlCol="0" anchor="ctr">
+            <a:spAutoFit/>
+          </a:bodyPr>
+          <a:lstStyle/>
+          <a:p>
+            <a:pPr marL="0" marR="0" indent="0" algn="ctr" defTabSz="584200" rtl="0" fontAlgn="auto" latinLnBrk="1" hangingPunct="0">
+              <a:lnSpc>
+                <a:spcPct val="100000"/>
+              </a:lnSpc>
+              <a:spcBef>
+                <a:spcPts val="0"/>
+              </a:spcBef>
+              <a:spcAft>
+                <a:spcPts val="0"/>
+              </a:spcAft>
+              <a:buClrTx/>
+              <a:buSzTx/>
+              <a:buFontTx/>
+              <a:buNone/>
+              <a:tabLst/>
+            </a:pPr>
+            <a:r>
+              <a:rPr kumimoji="0" lang="en-US" sz="2800" b="0" i="0" u="none" strike="noStrike" cap="none" spc="0" normalizeH="0" baseline="0" dirty="0">
+                <a:ln>
+                  <a:noFill/>
+                </a:ln>
+                <a:solidFill>
+                  <a:srgbClr val="000000"/>
+                </a:solidFill>
+                <a:effectLst/>
+                <a:uFillTx/>
+                <a:latin typeface="Arial" panose="020B0604020202020204" pitchFamily="34" charset="0"/>
+                <a:cs typeface="Arial" panose="020B0604020202020204" pitchFamily="34" charset="0"/>
+                <a:sym typeface="Helvetica Light"/>
+              </a:rPr>
+              <a:t>Product</a:t>
+            </a:r>
+          </a:p>
+        </p:txBody>
+      </p:sp>
+      <p:sp>
+        <p:nvSpPr>
+          <p:cNvPr id="4" name="TextBox 3">
+            <a:extLst>
+              <a:ext uri="{FF2B5EF4-FFF2-40B4-BE49-F238E27FC236}">
+                <a16:creationId xmlns:a16="http://schemas.microsoft.com/office/drawing/2014/main" id="{47FE1031-25FA-9941-B441-4A18DB67457D}"/>
+              </a:ext>
+            </a:extLst>
+          </p:cNvPr>
+          <p:cNvSpPr txBox="1"/>
+          <p:nvPr/>
+        </p:nvSpPr>
+        <p:spPr>
+          <a:xfrm>
+            <a:off x="1556068" y="4167435"/>
+            <a:ext cx="2248525" cy="510235"/>
+          </a:xfrm>
+          <a:prstGeom prst="rect">
+            <a:avLst/>
+          </a:prstGeom>
+          <a:solidFill>
+            <a:schemeClr val="accent1">
+              <a:lumMod val="20000"/>
+              <a:lumOff val="80000"/>
+            </a:schemeClr>
+          </a:solidFill>
+          <a:ln w="3175" cap="flat">
+            <a:solidFill>
+              <a:schemeClr val="accent1"/>
+            </a:solidFill>
+            <a:miter lim="400000"/>
+          </a:ln>
+          <a:effectLst/>
+        </p:spPr>
+        <p:style>
+          <a:lnRef idx="0">
+            <a:scrgbClr r="0" g="0" b="0"/>
+          </a:lnRef>
+          <a:fillRef idx="0">
+            <a:scrgbClr r="0" g="0" b="0"/>
+          </a:fillRef>
+          <a:effectRef idx="0">
+            <a:scrgbClr r="0" g="0" b="0"/>
+          </a:effectRef>
+          <a:fontRef idx="none"/>
+        </p:style>
+        <p:txBody>
+          <a:bodyPr rot="0" spcFirstLastPara="1" vertOverflow="overflow" horzOverflow="overflow" vert="horz" wrap="square" lIns="39290" tIns="39290" rIns="39290" bIns="39290" numCol="1" spcCol="38100" rtlCol="0" anchor="ctr">
+            <a:spAutoFit/>
+          </a:bodyPr>
+          <a:lstStyle/>
+          <a:p>
+            <a:pPr marL="0" marR="0" indent="0" algn="ctr" defTabSz="584200" rtl="0" fontAlgn="auto" latinLnBrk="1" hangingPunct="0">
+              <a:lnSpc>
+                <a:spcPct val="100000"/>
+              </a:lnSpc>
+              <a:spcBef>
+                <a:spcPts val="0"/>
+              </a:spcBef>
+              <a:spcAft>
+                <a:spcPts val="0"/>
+              </a:spcAft>
+              <a:buClrTx/>
+              <a:buSzTx/>
+              <a:buFontTx/>
+              <a:buNone/>
+              <a:tabLst/>
+            </a:pPr>
+            <a:r>
+              <a:rPr lang="en-US" dirty="0">
+                <a:solidFill>
+                  <a:srgbClr val="000000"/>
+                </a:solidFill>
+                <a:latin typeface="Arial" panose="020B0604020202020204" pitchFamily="34" charset="0"/>
+                <a:cs typeface="Arial" panose="020B0604020202020204" pitchFamily="34" charset="0"/>
+              </a:rPr>
+              <a:t>API</a:t>
+            </a:r>
+            <a:endParaRPr kumimoji="0" lang="en-US" sz="2800" b="0" i="0" u="none" strike="noStrike" cap="none" spc="0" normalizeH="0" baseline="0" dirty="0">
+              <a:ln>
+                <a:noFill/>
+              </a:ln>
+              <a:solidFill>
+                <a:srgbClr val="000000"/>
+              </a:solidFill>
+              <a:effectLst/>
+              <a:uFillTx/>
+              <a:latin typeface="Arial" panose="020B0604020202020204" pitchFamily="34" charset="0"/>
+              <a:cs typeface="Arial" panose="020B0604020202020204" pitchFamily="34" charset="0"/>
+              <a:sym typeface="Helvetica Light"/>
+            </a:endParaRPr>
+          </a:p>
+        </p:txBody>
+      </p:sp>
+      <p:cxnSp>
+        <p:nvCxnSpPr>
+          <p:cNvPr id="6" name="Straight Connector 5">
+            <a:extLst>
+              <a:ext uri="{FF2B5EF4-FFF2-40B4-BE49-F238E27FC236}">
+                <a16:creationId xmlns:a16="http://schemas.microsoft.com/office/drawing/2014/main" id="{C4E28FE1-BEEC-0E4A-B9A5-548541176037}"/>
+              </a:ext>
+            </a:extLst>
+          </p:cNvPr>
+          <p:cNvCxnSpPr>
+            <a:cxnSpLocks/>
+            <a:stCxn id="2" idx="2"/>
+            <a:endCxn id="3" idx="0"/>
+          </p:cNvCxnSpPr>
+          <p:nvPr/>
+        </p:nvCxnSpPr>
+        <p:spPr>
+          <a:xfrm>
+            <a:off x="2680331" y="3094730"/>
+            <a:ext cx="1" cy="281235"/>
+          </a:xfrm>
+          <a:prstGeom prst="line">
+            <a:avLst/>
+          </a:prstGeom>
+          <a:noFill/>
+          <a:ln w="12700" cap="flat">
+            <a:solidFill>
+              <a:srgbClr val="000000"/>
+            </a:solidFill>
+            <a:prstDash val="solid"/>
+            <a:miter lim="400000"/>
+          </a:ln>
+          <a:effectLst/>
+        </p:spPr>
+        <p:style>
+          <a:lnRef idx="0">
+            <a:scrgbClr r="0" g="0" b="0"/>
+          </a:lnRef>
+          <a:fillRef idx="0">
+            <a:scrgbClr r="0" g="0" b="0"/>
+          </a:fillRef>
+          <a:effectRef idx="0">
+            <a:scrgbClr r="0" g="0" b="0"/>
+          </a:effectRef>
+          <a:fontRef idx="none"/>
+        </p:style>
+      </p:cxnSp>
+      <p:cxnSp>
+        <p:nvCxnSpPr>
+          <p:cNvPr id="7" name="Straight Connector 6">
+            <a:extLst>
+              <a:ext uri="{FF2B5EF4-FFF2-40B4-BE49-F238E27FC236}">
+                <a16:creationId xmlns:a16="http://schemas.microsoft.com/office/drawing/2014/main" id="{27305FF6-6BBB-C94E-A789-B4FA2F474E8F}"/>
+              </a:ext>
+            </a:extLst>
+          </p:cNvPr>
+          <p:cNvCxnSpPr>
+            <a:cxnSpLocks/>
+            <a:stCxn id="3" idx="2"/>
+            <a:endCxn id="4" idx="0"/>
+          </p:cNvCxnSpPr>
+          <p:nvPr/>
+        </p:nvCxnSpPr>
+        <p:spPr>
+          <a:xfrm flipH="1">
+            <a:off x="2680331" y="3886200"/>
+            <a:ext cx="1" cy="281235"/>
+          </a:xfrm>
+          <a:prstGeom prst="line">
+            <a:avLst/>
+          </a:prstGeom>
+          <a:noFill/>
+          <a:ln w="12700" cap="flat">
+            <a:solidFill>
+              <a:srgbClr val="000000"/>
+            </a:solidFill>
+            <a:prstDash val="solid"/>
+            <a:miter lim="400000"/>
+          </a:ln>
+          <a:effectLst/>
+        </p:spPr>
+        <p:style>
+          <a:lnRef idx="0">
+            <a:scrgbClr r="0" g="0" b="0"/>
+          </a:lnRef>
+          <a:fillRef idx="0">
+            <a:scrgbClr r="0" g="0" b="0"/>
+          </a:fillRef>
+          <a:effectRef idx="0">
+            <a:scrgbClr r="0" g="0" b="0"/>
+          </a:effectRef>
+          <a:fontRef idx="none"/>
+        </p:style>
+      </p:cxnSp>
+      <p:sp>
+        <p:nvSpPr>
+          <p:cNvPr id="8" name="TextBox 7">
+            <a:extLst>
+              <a:ext uri="{FF2B5EF4-FFF2-40B4-BE49-F238E27FC236}">
+                <a16:creationId xmlns:a16="http://schemas.microsoft.com/office/drawing/2014/main" id="{EEB51179-6F79-8342-B192-4AF78CAAF148}"/>
+              </a:ext>
+            </a:extLst>
+          </p:cNvPr>
+          <p:cNvSpPr txBox="1"/>
+          <p:nvPr/>
+        </p:nvSpPr>
+        <p:spPr>
+          <a:xfrm>
+            <a:off x="4007558" y="2553717"/>
+            <a:ext cx="2927884" cy="694901"/>
+          </a:xfrm>
+          <a:prstGeom prst="rect">
+            <a:avLst/>
+          </a:prstGeom>
+          <a:noFill/>
+          <a:ln w="3175" cap="flat">
+            <a:noFill/>
+            <a:miter lim="400000"/>
+          </a:ln>
+          <a:effectLst/>
+        </p:spPr>
+        <p:style>
+          <a:lnRef idx="0">
+            <a:scrgbClr r="0" g="0" b="0"/>
+          </a:lnRef>
+          <a:fillRef idx="0">
+            <a:scrgbClr r="0" g="0" b="0"/>
+          </a:fillRef>
+          <a:effectRef idx="0">
+            <a:scrgbClr r="0" g="0" b="0"/>
+          </a:effectRef>
+          <a:fontRef idx="none"/>
+        </p:style>
+        <p:txBody>
+          <a:bodyPr rot="0" spcFirstLastPara="1" vertOverflow="overflow" horzOverflow="overflow" vert="horz" wrap="square" lIns="39290" tIns="39290" rIns="39290" bIns="39290" numCol="1" spcCol="38100" rtlCol="0" anchor="ctr">
+            <a:spAutoFit/>
+          </a:bodyPr>
+          <a:lstStyle/>
+          <a:p>
+            <a:pPr marL="0" marR="0" indent="0" algn="l" defTabSz="584200" rtl="0" fontAlgn="auto" latinLnBrk="1" hangingPunct="0">
+              <a:lnSpc>
+                <a:spcPct val="100000"/>
+              </a:lnSpc>
+              <a:spcBef>
+                <a:spcPts val="0"/>
+              </a:spcBef>
+              <a:spcAft>
+                <a:spcPts val="0"/>
+              </a:spcAft>
+              <a:buClrTx/>
+              <a:buSzTx/>
+              <a:buFontTx/>
+              <a:buNone/>
+              <a:tabLst/>
+            </a:pPr>
+            <a:r>
+              <a:rPr kumimoji="0" lang="en-US" sz="2000" b="0" i="0" u="none" strike="noStrike" cap="none" spc="0" normalizeH="0" baseline="0" dirty="0">
+                <a:ln>
+                  <a:noFill/>
+                </a:ln>
+                <a:solidFill>
+                  <a:srgbClr val="000000"/>
+                </a:solidFill>
+                <a:effectLst/>
+                <a:uFillTx/>
+                <a:latin typeface="Arial" panose="020B0604020202020204" pitchFamily="34" charset="0"/>
+                <a:cs typeface="Arial" panose="020B0604020202020204" pitchFamily="34" charset="0"/>
+                <a:sym typeface="Helvetica Light"/>
+              </a:rPr>
+              <a:t>Contains products in </a:t>
+            </a:r>
+          </a:p>
+          <a:p>
+            <a:pPr marL="0" marR="0" indent="0" algn="l" defTabSz="584200" rtl="0" fontAlgn="auto" latinLnBrk="1" hangingPunct="0">
+              <a:lnSpc>
+                <a:spcPct val="100000"/>
+              </a:lnSpc>
+              <a:spcBef>
+                <a:spcPts val="0"/>
+              </a:spcBef>
+              <a:spcAft>
+                <a:spcPts val="0"/>
+              </a:spcAft>
+              <a:buClrTx/>
+              <a:buSzTx/>
+              <a:buFontTx/>
+              <a:buNone/>
+              <a:tabLst/>
+            </a:pPr>
+            <a:r>
+              <a:rPr kumimoji="0" lang="en-US" sz="2000" b="0" i="0" u="none" strike="noStrike" cap="none" spc="0" normalizeH="0" baseline="0" dirty="0">
+                <a:ln>
+                  <a:noFill/>
+                </a:ln>
+                <a:solidFill>
+                  <a:srgbClr val="000000"/>
+                </a:solidFill>
+                <a:effectLst/>
+                <a:uFillTx/>
+                <a:latin typeface="Arial" panose="020B0604020202020204" pitchFamily="34" charset="0"/>
+                <a:cs typeface="Arial" panose="020B0604020202020204" pitchFamily="34" charset="0"/>
+                <a:sym typeface="Helvetica Light"/>
+              </a:rPr>
+              <a:t>different publishing state </a:t>
+            </a:r>
+          </a:p>
+        </p:txBody>
+      </p:sp>
+      <p:sp>
+        <p:nvSpPr>
+          <p:cNvPr id="14" name="TextBox 13">
+            <a:extLst>
+              <a:ext uri="{FF2B5EF4-FFF2-40B4-BE49-F238E27FC236}">
+                <a16:creationId xmlns:a16="http://schemas.microsoft.com/office/drawing/2014/main" id="{1208B892-8B2A-B144-9733-0DC6353A520D}"/>
+              </a:ext>
+            </a:extLst>
+          </p:cNvPr>
+          <p:cNvSpPr txBox="1"/>
+          <p:nvPr/>
+        </p:nvSpPr>
+        <p:spPr>
+          <a:xfrm>
+            <a:off x="4007558" y="3499076"/>
+            <a:ext cx="1704792" cy="387124"/>
+          </a:xfrm>
+          <a:prstGeom prst="rect">
+            <a:avLst/>
+          </a:prstGeom>
+          <a:noFill/>
+          <a:ln w="3175" cap="flat">
+            <a:noFill/>
+            <a:miter lim="400000"/>
+          </a:ln>
+          <a:effectLst/>
+        </p:spPr>
+        <p:style>
+          <a:lnRef idx="0">
+            <a:scrgbClr r="0" g="0" b="0"/>
+          </a:lnRef>
+          <a:fillRef idx="0">
+            <a:scrgbClr r="0" g="0" b="0"/>
+          </a:fillRef>
+          <a:effectRef idx="0">
+            <a:scrgbClr r="0" g="0" b="0"/>
+          </a:effectRef>
+          <a:fontRef idx="none"/>
+        </p:style>
+        <p:txBody>
+          <a:bodyPr rot="0" spcFirstLastPara="1" vertOverflow="overflow" horzOverflow="overflow" vert="horz" wrap="none" lIns="39290" tIns="39290" rIns="39290" bIns="39290" numCol="1" spcCol="38100" rtlCol="0" anchor="ctr">
+            <a:spAutoFit/>
+          </a:bodyPr>
+          <a:lstStyle/>
+          <a:p>
+            <a:pPr marL="0" marR="0" indent="0" algn="l" defTabSz="584200" rtl="0" fontAlgn="auto" latinLnBrk="1" hangingPunct="0">
+              <a:lnSpc>
+                <a:spcPct val="100000"/>
+              </a:lnSpc>
+              <a:spcBef>
+                <a:spcPts val="0"/>
+              </a:spcBef>
+              <a:spcAft>
+                <a:spcPts val="0"/>
+              </a:spcAft>
+              <a:buClrTx/>
+              <a:buSzTx/>
+              <a:buFontTx/>
+              <a:buNone/>
+              <a:tabLst/>
+            </a:pPr>
+            <a:r>
+              <a:rPr kumimoji="0" lang="en-US" sz="2000" b="0" i="0" u="none" strike="noStrike" cap="none" spc="0" normalizeH="0" baseline="0" dirty="0">
+                <a:ln>
+                  <a:noFill/>
+                </a:ln>
+                <a:solidFill>
+                  <a:srgbClr val="000000"/>
+                </a:solidFill>
+                <a:effectLst/>
+                <a:uFillTx/>
+                <a:latin typeface="Arial" panose="020B0604020202020204" pitchFamily="34" charset="0"/>
+                <a:cs typeface="Arial" panose="020B0604020202020204" pitchFamily="34" charset="0"/>
+                <a:sym typeface="Helvetica Light"/>
+              </a:rPr>
+              <a:t>Contains APIs</a:t>
+            </a:r>
+          </a:p>
+        </p:txBody>
+      </p:sp>
+      <p:sp>
+        <p:nvSpPr>
+          <p:cNvPr id="15" name="TextBox 14">
+            <a:extLst>
+              <a:ext uri="{FF2B5EF4-FFF2-40B4-BE49-F238E27FC236}">
+                <a16:creationId xmlns:a16="http://schemas.microsoft.com/office/drawing/2014/main" id="{2C0830D2-6A0C-5B4C-9AA6-CDF7B6149415}"/>
+              </a:ext>
+            </a:extLst>
+          </p:cNvPr>
+          <p:cNvSpPr txBox="1"/>
+          <p:nvPr/>
+        </p:nvSpPr>
+        <p:spPr>
+          <a:xfrm>
+            <a:off x="4007557" y="4167435"/>
+            <a:ext cx="4253567" cy="387124"/>
+          </a:xfrm>
+          <a:prstGeom prst="rect">
+            <a:avLst/>
+          </a:prstGeom>
+          <a:noFill/>
+          <a:ln w="3175" cap="flat">
+            <a:noFill/>
+            <a:miter lim="400000"/>
+          </a:ln>
+          <a:effectLst/>
+        </p:spPr>
+        <p:style>
+          <a:lnRef idx="0">
+            <a:scrgbClr r="0" g="0" b="0"/>
+          </a:lnRef>
+          <a:fillRef idx="0">
+            <a:scrgbClr r="0" g="0" b="0"/>
+          </a:fillRef>
+          <a:effectRef idx="0">
+            <a:scrgbClr r="0" g="0" b="0"/>
+          </a:effectRef>
+          <a:fontRef idx="none"/>
+        </p:style>
+        <p:txBody>
+          <a:bodyPr rot="0" spcFirstLastPara="1" vertOverflow="overflow" horzOverflow="overflow" vert="horz" wrap="none" lIns="39290" tIns="39290" rIns="39290" bIns="39290" numCol="1" spcCol="38100" rtlCol="0" anchor="ctr">
+            <a:spAutoFit/>
+          </a:bodyPr>
+          <a:lstStyle/>
+          <a:p>
+            <a:pPr marL="0" marR="0" indent="0" algn="l" defTabSz="584200" rtl="0" fontAlgn="auto" latinLnBrk="1" hangingPunct="0">
+              <a:lnSpc>
+                <a:spcPct val="100000"/>
+              </a:lnSpc>
+              <a:spcBef>
+                <a:spcPts val="0"/>
+              </a:spcBef>
+              <a:spcAft>
+                <a:spcPts val="0"/>
+              </a:spcAft>
+              <a:buClrTx/>
+              <a:buSzTx/>
+              <a:buFontTx/>
+              <a:buNone/>
+              <a:tabLst/>
+            </a:pPr>
+            <a:r>
+              <a:rPr kumimoji="0" lang="en-US" sz="2000" b="0" i="0" u="none" strike="noStrike" cap="none" spc="0" normalizeH="0" baseline="0" dirty="0">
+                <a:ln>
+                  <a:noFill/>
+                </a:ln>
+                <a:solidFill>
+                  <a:srgbClr val="000000"/>
+                </a:solidFill>
+                <a:effectLst/>
+                <a:uFillTx/>
+                <a:latin typeface="Arial" panose="020B0604020202020204" pitchFamily="34" charset="0"/>
+                <a:cs typeface="Arial" panose="020B0604020202020204" pitchFamily="34" charset="0"/>
+                <a:sym typeface="Helvetica Light"/>
+              </a:rPr>
+              <a:t>Contains our imported API definition</a:t>
+            </a:r>
+          </a:p>
+        </p:txBody>
+      </p:sp>
+      <p:sp>
+        <p:nvSpPr>
+          <p:cNvPr id="20" name="TextBox 19">
+            <a:extLst>
+              <a:ext uri="{FF2B5EF4-FFF2-40B4-BE49-F238E27FC236}">
+                <a16:creationId xmlns:a16="http://schemas.microsoft.com/office/drawing/2014/main" id="{C6D5D6C3-A981-F848-AA55-15020187D309}"/>
+              </a:ext>
+            </a:extLst>
+          </p:cNvPr>
+          <p:cNvSpPr txBox="1"/>
+          <p:nvPr/>
+        </p:nvSpPr>
+        <p:spPr>
+          <a:xfrm>
+            <a:off x="1670180" y="1844841"/>
+            <a:ext cx="5495732" cy="510235"/>
+          </a:xfrm>
+          <a:prstGeom prst="rect">
+            <a:avLst/>
+          </a:prstGeom>
+          <a:noFill/>
+          <a:ln w="3175" cap="flat">
+            <a:noFill/>
+            <a:miter lim="400000"/>
+          </a:ln>
+          <a:effectLst/>
+        </p:spPr>
+        <p:style>
+          <a:lnRef idx="0">
+            <a:scrgbClr r="0" g="0" b="0"/>
+          </a:lnRef>
+          <a:fillRef idx="0">
+            <a:scrgbClr r="0" g="0" b="0"/>
+          </a:fillRef>
+          <a:effectRef idx="0">
+            <a:scrgbClr r="0" g="0" b="0"/>
+          </a:effectRef>
+          <a:fontRef idx="none"/>
+        </p:style>
+        <p:txBody>
+          <a:bodyPr rot="0" spcFirstLastPara="1" vertOverflow="overflow" horzOverflow="overflow" vert="horz" wrap="square" lIns="39290" tIns="39290" rIns="39290" bIns="39290" numCol="1" spcCol="38100" rtlCol="0" anchor="ctr">
+            <a:spAutoFit/>
+          </a:bodyPr>
+          <a:lstStyle/>
+          <a:p>
+            <a:pPr marL="0" marR="0" indent="0" algn="ctr" defTabSz="584200" rtl="0" fontAlgn="auto" latinLnBrk="1" hangingPunct="0">
+              <a:lnSpc>
+                <a:spcPct val="100000"/>
+              </a:lnSpc>
+              <a:spcBef>
+                <a:spcPts val="0"/>
+              </a:spcBef>
+              <a:spcAft>
+                <a:spcPts val="0"/>
+              </a:spcAft>
+              <a:buClrTx/>
+              <a:buSzTx/>
+              <a:buFontTx/>
+              <a:buNone/>
+              <a:tabLst/>
+            </a:pPr>
+            <a:r>
+              <a:rPr kumimoji="0" lang="de-DE" sz="2800" b="1" i="0" u="none" strike="noStrike" cap="none" spc="0" normalizeH="0" baseline="0" dirty="0">
+                <a:ln>
+                  <a:noFill/>
+                </a:ln>
+                <a:solidFill>
+                  <a:srgbClr val="000000"/>
+                </a:solidFill>
+                <a:effectLst/>
+                <a:uFillTx/>
+                <a:latin typeface="+mn-lt"/>
+                <a:ea typeface="+mn-ea"/>
+                <a:cs typeface="+mn-cs"/>
+                <a:sym typeface="Helvetica Light"/>
+              </a:rPr>
+              <a:t>Major </a:t>
+            </a:r>
+            <a:r>
+              <a:rPr kumimoji="0" lang="en-US" sz="2800" b="1" i="0" u="none" strike="noStrike" cap="none" spc="0" normalizeH="0" baseline="0" dirty="0">
+                <a:ln>
+                  <a:noFill/>
+                </a:ln>
+                <a:solidFill>
+                  <a:srgbClr val="000000"/>
+                </a:solidFill>
+                <a:effectLst/>
+                <a:uFillTx/>
+                <a:latin typeface="+mn-lt"/>
+                <a:ea typeface="+mn-ea"/>
+                <a:cs typeface="+mn-cs"/>
+                <a:sym typeface="Helvetica Light"/>
+              </a:rPr>
+              <a:t>elements</a:t>
+            </a:r>
+            <a:r>
+              <a:rPr kumimoji="0" lang="de-DE" sz="2800" b="1" i="0" u="none" strike="noStrike" cap="none" spc="0" normalizeH="0" baseline="0" dirty="0">
+                <a:ln>
+                  <a:noFill/>
+                </a:ln>
+                <a:solidFill>
+                  <a:srgbClr val="000000"/>
+                </a:solidFill>
+                <a:effectLst/>
+                <a:uFillTx/>
+                <a:latin typeface="+mn-lt"/>
+                <a:ea typeface="+mn-ea"/>
+                <a:cs typeface="+mn-cs"/>
+                <a:sym typeface="Helvetica Light"/>
+              </a:rPr>
+              <a:t> in API Connect</a:t>
+            </a:r>
+          </a:p>
+        </p:txBody>
+      </p:sp>
+    </p:spTree>
+    <p:extLst>
+      <p:ext uri="{BB962C8B-B14F-4D97-AF65-F5344CB8AC3E}">
+        <p14:creationId xmlns:p14="http://schemas.microsoft.com/office/powerpoint/2010/main" val="1234341700"/>
+      </p:ext>
+    </p:extLst>
+  </p:cSld>
+  <p:clrMapOvr>
+    <a:masterClrMapping/>
+  </p:clrMapOvr>
+  <p:transition spd="med"/>
 </p:sld>
 </file>
 
@@ -26962,7 +27858,7 @@
           </a:ln>
           <a:extLst>
             <a:ext uri="{C572A759-6A51-4108-AA02-DFA0A04FC94B}">
-              <ma14:wrappingTextBoxFlag xmlns:ma14="http://schemas.microsoft.com/office/mac/drawingml/2011/main" val="1"/>
+              <ma14:wrappingTextBoxFlag xmlns:ma14="http://schemas.microsoft.com/office/mac/drawingml/2011/main" xmlns="" val="1"/>
             </a:ext>
           </a:extLst>
         </p:spPr>
@@ -27030,7 +27926,7 @@
           </a:ln>
           <a:extLst>
             <a:ext uri="{C572A759-6A51-4108-AA02-DFA0A04FC94B}">
-              <ma14:wrappingTextBoxFlag xmlns:ma14="http://schemas.microsoft.com/office/mac/drawingml/2011/main" val="1"/>
+              <ma14:wrappingTextBoxFlag xmlns:ma14="http://schemas.microsoft.com/office/mac/drawingml/2011/main" xmlns="" val="1"/>
             </a:ext>
           </a:extLst>
         </p:spPr>
@@ -27648,7 +28544,7 @@
           </a:ln>
           <a:extLst>
             <a:ext uri="{C572A759-6A51-4108-AA02-DFA0A04FC94B}">
-              <ma14:wrappingTextBoxFlag xmlns:ma14="http://schemas.microsoft.com/office/mac/drawingml/2011/main" val="1"/>
+              <ma14:wrappingTextBoxFlag xmlns:ma14="http://schemas.microsoft.com/office/mac/drawingml/2011/main" xmlns="" val="1"/>
             </a:ext>
           </a:extLst>
         </p:spPr>
@@ -28134,7 +29030,7 @@
           </a:ln>
           <a:extLst>
             <a:ext uri="{C572A759-6A51-4108-AA02-DFA0A04FC94B}">
-              <ma14:wrappingTextBoxFlag xmlns:ma14="http://schemas.microsoft.com/office/mac/drawingml/2011/main" val="1"/>
+              <ma14:wrappingTextBoxFlag xmlns:ma14="http://schemas.microsoft.com/office/mac/drawingml/2011/main" xmlns="" val="1"/>
             </a:ext>
           </a:extLst>
         </p:spPr>
@@ -28691,7 +29587,7 @@
           </a:ln>
           <a:extLst>
             <a:ext uri="{C572A759-6A51-4108-AA02-DFA0A04FC94B}">
-              <ma14:wrappingTextBoxFlag xmlns:ma14="http://schemas.microsoft.com/office/mac/drawingml/2011/main" val="1"/>
+              <ma14:wrappingTextBoxFlag xmlns:ma14="http://schemas.microsoft.com/office/mac/drawingml/2011/main" xmlns="" val="1"/>
             </a:ext>
           </a:extLst>
         </p:spPr>
@@ -28975,7 +29871,7 @@
           </a:ln>
           <a:extLst>
             <a:ext uri="{C572A759-6A51-4108-AA02-DFA0A04FC94B}">
-              <ma14:wrappingTextBoxFlag xmlns:ma14="http://schemas.microsoft.com/office/mac/drawingml/2011/main" val="1"/>
+              <ma14:wrappingTextBoxFlag xmlns:ma14="http://schemas.microsoft.com/office/mac/drawingml/2011/main" xmlns="" val="1"/>
             </a:ext>
           </a:extLst>
         </p:spPr>
@@ -29117,7 +30013,7 @@
           </a:ln>
           <a:extLst>
             <a:ext uri="{C572A759-6A51-4108-AA02-DFA0A04FC94B}">
-              <ma14:wrappingTextBoxFlag xmlns:ma14="http://schemas.microsoft.com/office/mac/drawingml/2011/main" val="1"/>
+              <ma14:wrappingTextBoxFlag xmlns:ma14="http://schemas.microsoft.com/office/mac/drawingml/2011/main" xmlns="" val="1"/>
             </a:ext>
           </a:extLst>
         </p:spPr>
@@ -29293,7 +30189,7 @@
           </a:ln>
           <a:extLst>
             <a:ext uri="{C572A759-6A51-4108-AA02-DFA0A04FC94B}">
-              <ma14:wrappingTextBoxFlag xmlns:ma14="http://schemas.microsoft.com/office/mac/drawingml/2011/main" val="1"/>
+              <ma14:wrappingTextBoxFlag xmlns:ma14="http://schemas.microsoft.com/office/mac/drawingml/2011/main" xmlns="" val="1"/>
             </a:ext>
           </a:extLst>
         </p:spPr>
@@ -29396,7 +30292,7 @@
           </a:ln>
           <a:extLst>
             <a:ext uri="{C572A759-6A51-4108-AA02-DFA0A04FC94B}">
-              <ma14:wrappingTextBoxFlag xmlns:ma14="http://schemas.microsoft.com/office/mac/drawingml/2011/main" val="1"/>
+              <ma14:wrappingTextBoxFlag xmlns:ma14="http://schemas.microsoft.com/office/mac/drawingml/2011/main" xmlns="" val="1"/>
             </a:ext>
           </a:extLst>
         </p:spPr>
@@ -30149,7 +31045,7 @@
               <a:tabLst/>
             </a:pPr>
             <a:r>
-              <a:rPr lang="en-US" sz="1200" dirty="0" smtClean="0">
+              <a:rPr lang="en-US" sz="1200" dirty="0">
                 <a:solidFill>
                   <a:srgbClr val="000000"/>
                 </a:solidFill>
@@ -30209,7 +31105,7 @@
   <p:clrMapOvr>
     <a:masterClrMapping/>
   </p:clrMapOvr>
-  <p:transition xmlns:p14="http://schemas.microsoft.com/office/powerpoint/2010/main" spd="med"/>
+  <p:transition spd="med"/>
 </p:sld>
 </file>
 
@@ -30296,7 +31192,7 @@
             <a:effectLst/>
             <a:extLst>
               <a:ext uri="{C572A759-6A51-4108-AA02-DFA0A04FC94B}">
-                <ma14:wrappingTextBoxFlag xmlns:ma14="http://schemas.microsoft.com/office/mac/drawingml/2011/main" val="1"/>
+                <ma14:wrappingTextBoxFlag xmlns:ma14="http://schemas.microsoft.com/office/mac/drawingml/2011/main" xmlns="" val="1"/>
               </a:ext>
             </a:extLst>
           </p:spPr>
@@ -30370,7 +31266,7 @@
           <p:cNvPr id="34" name="Group 33">
             <a:extLst>
               <a:ext uri="{FF2B5EF4-FFF2-40B4-BE49-F238E27FC236}">
-                <a16:creationId xmlns:a16="http://schemas.microsoft.com/office/drawing/2014/main" xmlns="" id="{5938EDDB-B2B2-6642-9D20-6D7C5F9FED31}"/>
+                <a16:creationId xmlns:a16="http://schemas.microsoft.com/office/drawing/2014/main" id="{5938EDDB-B2B2-6642-9D20-6D7C5F9FED31}"/>
               </a:ext>
             </a:extLst>
           </p:cNvPr>
@@ -30390,7 +31286,7 @@
             <p:cNvPr id="35" name="Group 34">
               <a:extLst>
                 <a:ext uri="{FF2B5EF4-FFF2-40B4-BE49-F238E27FC236}">
-                  <a16:creationId xmlns:a16="http://schemas.microsoft.com/office/drawing/2014/main" xmlns="" id="{3527AD53-90A2-7D45-A4B7-509C2FD1C32F}"/>
+                  <a16:creationId xmlns:a16="http://schemas.microsoft.com/office/drawing/2014/main" id="{3527AD53-90A2-7D45-A4B7-509C2FD1C32F}"/>
                 </a:ext>
               </a:extLst>
             </p:cNvPr>
@@ -30410,7 +31306,7 @@
               <p:cNvPr id="37" name="Oval 36">
                 <a:extLst>
                   <a:ext uri="{FF2B5EF4-FFF2-40B4-BE49-F238E27FC236}">
-                    <a16:creationId xmlns:a16="http://schemas.microsoft.com/office/drawing/2014/main" xmlns="" id="{38BE8895-77F2-3F48-BDC0-E7E0559BA7AD}"/>
+                    <a16:creationId xmlns:a16="http://schemas.microsoft.com/office/drawing/2014/main" id="{38BE8895-77F2-3F48-BDC0-E7E0559BA7AD}"/>
                   </a:ext>
                 </a:extLst>
               </p:cNvPr>
@@ -30466,7 +31362,7 @@
               <p:cNvPr id="38" name="Picture 37">
                 <a:extLst>
                   <a:ext uri="{FF2B5EF4-FFF2-40B4-BE49-F238E27FC236}">
-                    <a16:creationId xmlns:a16="http://schemas.microsoft.com/office/drawing/2014/main" xmlns="" id="{1E774A8B-C5DB-534E-8EE3-5D936B2F1BDA}"/>
+                    <a16:creationId xmlns:a16="http://schemas.microsoft.com/office/drawing/2014/main" id="{1E774A8B-C5DB-534E-8EE3-5D936B2F1BDA}"/>
                   </a:ext>
                 </a:extLst>
               </p:cNvPr>
@@ -30503,7 +31399,7 @@
             <p:cNvPr id="36" name="Shape 576">
               <a:extLst>
                 <a:ext uri="{FF2B5EF4-FFF2-40B4-BE49-F238E27FC236}">
-                  <a16:creationId xmlns:a16="http://schemas.microsoft.com/office/drawing/2014/main" xmlns="" id="{8D66F62C-0857-0C4E-B8A3-3F8DBC721692}"/>
+                  <a16:creationId xmlns:a16="http://schemas.microsoft.com/office/drawing/2014/main" id="{8D66F62C-0857-0C4E-B8A3-3F8DBC721692}"/>
                 </a:ext>
               </a:extLst>
             </p:cNvPr>
@@ -30523,7 +31419,7 @@
             </a:ln>
             <a:extLst>
               <a:ext uri="{C572A759-6A51-4108-AA02-DFA0A04FC94B}">
-                <ma14:wrappingTextBoxFlag xmlns:ma14="http://schemas.microsoft.com/office/mac/drawingml/2011/main" val="1"/>
+                <ma14:wrappingTextBoxFlag xmlns:ma14="http://schemas.microsoft.com/office/mac/drawingml/2011/main" xmlns="" val="1"/>
               </a:ext>
             </a:extLst>
           </p:spPr>
@@ -30674,7 +31570,7 @@
             </a:ln>
             <a:extLst>
               <a:ext uri="{C572A759-6A51-4108-AA02-DFA0A04FC94B}">
-                <ma14:wrappingTextBoxFlag xmlns:ma14="http://schemas.microsoft.com/office/mac/drawingml/2011/main" val="1"/>
+                <ma14:wrappingTextBoxFlag xmlns:ma14="http://schemas.microsoft.com/office/mac/drawingml/2011/main" xmlns="" val="1"/>
               </a:ext>
             </a:extLst>
           </p:spPr>
@@ -30738,7 +31634,7 @@
           <p:cNvPr id="43" name="Group 42">
             <a:extLst>
               <a:ext uri="{FF2B5EF4-FFF2-40B4-BE49-F238E27FC236}">
-                <a16:creationId xmlns:a16="http://schemas.microsoft.com/office/drawing/2014/main" xmlns="" id="{414AC93B-86D8-5345-93C9-AD53BB74E355}"/>
+                <a16:creationId xmlns:a16="http://schemas.microsoft.com/office/drawing/2014/main" id="{414AC93B-86D8-5345-93C9-AD53BB74E355}"/>
               </a:ext>
             </a:extLst>
           </p:cNvPr>
@@ -30758,7 +31654,7 @@
             <p:cNvPr id="44" name="Shape 576">
               <a:extLst>
                 <a:ext uri="{FF2B5EF4-FFF2-40B4-BE49-F238E27FC236}">
-                  <a16:creationId xmlns:a16="http://schemas.microsoft.com/office/drawing/2014/main" xmlns="" id="{B830E1BD-415C-1647-B429-63A4B5950908}"/>
+                  <a16:creationId xmlns:a16="http://schemas.microsoft.com/office/drawing/2014/main" id="{B830E1BD-415C-1647-B429-63A4B5950908}"/>
                 </a:ext>
               </a:extLst>
             </p:cNvPr>
@@ -30778,7 +31674,7 @@
             </a:ln>
             <a:extLst>
               <a:ext uri="{C572A759-6A51-4108-AA02-DFA0A04FC94B}">
-                <ma14:wrappingTextBoxFlag xmlns:ma14="http://schemas.microsoft.com/office/mac/drawingml/2011/main" val="1"/>
+                <ma14:wrappingTextBoxFlag xmlns:ma14="http://schemas.microsoft.com/office/mac/drawingml/2011/main" xmlns="" val="1"/>
               </a:ext>
             </a:extLst>
           </p:spPr>
@@ -30815,7 +31711,7 @@
             <p:cNvPr id="45" name="Group 44">
               <a:extLst>
                 <a:ext uri="{FF2B5EF4-FFF2-40B4-BE49-F238E27FC236}">
-                  <a16:creationId xmlns:a16="http://schemas.microsoft.com/office/drawing/2014/main" xmlns="" id="{58675086-411D-5640-BC91-9D51D514E9D5}"/>
+                  <a16:creationId xmlns:a16="http://schemas.microsoft.com/office/drawing/2014/main" id="{58675086-411D-5640-BC91-9D51D514E9D5}"/>
                 </a:ext>
               </a:extLst>
             </p:cNvPr>
@@ -30835,7 +31731,7 @@
               <p:cNvPr id="46" name="Oval 45">
                 <a:extLst>
                   <a:ext uri="{FF2B5EF4-FFF2-40B4-BE49-F238E27FC236}">
-                    <a16:creationId xmlns:a16="http://schemas.microsoft.com/office/drawing/2014/main" xmlns="" id="{D2571F00-6E2C-1248-B833-819BA9F96071}"/>
+                    <a16:creationId xmlns:a16="http://schemas.microsoft.com/office/drawing/2014/main" id="{D2571F00-6E2C-1248-B833-819BA9F96071}"/>
                   </a:ext>
                 </a:extLst>
               </p:cNvPr>
@@ -30891,7 +31787,7 @@
               <p:cNvPr id="47" name="Picture 46">
                 <a:extLst>
                   <a:ext uri="{FF2B5EF4-FFF2-40B4-BE49-F238E27FC236}">
-                    <a16:creationId xmlns:a16="http://schemas.microsoft.com/office/drawing/2014/main" xmlns="" id="{EC8979B1-1A53-464F-82E9-1858F6AE5E53}"/>
+                    <a16:creationId xmlns:a16="http://schemas.microsoft.com/office/drawing/2014/main" id="{EC8979B1-1A53-464F-82E9-1858F6AE5E53}"/>
                   </a:ext>
                 </a:extLst>
               </p:cNvPr>
@@ -30929,7 +31825,7 @@
           <p:cNvPr id="48" name="Group 47">
             <a:extLst>
               <a:ext uri="{FF2B5EF4-FFF2-40B4-BE49-F238E27FC236}">
-                <a16:creationId xmlns:a16="http://schemas.microsoft.com/office/drawing/2014/main" xmlns="" id="{5938EDDB-B2B2-6642-9D20-6D7C5F9FED31}"/>
+                <a16:creationId xmlns:a16="http://schemas.microsoft.com/office/drawing/2014/main" id="{5938EDDB-B2B2-6642-9D20-6D7C5F9FED31}"/>
               </a:ext>
             </a:extLst>
           </p:cNvPr>
@@ -30949,7 +31845,7 @@
             <p:cNvPr id="49" name="Group 48">
               <a:extLst>
                 <a:ext uri="{FF2B5EF4-FFF2-40B4-BE49-F238E27FC236}">
-                  <a16:creationId xmlns:a16="http://schemas.microsoft.com/office/drawing/2014/main" xmlns="" id="{3527AD53-90A2-7D45-A4B7-509C2FD1C32F}"/>
+                  <a16:creationId xmlns:a16="http://schemas.microsoft.com/office/drawing/2014/main" id="{3527AD53-90A2-7D45-A4B7-509C2FD1C32F}"/>
                 </a:ext>
               </a:extLst>
             </p:cNvPr>
@@ -30969,7 +31865,7 @@
               <p:cNvPr id="51" name="Oval 50">
                 <a:extLst>
                   <a:ext uri="{FF2B5EF4-FFF2-40B4-BE49-F238E27FC236}">
-                    <a16:creationId xmlns:a16="http://schemas.microsoft.com/office/drawing/2014/main" xmlns="" id="{38BE8895-77F2-3F48-BDC0-E7E0559BA7AD}"/>
+                    <a16:creationId xmlns:a16="http://schemas.microsoft.com/office/drawing/2014/main" id="{38BE8895-77F2-3F48-BDC0-E7E0559BA7AD}"/>
                   </a:ext>
                 </a:extLst>
               </p:cNvPr>
@@ -31025,7 +31921,7 @@
               <p:cNvPr id="52" name="Picture 51">
                 <a:extLst>
                   <a:ext uri="{FF2B5EF4-FFF2-40B4-BE49-F238E27FC236}">
-                    <a16:creationId xmlns:a16="http://schemas.microsoft.com/office/drawing/2014/main" xmlns="" id="{1E774A8B-C5DB-534E-8EE3-5D936B2F1BDA}"/>
+                    <a16:creationId xmlns:a16="http://schemas.microsoft.com/office/drawing/2014/main" id="{1E774A8B-C5DB-534E-8EE3-5D936B2F1BDA}"/>
                   </a:ext>
                 </a:extLst>
               </p:cNvPr>
@@ -31062,7 +31958,7 @@
             <p:cNvPr id="50" name="Shape 576">
               <a:extLst>
                 <a:ext uri="{FF2B5EF4-FFF2-40B4-BE49-F238E27FC236}">
-                  <a16:creationId xmlns:a16="http://schemas.microsoft.com/office/drawing/2014/main" xmlns="" id="{8D66F62C-0857-0C4E-B8A3-3F8DBC721692}"/>
+                  <a16:creationId xmlns:a16="http://schemas.microsoft.com/office/drawing/2014/main" id="{8D66F62C-0857-0C4E-B8A3-3F8DBC721692}"/>
                 </a:ext>
               </a:extLst>
             </p:cNvPr>
@@ -31082,7 +31978,7 @@
             </a:ln>
             <a:extLst>
               <a:ext uri="{C572A759-6A51-4108-AA02-DFA0A04FC94B}">
-                <ma14:wrappingTextBoxFlag xmlns:ma14="http://schemas.microsoft.com/office/mac/drawingml/2011/main" val="1"/>
+                <ma14:wrappingTextBoxFlag xmlns:ma14="http://schemas.microsoft.com/office/mac/drawingml/2011/main" xmlns="" val="1"/>
               </a:ext>
             </a:extLst>
           </p:spPr>
@@ -31683,7 +32579,7 @@
             <a:effectLst/>
             <a:extLst>
               <a:ext uri="{C572A759-6A51-4108-AA02-DFA0A04FC94B}">
-                <ma14:wrappingTextBoxFlag xmlns:ma14="http://schemas.microsoft.com/office/mac/drawingml/2011/main" val="1"/>
+                <ma14:wrappingTextBoxFlag xmlns:ma14="http://schemas.microsoft.com/office/mac/drawingml/2011/main" xmlns="" val="1"/>
               </a:ext>
             </a:extLst>
           </p:spPr>
@@ -31835,7 +32731,7 @@
             <a:effectLst/>
             <a:extLst>
               <a:ext uri="{C572A759-6A51-4108-AA02-DFA0A04FC94B}">
-                <ma14:wrappingTextBoxFlag xmlns:ma14="http://schemas.microsoft.com/office/mac/drawingml/2011/main" val="1"/>
+                <ma14:wrappingTextBoxFlag xmlns:ma14="http://schemas.microsoft.com/office/mac/drawingml/2011/main" xmlns="" val="1"/>
               </a:ext>
             </a:extLst>
           </p:spPr>
@@ -31943,7 +32839,7 @@
           <a:effectLst/>
           <a:extLst>
             <a:ext uri="{C572A759-6A51-4108-AA02-DFA0A04FC94B}">
-              <ma14:wrappingTextBoxFlag xmlns:ma14="http://schemas.microsoft.com/office/mac/drawingml/2011/main" val="1"/>
+              <ma14:wrappingTextBoxFlag xmlns:ma14="http://schemas.microsoft.com/office/mac/drawingml/2011/main" xmlns="" val="1"/>
             </a:ext>
           </a:extLst>
         </p:spPr>
@@ -32143,7 +33039,7 @@
           <p:cNvPr id="170" name="Group 169">
             <a:extLst>
               <a:ext uri="{FF2B5EF4-FFF2-40B4-BE49-F238E27FC236}">
-                <a16:creationId xmlns:a16="http://schemas.microsoft.com/office/drawing/2014/main" xmlns="" id="{5938EDDB-B2B2-6642-9D20-6D7C5F9FED31}"/>
+                <a16:creationId xmlns:a16="http://schemas.microsoft.com/office/drawing/2014/main" id="{5938EDDB-B2B2-6642-9D20-6D7C5F9FED31}"/>
               </a:ext>
             </a:extLst>
           </p:cNvPr>
@@ -32163,7 +33059,7 @@
             <p:cNvPr id="171" name="Group 170">
               <a:extLst>
                 <a:ext uri="{FF2B5EF4-FFF2-40B4-BE49-F238E27FC236}">
-                  <a16:creationId xmlns:a16="http://schemas.microsoft.com/office/drawing/2014/main" xmlns="" id="{3527AD53-90A2-7D45-A4B7-509C2FD1C32F}"/>
+                  <a16:creationId xmlns:a16="http://schemas.microsoft.com/office/drawing/2014/main" id="{3527AD53-90A2-7D45-A4B7-509C2FD1C32F}"/>
                 </a:ext>
               </a:extLst>
             </p:cNvPr>
@@ -32183,7 +33079,7 @@
               <p:cNvPr id="173" name="Oval 172">
                 <a:extLst>
                   <a:ext uri="{FF2B5EF4-FFF2-40B4-BE49-F238E27FC236}">
-                    <a16:creationId xmlns:a16="http://schemas.microsoft.com/office/drawing/2014/main" xmlns="" id="{38BE8895-77F2-3F48-BDC0-E7E0559BA7AD}"/>
+                    <a16:creationId xmlns:a16="http://schemas.microsoft.com/office/drawing/2014/main" id="{38BE8895-77F2-3F48-BDC0-E7E0559BA7AD}"/>
                   </a:ext>
                 </a:extLst>
               </p:cNvPr>
@@ -32239,7 +33135,7 @@
               <p:cNvPr id="174" name="Picture 173">
                 <a:extLst>
                   <a:ext uri="{FF2B5EF4-FFF2-40B4-BE49-F238E27FC236}">
-                    <a16:creationId xmlns:a16="http://schemas.microsoft.com/office/drawing/2014/main" xmlns="" id="{1E774A8B-C5DB-534E-8EE3-5D936B2F1BDA}"/>
+                    <a16:creationId xmlns:a16="http://schemas.microsoft.com/office/drawing/2014/main" id="{1E774A8B-C5DB-534E-8EE3-5D936B2F1BDA}"/>
                   </a:ext>
                 </a:extLst>
               </p:cNvPr>
@@ -32276,7 +33172,7 @@
             <p:cNvPr id="172" name="Shape 576">
               <a:extLst>
                 <a:ext uri="{FF2B5EF4-FFF2-40B4-BE49-F238E27FC236}">
-                  <a16:creationId xmlns:a16="http://schemas.microsoft.com/office/drawing/2014/main" xmlns="" id="{8D66F62C-0857-0C4E-B8A3-3F8DBC721692}"/>
+                  <a16:creationId xmlns:a16="http://schemas.microsoft.com/office/drawing/2014/main" id="{8D66F62C-0857-0C4E-B8A3-3F8DBC721692}"/>
                 </a:ext>
               </a:extLst>
             </p:cNvPr>
@@ -32296,7 +33192,7 @@
             </a:ln>
             <a:extLst>
               <a:ext uri="{C572A759-6A51-4108-AA02-DFA0A04FC94B}">
-                <ma14:wrappingTextBoxFlag xmlns:ma14="http://schemas.microsoft.com/office/mac/drawingml/2011/main" val="1"/>
+                <ma14:wrappingTextBoxFlag xmlns:ma14="http://schemas.microsoft.com/office/mac/drawingml/2011/main" xmlns="" val="1"/>
               </a:ext>
             </a:extLst>
           </p:spPr>
@@ -32375,7 +33271,7 @@
           <p:cNvPr id="177" name="Group 176">
             <a:extLst>
               <a:ext uri="{FF2B5EF4-FFF2-40B4-BE49-F238E27FC236}">
-                <a16:creationId xmlns:a16="http://schemas.microsoft.com/office/drawing/2014/main" xmlns="" id="{5938EDDB-B2B2-6642-9D20-6D7C5F9FED31}"/>
+                <a16:creationId xmlns:a16="http://schemas.microsoft.com/office/drawing/2014/main" id="{5938EDDB-B2B2-6642-9D20-6D7C5F9FED31}"/>
               </a:ext>
             </a:extLst>
           </p:cNvPr>
@@ -32395,7 +33291,7 @@
             <p:cNvPr id="178" name="Group 177">
               <a:extLst>
                 <a:ext uri="{FF2B5EF4-FFF2-40B4-BE49-F238E27FC236}">
-                  <a16:creationId xmlns:a16="http://schemas.microsoft.com/office/drawing/2014/main" xmlns="" id="{3527AD53-90A2-7D45-A4B7-509C2FD1C32F}"/>
+                  <a16:creationId xmlns:a16="http://schemas.microsoft.com/office/drawing/2014/main" id="{3527AD53-90A2-7D45-A4B7-509C2FD1C32F}"/>
                 </a:ext>
               </a:extLst>
             </p:cNvPr>
@@ -32415,7 +33311,7 @@
               <p:cNvPr id="180" name="Oval 179">
                 <a:extLst>
                   <a:ext uri="{FF2B5EF4-FFF2-40B4-BE49-F238E27FC236}">
-                    <a16:creationId xmlns:a16="http://schemas.microsoft.com/office/drawing/2014/main" xmlns="" id="{38BE8895-77F2-3F48-BDC0-E7E0559BA7AD}"/>
+                    <a16:creationId xmlns:a16="http://schemas.microsoft.com/office/drawing/2014/main" id="{38BE8895-77F2-3F48-BDC0-E7E0559BA7AD}"/>
                   </a:ext>
                 </a:extLst>
               </p:cNvPr>
@@ -32471,7 +33367,7 @@
               <p:cNvPr id="181" name="Picture 180">
                 <a:extLst>
                   <a:ext uri="{FF2B5EF4-FFF2-40B4-BE49-F238E27FC236}">
-                    <a16:creationId xmlns:a16="http://schemas.microsoft.com/office/drawing/2014/main" xmlns="" id="{1E774A8B-C5DB-534E-8EE3-5D936B2F1BDA}"/>
+                    <a16:creationId xmlns:a16="http://schemas.microsoft.com/office/drawing/2014/main" id="{1E774A8B-C5DB-534E-8EE3-5D936B2F1BDA}"/>
                   </a:ext>
                 </a:extLst>
               </p:cNvPr>
@@ -32508,7 +33404,7 @@
             <p:cNvPr id="179" name="Shape 576">
               <a:extLst>
                 <a:ext uri="{FF2B5EF4-FFF2-40B4-BE49-F238E27FC236}">
-                  <a16:creationId xmlns:a16="http://schemas.microsoft.com/office/drawing/2014/main" xmlns="" id="{8D66F62C-0857-0C4E-B8A3-3F8DBC721692}"/>
+                  <a16:creationId xmlns:a16="http://schemas.microsoft.com/office/drawing/2014/main" id="{8D66F62C-0857-0C4E-B8A3-3F8DBC721692}"/>
                 </a:ext>
               </a:extLst>
             </p:cNvPr>
@@ -32528,7 +33424,7 @@
             </a:ln>
             <a:extLst>
               <a:ext uri="{C572A759-6A51-4108-AA02-DFA0A04FC94B}">
-                <ma14:wrappingTextBoxFlag xmlns:ma14="http://schemas.microsoft.com/office/mac/drawingml/2011/main" val="1"/>
+                <ma14:wrappingTextBoxFlag xmlns:ma14="http://schemas.microsoft.com/office/mac/drawingml/2011/main" xmlns="" val="1"/>
               </a:ext>
             </a:extLst>
           </p:spPr>
@@ -32775,7 +33671,7 @@
           </a:ln>
           <a:extLst>
             <a:ext uri="{C572A759-6A51-4108-AA02-DFA0A04FC94B}">
-              <ma14:wrappingTextBoxFlag xmlns:ma14="http://schemas.microsoft.com/office/mac/drawingml/2011/main" val="1"/>
+              <ma14:wrappingTextBoxFlag xmlns:ma14="http://schemas.microsoft.com/office/mac/drawingml/2011/main" xmlns="" val="1"/>
             </a:ext>
           </a:extLst>
         </p:spPr>
@@ -32843,7 +33739,7 @@
           </a:ln>
           <a:extLst>
             <a:ext uri="{C572A759-6A51-4108-AA02-DFA0A04FC94B}">
-              <ma14:wrappingTextBoxFlag xmlns:ma14="http://schemas.microsoft.com/office/mac/drawingml/2011/main" val="1"/>
+              <ma14:wrappingTextBoxFlag xmlns:ma14="http://schemas.microsoft.com/office/mac/drawingml/2011/main" xmlns="" val="1"/>
             </a:ext>
           </a:extLst>
         </p:spPr>
@@ -33054,7 +33950,7 @@
           <p:cNvPr id="81" name="Group 80">
             <a:extLst>
               <a:ext uri="{FF2B5EF4-FFF2-40B4-BE49-F238E27FC236}">
-                <a16:creationId xmlns:a16="http://schemas.microsoft.com/office/drawing/2014/main" xmlns="" id="{5938EDDB-B2B2-6642-9D20-6D7C5F9FED31}"/>
+                <a16:creationId xmlns:a16="http://schemas.microsoft.com/office/drawing/2014/main" id="{5938EDDB-B2B2-6642-9D20-6D7C5F9FED31}"/>
               </a:ext>
             </a:extLst>
           </p:cNvPr>
@@ -33074,7 +33970,7 @@
             <p:cNvPr id="82" name="Group 81">
               <a:extLst>
                 <a:ext uri="{FF2B5EF4-FFF2-40B4-BE49-F238E27FC236}">
-                  <a16:creationId xmlns:a16="http://schemas.microsoft.com/office/drawing/2014/main" xmlns="" id="{3527AD53-90A2-7D45-A4B7-509C2FD1C32F}"/>
+                  <a16:creationId xmlns:a16="http://schemas.microsoft.com/office/drawing/2014/main" id="{3527AD53-90A2-7D45-A4B7-509C2FD1C32F}"/>
                 </a:ext>
               </a:extLst>
             </p:cNvPr>
@@ -33094,7 +33990,7 @@
               <p:cNvPr id="84" name="Oval 83">
                 <a:extLst>
                   <a:ext uri="{FF2B5EF4-FFF2-40B4-BE49-F238E27FC236}">
-                    <a16:creationId xmlns:a16="http://schemas.microsoft.com/office/drawing/2014/main" xmlns="" id="{38BE8895-77F2-3F48-BDC0-E7E0559BA7AD}"/>
+                    <a16:creationId xmlns:a16="http://schemas.microsoft.com/office/drawing/2014/main" id="{38BE8895-77F2-3F48-BDC0-E7E0559BA7AD}"/>
                   </a:ext>
                 </a:extLst>
               </p:cNvPr>
@@ -33150,7 +34046,7 @@
               <p:cNvPr id="85" name="Picture 84">
                 <a:extLst>
                   <a:ext uri="{FF2B5EF4-FFF2-40B4-BE49-F238E27FC236}">
-                    <a16:creationId xmlns:a16="http://schemas.microsoft.com/office/drawing/2014/main" xmlns="" id="{1E774A8B-C5DB-534E-8EE3-5D936B2F1BDA}"/>
+                    <a16:creationId xmlns:a16="http://schemas.microsoft.com/office/drawing/2014/main" id="{1E774A8B-C5DB-534E-8EE3-5D936B2F1BDA}"/>
                   </a:ext>
                 </a:extLst>
               </p:cNvPr>
@@ -33187,7 +34083,7 @@
             <p:cNvPr id="83" name="Shape 576">
               <a:extLst>
                 <a:ext uri="{FF2B5EF4-FFF2-40B4-BE49-F238E27FC236}">
-                  <a16:creationId xmlns:a16="http://schemas.microsoft.com/office/drawing/2014/main" xmlns="" id="{8D66F62C-0857-0C4E-B8A3-3F8DBC721692}"/>
+                  <a16:creationId xmlns:a16="http://schemas.microsoft.com/office/drawing/2014/main" id="{8D66F62C-0857-0C4E-B8A3-3F8DBC721692}"/>
                 </a:ext>
               </a:extLst>
             </p:cNvPr>
@@ -33207,7 +34103,7 @@
             </a:ln>
             <a:extLst>
               <a:ext uri="{C572A759-6A51-4108-AA02-DFA0A04FC94B}">
-                <ma14:wrappingTextBoxFlag xmlns:ma14="http://schemas.microsoft.com/office/mac/drawingml/2011/main" val="1"/>
+                <ma14:wrappingTextBoxFlag xmlns:ma14="http://schemas.microsoft.com/office/mac/drawingml/2011/main" xmlns="" val="1"/>
               </a:ext>
             </a:extLst>
           </p:spPr>
@@ -33385,7 +34281,7 @@
           <p:cNvPr id="91" name="Shape 488">
             <a:extLst>
               <a:ext uri="{FF2B5EF4-FFF2-40B4-BE49-F238E27FC236}">
-                <a16:creationId xmlns:a16="http://schemas.microsoft.com/office/drawing/2014/main" xmlns="" id="{AF461A76-EF63-EB4C-86A4-1C81FEDE6E02}"/>
+                <a16:creationId xmlns:a16="http://schemas.microsoft.com/office/drawing/2014/main" id="{AF461A76-EF63-EB4C-86A4-1C81FEDE6E02}"/>
               </a:ext>
             </a:extLst>
           </p:cNvPr>
@@ -33408,7 +34304,7 @@
           <a:effectLst/>
           <a:extLst>
             <a:ext uri="{C572A759-6A51-4108-AA02-DFA0A04FC94B}">
-              <ma14:wrappingTextBoxFlag xmlns:ma14="http://schemas.microsoft.com/office/mac/drawingml/2011/main" val="1"/>
+              <ma14:wrappingTextBoxFlag xmlns:ma14="http://schemas.microsoft.com/office/mac/drawingml/2011/main" xmlns="" val="1"/>
             </a:ext>
           </a:extLst>
         </p:spPr>
@@ -33592,7 +34488,7 @@
   <p:clrMapOvr>
     <a:masterClrMapping/>
   </p:clrMapOvr>
-  <p:transition xmlns:p14="http://schemas.microsoft.com/office/powerpoint/2010/main" spd="med"/>
+  <p:transition spd="med"/>
 </p:sld>
 </file>
 
@@ -33679,7 +34575,7 @@
             <a:effectLst/>
             <a:extLst>
               <a:ext uri="{C572A759-6A51-4108-AA02-DFA0A04FC94B}">
-                <ma14:wrappingTextBoxFlag xmlns:ma14="http://schemas.microsoft.com/office/mac/drawingml/2011/main" val="1"/>
+                <ma14:wrappingTextBoxFlag xmlns:ma14="http://schemas.microsoft.com/office/mac/drawingml/2011/main" xmlns="" val="1"/>
               </a:ext>
             </a:extLst>
           </p:spPr>
@@ -33753,7 +34649,7 @@
           <p:cNvPr id="34" name="Group 33">
             <a:extLst>
               <a:ext uri="{FF2B5EF4-FFF2-40B4-BE49-F238E27FC236}">
-                <a16:creationId xmlns:a16="http://schemas.microsoft.com/office/drawing/2014/main" xmlns="" id="{5938EDDB-B2B2-6642-9D20-6D7C5F9FED31}"/>
+                <a16:creationId xmlns:a16="http://schemas.microsoft.com/office/drawing/2014/main" id="{5938EDDB-B2B2-6642-9D20-6D7C5F9FED31}"/>
               </a:ext>
             </a:extLst>
           </p:cNvPr>
@@ -33773,7 +34669,7 @@
             <p:cNvPr id="35" name="Group 34">
               <a:extLst>
                 <a:ext uri="{FF2B5EF4-FFF2-40B4-BE49-F238E27FC236}">
-                  <a16:creationId xmlns:a16="http://schemas.microsoft.com/office/drawing/2014/main" xmlns="" id="{3527AD53-90A2-7D45-A4B7-509C2FD1C32F}"/>
+                  <a16:creationId xmlns:a16="http://schemas.microsoft.com/office/drawing/2014/main" id="{3527AD53-90A2-7D45-A4B7-509C2FD1C32F}"/>
                 </a:ext>
               </a:extLst>
             </p:cNvPr>
@@ -33793,7 +34689,7 @@
               <p:cNvPr id="37" name="Oval 36">
                 <a:extLst>
                   <a:ext uri="{FF2B5EF4-FFF2-40B4-BE49-F238E27FC236}">
-                    <a16:creationId xmlns:a16="http://schemas.microsoft.com/office/drawing/2014/main" xmlns="" id="{38BE8895-77F2-3F48-BDC0-E7E0559BA7AD}"/>
+                    <a16:creationId xmlns:a16="http://schemas.microsoft.com/office/drawing/2014/main" id="{38BE8895-77F2-3F48-BDC0-E7E0559BA7AD}"/>
                   </a:ext>
                 </a:extLst>
               </p:cNvPr>
@@ -33849,7 +34745,7 @@
               <p:cNvPr id="38" name="Picture 37">
                 <a:extLst>
                   <a:ext uri="{FF2B5EF4-FFF2-40B4-BE49-F238E27FC236}">
-                    <a16:creationId xmlns:a16="http://schemas.microsoft.com/office/drawing/2014/main" xmlns="" id="{1E774A8B-C5DB-534E-8EE3-5D936B2F1BDA}"/>
+                    <a16:creationId xmlns:a16="http://schemas.microsoft.com/office/drawing/2014/main" id="{1E774A8B-C5DB-534E-8EE3-5D936B2F1BDA}"/>
                   </a:ext>
                 </a:extLst>
               </p:cNvPr>
@@ -33886,7 +34782,7 @@
             <p:cNvPr id="36" name="Shape 576">
               <a:extLst>
                 <a:ext uri="{FF2B5EF4-FFF2-40B4-BE49-F238E27FC236}">
-                  <a16:creationId xmlns:a16="http://schemas.microsoft.com/office/drawing/2014/main" xmlns="" id="{8D66F62C-0857-0C4E-B8A3-3F8DBC721692}"/>
+                  <a16:creationId xmlns:a16="http://schemas.microsoft.com/office/drawing/2014/main" id="{8D66F62C-0857-0C4E-B8A3-3F8DBC721692}"/>
                 </a:ext>
               </a:extLst>
             </p:cNvPr>
@@ -33906,7 +34802,7 @@
             </a:ln>
             <a:extLst>
               <a:ext uri="{C572A759-6A51-4108-AA02-DFA0A04FC94B}">
-                <ma14:wrappingTextBoxFlag xmlns:ma14="http://schemas.microsoft.com/office/mac/drawingml/2011/main" val="1"/>
+                <ma14:wrappingTextBoxFlag xmlns:ma14="http://schemas.microsoft.com/office/mac/drawingml/2011/main" xmlns="" val="1"/>
               </a:ext>
             </a:extLst>
           </p:spPr>
@@ -34057,7 +34953,7 @@
             </a:ln>
             <a:extLst>
               <a:ext uri="{C572A759-6A51-4108-AA02-DFA0A04FC94B}">
-                <ma14:wrappingTextBoxFlag xmlns:ma14="http://schemas.microsoft.com/office/mac/drawingml/2011/main" val="1"/>
+                <ma14:wrappingTextBoxFlag xmlns:ma14="http://schemas.microsoft.com/office/mac/drawingml/2011/main" xmlns="" val="1"/>
               </a:ext>
             </a:extLst>
           </p:spPr>
@@ -34121,7 +35017,7 @@
           <p:cNvPr id="43" name="Group 42">
             <a:extLst>
               <a:ext uri="{FF2B5EF4-FFF2-40B4-BE49-F238E27FC236}">
-                <a16:creationId xmlns:a16="http://schemas.microsoft.com/office/drawing/2014/main" xmlns="" id="{414AC93B-86D8-5345-93C9-AD53BB74E355}"/>
+                <a16:creationId xmlns:a16="http://schemas.microsoft.com/office/drawing/2014/main" id="{414AC93B-86D8-5345-93C9-AD53BB74E355}"/>
               </a:ext>
             </a:extLst>
           </p:cNvPr>
@@ -34141,7 +35037,7 @@
             <p:cNvPr id="44" name="Shape 576">
               <a:extLst>
                 <a:ext uri="{FF2B5EF4-FFF2-40B4-BE49-F238E27FC236}">
-                  <a16:creationId xmlns:a16="http://schemas.microsoft.com/office/drawing/2014/main" xmlns="" id="{B830E1BD-415C-1647-B429-63A4B5950908}"/>
+                  <a16:creationId xmlns:a16="http://schemas.microsoft.com/office/drawing/2014/main" id="{B830E1BD-415C-1647-B429-63A4B5950908}"/>
                 </a:ext>
               </a:extLst>
             </p:cNvPr>
@@ -34161,7 +35057,7 @@
             </a:ln>
             <a:extLst>
               <a:ext uri="{C572A759-6A51-4108-AA02-DFA0A04FC94B}">
-                <ma14:wrappingTextBoxFlag xmlns:ma14="http://schemas.microsoft.com/office/mac/drawingml/2011/main" val="1"/>
+                <ma14:wrappingTextBoxFlag xmlns:ma14="http://schemas.microsoft.com/office/mac/drawingml/2011/main" xmlns="" val="1"/>
               </a:ext>
             </a:extLst>
           </p:spPr>
@@ -34198,7 +35094,7 @@
             <p:cNvPr id="45" name="Group 44">
               <a:extLst>
                 <a:ext uri="{FF2B5EF4-FFF2-40B4-BE49-F238E27FC236}">
-                  <a16:creationId xmlns:a16="http://schemas.microsoft.com/office/drawing/2014/main" xmlns="" id="{58675086-411D-5640-BC91-9D51D514E9D5}"/>
+                  <a16:creationId xmlns:a16="http://schemas.microsoft.com/office/drawing/2014/main" id="{58675086-411D-5640-BC91-9D51D514E9D5}"/>
                 </a:ext>
               </a:extLst>
             </p:cNvPr>
@@ -34218,7 +35114,7 @@
               <p:cNvPr id="46" name="Oval 45">
                 <a:extLst>
                   <a:ext uri="{FF2B5EF4-FFF2-40B4-BE49-F238E27FC236}">
-                    <a16:creationId xmlns:a16="http://schemas.microsoft.com/office/drawing/2014/main" xmlns="" id="{D2571F00-6E2C-1248-B833-819BA9F96071}"/>
+                    <a16:creationId xmlns:a16="http://schemas.microsoft.com/office/drawing/2014/main" id="{D2571F00-6E2C-1248-B833-819BA9F96071}"/>
                   </a:ext>
                 </a:extLst>
               </p:cNvPr>
@@ -34274,7 +35170,7 @@
               <p:cNvPr id="47" name="Picture 46">
                 <a:extLst>
                   <a:ext uri="{FF2B5EF4-FFF2-40B4-BE49-F238E27FC236}">
-                    <a16:creationId xmlns:a16="http://schemas.microsoft.com/office/drawing/2014/main" xmlns="" id="{EC8979B1-1A53-464F-82E9-1858F6AE5E53}"/>
+                    <a16:creationId xmlns:a16="http://schemas.microsoft.com/office/drawing/2014/main" id="{EC8979B1-1A53-464F-82E9-1858F6AE5E53}"/>
                   </a:ext>
                 </a:extLst>
               </p:cNvPr>
@@ -34312,7 +35208,7 @@
           <p:cNvPr id="48" name="Group 47">
             <a:extLst>
               <a:ext uri="{FF2B5EF4-FFF2-40B4-BE49-F238E27FC236}">
-                <a16:creationId xmlns:a16="http://schemas.microsoft.com/office/drawing/2014/main" xmlns="" id="{5938EDDB-B2B2-6642-9D20-6D7C5F9FED31}"/>
+                <a16:creationId xmlns:a16="http://schemas.microsoft.com/office/drawing/2014/main" id="{5938EDDB-B2B2-6642-9D20-6D7C5F9FED31}"/>
               </a:ext>
             </a:extLst>
           </p:cNvPr>
@@ -34332,7 +35228,7 @@
             <p:cNvPr id="49" name="Group 48">
               <a:extLst>
                 <a:ext uri="{FF2B5EF4-FFF2-40B4-BE49-F238E27FC236}">
-                  <a16:creationId xmlns:a16="http://schemas.microsoft.com/office/drawing/2014/main" xmlns="" id="{3527AD53-90A2-7D45-A4B7-509C2FD1C32F}"/>
+                  <a16:creationId xmlns:a16="http://schemas.microsoft.com/office/drawing/2014/main" id="{3527AD53-90A2-7D45-A4B7-509C2FD1C32F}"/>
                 </a:ext>
               </a:extLst>
             </p:cNvPr>
@@ -34352,7 +35248,7 @@
               <p:cNvPr id="51" name="Oval 50">
                 <a:extLst>
                   <a:ext uri="{FF2B5EF4-FFF2-40B4-BE49-F238E27FC236}">
-                    <a16:creationId xmlns:a16="http://schemas.microsoft.com/office/drawing/2014/main" xmlns="" id="{38BE8895-77F2-3F48-BDC0-E7E0559BA7AD}"/>
+                    <a16:creationId xmlns:a16="http://schemas.microsoft.com/office/drawing/2014/main" id="{38BE8895-77F2-3F48-BDC0-E7E0559BA7AD}"/>
                   </a:ext>
                 </a:extLst>
               </p:cNvPr>
@@ -34408,7 +35304,7 @@
               <p:cNvPr id="52" name="Picture 51">
                 <a:extLst>
                   <a:ext uri="{FF2B5EF4-FFF2-40B4-BE49-F238E27FC236}">
-                    <a16:creationId xmlns:a16="http://schemas.microsoft.com/office/drawing/2014/main" xmlns="" id="{1E774A8B-C5DB-534E-8EE3-5D936B2F1BDA}"/>
+                    <a16:creationId xmlns:a16="http://schemas.microsoft.com/office/drawing/2014/main" id="{1E774A8B-C5DB-534E-8EE3-5D936B2F1BDA}"/>
                   </a:ext>
                 </a:extLst>
               </p:cNvPr>
@@ -34445,7 +35341,7 @@
             <p:cNvPr id="50" name="Shape 576">
               <a:extLst>
                 <a:ext uri="{FF2B5EF4-FFF2-40B4-BE49-F238E27FC236}">
-                  <a16:creationId xmlns:a16="http://schemas.microsoft.com/office/drawing/2014/main" xmlns="" id="{8D66F62C-0857-0C4E-B8A3-3F8DBC721692}"/>
+                  <a16:creationId xmlns:a16="http://schemas.microsoft.com/office/drawing/2014/main" id="{8D66F62C-0857-0C4E-B8A3-3F8DBC721692}"/>
                 </a:ext>
               </a:extLst>
             </p:cNvPr>
@@ -34465,7 +35361,7 @@
             </a:ln>
             <a:extLst>
               <a:ext uri="{C572A759-6A51-4108-AA02-DFA0A04FC94B}">
-                <ma14:wrappingTextBoxFlag xmlns:ma14="http://schemas.microsoft.com/office/mac/drawingml/2011/main" val="1"/>
+                <ma14:wrappingTextBoxFlag xmlns:ma14="http://schemas.microsoft.com/office/mac/drawingml/2011/main" xmlns="" val="1"/>
               </a:ext>
             </a:extLst>
           </p:spPr>
@@ -34991,7 +35887,7 @@
             <a:effectLst/>
             <a:extLst>
               <a:ext uri="{C572A759-6A51-4108-AA02-DFA0A04FC94B}">
-                <ma14:wrappingTextBoxFlag xmlns:ma14="http://schemas.microsoft.com/office/mac/drawingml/2011/main" val="1"/>
+                <ma14:wrappingTextBoxFlag xmlns:ma14="http://schemas.microsoft.com/office/mac/drawingml/2011/main" xmlns="" val="1"/>
               </a:ext>
             </a:extLst>
           </p:spPr>
@@ -35143,7 +36039,7 @@
             <a:effectLst/>
             <a:extLst>
               <a:ext uri="{C572A759-6A51-4108-AA02-DFA0A04FC94B}">
-                <ma14:wrappingTextBoxFlag xmlns:ma14="http://schemas.microsoft.com/office/mac/drawingml/2011/main" val="1"/>
+                <ma14:wrappingTextBoxFlag xmlns:ma14="http://schemas.microsoft.com/office/mac/drawingml/2011/main" xmlns="" val="1"/>
               </a:ext>
             </a:extLst>
           </p:spPr>
@@ -35251,7 +36147,7 @@
           <a:effectLst/>
           <a:extLst>
             <a:ext uri="{C572A759-6A51-4108-AA02-DFA0A04FC94B}">
-              <ma14:wrappingTextBoxFlag xmlns:ma14="http://schemas.microsoft.com/office/mac/drawingml/2011/main" val="1"/>
+              <ma14:wrappingTextBoxFlag xmlns:ma14="http://schemas.microsoft.com/office/mac/drawingml/2011/main" xmlns="" val="1"/>
             </a:ext>
           </a:extLst>
         </p:spPr>
@@ -35451,7 +36347,7 @@
           <p:cNvPr id="170" name="Group 169">
             <a:extLst>
               <a:ext uri="{FF2B5EF4-FFF2-40B4-BE49-F238E27FC236}">
-                <a16:creationId xmlns:a16="http://schemas.microsoft.com/office/drawing/2014/main" xmlns="" id="{5938EDDB-B2B2-6642-9D20-6D7C5F9FED31}"/>
+                <a16:creationId xmlns:a16="http://schemas.microsoft.com/office/drawing/2014/main" id="{5938EDDB-B2B2-6642-9D20-6D7C5F9FED31}"/>
               </a:ext>
             </a:extLst>
           </p:cNvPr>
@@ -35471,7 +36367,7 @@
             <p:cNvPr id="171" name="Group 170">
               <a:extLst>
                 <a:ext uri="{FF2B5EF4-FFF2-40B4-BE49-F238E27FC236}">
-                  <a16:creationId xmlns:a16="http://schemas.microsoft.com/office/drawing/2014/main" xmlns="" id="{3527AD53-90A2-7D45-A4B7-509C2FD1C32F}"/>
+                  <a16:creationId xmlns:a16="http://schemas.microsoft.com/office/drawing/2014/main" id="{3527AD53-90A2-7D45-A4B7-509C2FD1C32F}"/>
                 </a:ext>
               </a:extLst>
             </p:cNvPr>
@@ -35491,7 +36387,7 @@
               <p:cNvPr id="173" name="Oval 172">
                 <a:extLst>
                   <a:ext uri="{FF2B5EF4-FFF2-40B4-BE49-F238E27FC236}">
-                    <a16:creationId xmlns:a16="http://schemas.microsoft.com/office/drawing/2014/main" xmlns="" id="{38BE8895-77F2-3F48-BDC0-E7E0559BA7AD}"/>
+                    <a16:creationId xmlns:a16="http://schemas.microsoft.com/office/drawing/2014/main" id="{38BE8895-77F2-3F48-BDC0-E7E0559BA7AD}"/>
                   </a:ext>
                 </a:extLst>
               </p:cNvPr>
@@ -35547,7 +36443,7 @@
               <p:cNvPr id="174" name="Picture 173">
                 <a:extLst>
                   <a:ext uri="{FF2B5EF4-FFF2-40B4-BE49-F238E27FC236}">
-                    <a16:creationId xmlns:a16="http://schemas.microsoft.com/office/drawing/2014/main" xmlns="" id="{1E774A8B-C5DB-534E-8EE3-5D936B2F1BDA}"/>
+                    <a16:creationId xmlns:a16="http://schemas.microsoft.com/office/drawing/2014/main" id="{1E774A8B-C5DB-534E-8EE3-5D936B2F1BDA}"/>
                   </a:ext>
                 </a:extLst>
               </p:cNvPr>
@@ -35584,7 +36480,7 @@
             <p:cNvPr id="172" name="Shape 576">
               <a:extLst>
                 <a:ext uri="{FF2B5EF4-FFF2-40B4-BE49-F238E27FC236}">
-                  <a16:creationId xmlns:a16="http://schemas.microsoft.com/office/drawing/2014/main" xmlns="" id="{8D66F62C-0857-0C4E-B8A3-3F8DBC721692}"/>
+                  <a16:creationId xmlns:a16="http://schemas.microsoft.com/office/drawing/2014/main" id="{8D66F62C-0857-0C4E-B8A3-3F8DBC721692}"/>
                 </a:ext>
               </a:extLst>
             </p:cNvPr>
@@ -35604,7 +36500,7 @@
             </a:ln>
             <a:extLst>
               <a:ext uri="{C572A759-6A51-4108-AA02-DFA0A04FC94B}">
-                <ma14:wrappingTextBoxFlag xmlns:ma14="http://schemas.microsoft.com/office/mac/drawingml/2011/main" val="1"/>
+                <ma14:wrappingTextBoxFlag xmlns:ma14="http://schemas.microsoft.com/office/mac/drawingml/2011/main" xmlns="" val="1"/>
               </a:ext>
             </a:extLst>
           </p:spPr>
@@ -35683,7 +36579,7 @@
           <p:cNvPr id="177" name="Group 176">
             <a:extLst>
               <a:ext uri="{FF2B5EF4-FFF2-40B4-BE49-F238E27FC236}">
-                <a16:creationId xmlns:a16="http://schemas.microsoft.com/office/drawing/2014/main" xmlns="" id="{5938EDDB-B2B2-6642-9D20-6D7C5F9FED31}"/>
+                <a16:creationId xmlns:a16="http://schemas.microsoft.com/office/drawing/2014/main" id="{5938EDDB-B2B2-6642-9D20-6D7C5F9FED31}"/>
               </a:ext>
             </a:extLst>
           </p:cNvPr>
@@ -35703,7 +36599,7 @@
             <p:cNvPr id="178" name="Group 177">
               <a:extLst>
                 <a:ext uri="{FF2B5EF4-FFF2-40B4-BE49-F238E27FC236}">
-                  <a16:creationId xmlns:a16="http://schemas.microsoft.com/office/drawing/2014/main" xmlns="" id="{3527AD53-90A2-7D45-A4B7-509C2FD1C32F}"/>
+                  <a16:creationId xmlns:a16="http://schemas.microsoft.com/office/drawing/2014/main" id="{3527AD53-90A2-7D45-A4B7-509C2FD1C32F}"/>
                 </a:ext>
               </a:extLst>
             </p:cNvPr>
@@ -35723,7 +36619,7 @@
               <p:cNvPr id="180" name="Oval 179">
                 <a:extLst>
                   <a:ext uri="{FF2B5EF4-FFF2-40B4-BE49-F238E27FC236}">
-                    <a16:creationId xmlns:a16="http://schemas.microsoft.com/office/drawing/2014/main" xmlns="" id="{38BE8895-77F2-3F48-BDC0-E7E0559BA7AD}"/>
+                    <a16:creationId xmlns:a16="http://schemas.microsoft.com/office/drawing/2014/main" id="{38BE8895-77F2-3F48-BDC0-E7E0559BA7AD}"/>
                   </a:ext>
                 </a:extLst>
               </p:cNvPr>
@@ -35779,7 +36675,7 @@
               <p:cNvPr id="181" name="Picture 180">
                 <a:extLst>
                   <a:ext uri="{FF2B5EF4-FFF2-40B4-BE49-F238E27FC236}">
-                    <a16:creationId xmlns:a16="http://schemas.microsoft.com/office/drawing/2014/main" xmlns="" id="{1E774A8B-C5DB-534E-8EE3-5D936B2F1BDA}"/>
+                    <a16:creationId xmlns:a16="http://schemas.microsoft.com/office/drawing/2014/main" id="{1E774A8B-C5DB-534E-8EE3-5D936B2F1BDA}"/>
                   </a:ext>
                 </a:extLst>
               </p:cNvPr>
@@ -35816,7 +36712,7 @@
             <p:cNvPr id="179" name="Shape 576">
               <a:extLst>
                 <a:ext uri="{FF2B5EF4-FFF2-40B4-BE49-F238E27FC236}">
-                  <a16:creationId xmlns:a16="http://schemas.microsoft.com/office/drawing/2014/main" xmlns="" id="{8D66F62C-0857-0C4E-B8A3-3F8DBC721692}"/>
+                  <a16:creationId xmlns:a16="http://schemas.microsoft.com/office/drawing/2014/main" id="{8D66F62C-0857-0C4E-B8A3-3F8DBC721692}"/>
                 </a:ext>
               </a:extLst>
             </p:cNvPr>
@@ -35836,7 +36732,7 @@
             </a:ln>
             <a:extLst>
               <a:ext uri="{C572A759-6A51-4108-AA02-DFA0A04FC94B}">
-                <ma14:wrappingTextBoxFlag xmlns:ma14="http://schemas.microsoft.com/office/mac/drawingml/2011/main" val="1"/>
+                <ma14:wrappingTextBoxFlag xmlns:ma14="http://schemas.microsoft.com/office/mac/drawingml/2011/main" xmlns="" val="1"/>
               </a:ext>
             </a:extLst>
           </p:spPr>
@@ -36083,7 +36979,7 @@
           </a:ln>
           <a:extLst>
             <a:ext uri="{C572A759-6A51-4108-AA02-DFA0A04FC94B}">
-              <ma14:wrappingTextBoxFlag xmlns:ma14="http://schemas.microsoft.com/office/mac/drawingml/2011/main" val="1"/>
+              <ma14:wrappingTextBoxFlag xmlns:ma14="http://schemas.microsoft.com/office/mac/drawingml/2011/main" xmlns="" val="1"/>
             </a:ext>
           </a:extLst>
         </p:spPr>
@@ -36151,7 +37047,7 @@
           </a:ln>
           <a:extLst>
             <a:ext uri="{C572A759-6A51-4108-AA02-DFA0A04FC94B}">
-              <ma14:wrappingTextBoxFlag xmlns:ma14="http://schemas.microsoft.com/office/mac/drawingml/2011/main" val="1"/>
+              <ma14:wrappingTextBoxFlag xmlns:ma14="http://schemas.microsoft.com/office/mac/drawingml/2011/main" xmlns="" val="1"/>
             </a:ext>
           </a:extLst>
         </p:spPr>
@@ -36524,7 +37420,7 @@
   <p:clrMapOvr>
     <a:masterClrMapping/>
   </p:clrMapOvr>
-  <p:transition xmlns:p14="http://schemas.microsoft.com/office/powerpoint/2010/main" spd="med"/>
+  <p:transition spd="med"/>
 </p:sld>
 </file>
 
@@ -36997,7 +37893,7 @@
           </a:ln>
           <a:extLst>
             <a:ext uri="{C572A759-6A51-4108-AA02-DFA0A04FC94B}">
-              <ma14:wrappingTextBoxFlag xmlns:ma14="http://schemas.microsoft.com/office/mac/drawingml/2011/main" val="1"/>
+              <ma14:wrappingTextBoxFlag xmlns:ma14="http://schemas.microsoft.com/office/mac/drawingml/2011/main" xmlns="" val="1"/>
             </a:ext>
           </a:extLst>
         </p:spPr>
@@ -37123,7 +38019,7 @@
           </a:ln>
           <a:extLst>
             <a:ext uri="{C572A759-6A51-4108-AA02-DFA0A04FC94B}">
-              <ma14:wrappingTextBoxFlag xmlns:ma14="http://schemas.microsoft.com/office/mac/drawingml/2011/main" val="1"/>
+              <ma14:wrappingTextBoxFlag xmlns:ma14="http://schemas.microsoft.com/office/mac/drawingml/2011/main" xmlns="" val="1"/>
             </a:ext>
           </a:extLst>
         </p:spPr>
@@ -37530,7 +38426,7 @@
           </a:ln>
           <a:extLst>
             <a:ext uri="{C572A759-6A51-4108-AA02-DFA0A04FC94B}">
-              <ma14:wrappingTextBoxFlag xmlns:ma14="http://schemas.microsoft.com/office/mac/drawingml/2011/main" val="1"/>
+              <ma14:wrappingTextBoxFlag xmlns:ma14="http://schemas.microsoft.com/office/mac/drawingml/2011/main" xmlns="" val="1"/>
             </a:ext>
           </a:extLst>
         </p:spPr>
@@ -37744,7 +38640,7 @@
             <a:effectLst/>
             <a:extLst>
               <a:ext uri="{C572A759-6A51-4108-AA02-DFA0A04FC94B}">
-                <ma14:wrappingTextBoxFlag xmlns:ma14="http://schemas.microsoft.com/office/mac/drawingml/2011/main" val="1"/>
+                <ma14:wrappingTextBoxFlag xmlns:ma14="http://schemas.microsoft.com/office/mac/drawingml/2011/main" xmlns="" val="1"/>
               </a:ext>
             </a:extLst>
           </p:spPr>
@@ -37910,7 +38806,7 @@
           <p:cNvPr id="218" name="Group 217">
             <a:extLst>
               <a:ext uri="{FF2B5EF4-FFF2-40B4-BE49-F238E27FC236}">
-                <a16:creationId xmlns:a16="http://schemas.microsoft.com/office/drawing/2014/main" xmlns="" id="{5938EDDB-B2B2-6642-9D20-6D7C5F9FED31}"/>
+                <a16:creationId xmlns:a16="http://schemas.microsoft.com/office/drawing/2014/main" id="{5938EDDB-B2B2-6642-9D20-6D7C5F9FED31}"/>
               </a:ext>
             </a:extLst>
           </p:cNvPr>
@@ -37930,7 +38826,7 @@
             <p:cNvPr id="219" name="Group 218">
               <a:extLst>
                 <a:ext uri="{FF2B5EF4-FFF2-40B4-BE49-F238E27FC236}">
-                  <a16:creationId xmlns:a16="http://schemas.microsoft.com/office/drawing/2014/main" xmlns="" id="{3527AD53-90A2-7D45-A4B7-509C2FD1C32F}"/>
+                  <a16:creationId xmlns:a16="http://schemas.microsoft.com/office/drawing/2014/main" id="{3527AD53-90A2-7D45-A4B7-509C2FD1C32F}"/>
                 </a:ext>
               </a:extLst>
             </p:cNvPr>
@@ -37950,7 +38846,7 @@
               <p:cNvPr id="221" name="Oval 220">
                 <a:extLst>
                   <a:ext uri="{FF2B5EF4-FFF2-40B4-BE49-F238E27FC236}">
-                    <a16:creationId xmlns:a16="http://schemas.microsoft.com/office/drawing/2014/main" xmlns="" id="{38BE8895-77F2-3F48-BDC0-E7E0559BA7AD}"/>
+                    <a16:creationId xmlns:a16="http://schemas.microsoft.com/office/drawing/2014/main" id="{38BE8895-77F2-3F48-BDC0-E7E0559BA7AD}"/>
                   </a:ext>
                 </a:extLst>
               </p:cNvPr>
@@ -38006,7 +38902,7 @@
               <p:cNvPr id="222" name="Picture 221">
                 <a:extLst>
                   <a:ext uri="{FF2B5EF4-FFF2-40B4-BE49-F238E27FC236}">
-                    <a16:creationId xmlns:a16="http://schemas.microsoft.com/office/drawing/2014/main" xmlns="" id="{1E774A8B-C5DB-534E-8EE3-5D936B2F1BDA}"/>
+                    <a16:creationId xmlns:a16="http://schemas.microsoft.com/office/drawing/2014/main" id="{1E774A8B-C5DB-534E-8EE3-5D936B2F1BDA}"/>
                   </a:ext>
                 </a:extLst>
               </p:cNvPr>
@@ -38043,7 +38939,7 @@
             <p:cNvPr id="220" name="Shape 576">
               <a:extLst>
                 <a:ext uri="{FF2B5EF4-FFF2-40B4-BE49-F238E27FC236}">
-                  <a16:creationId xmlns:a16="http://schemas.microsoft.com/office/drawing/2014/main" xmlns="" id="{8D66F62C-0857-0C4E-B8A3-3F8DBC721692}"/>
+                  <a16:creationId xmlns:a16="http://schemas.microsoft.com/office/drawing/2014/main" id="{8D66F62C-0857-0C4E-B8A3-3F8DBC721692}"/>
                 </a:ext>
               </a:extLst>
             </p:cNvPr>
@@ -38063,7 +38959,7 @@
             </a:ln>
             <a:extLst>
               <a:ext uri="{C572A759-6A51-4108-AA02-DFA0A04FC94B}">
-                <ma14:wrappingTextBoxFlag xmlns:ma14="http://schemas.microsoft.com/office/mac/drawingml/2011/main" val="1"/>
+                <ma14:wrappingTextBoxFlag xmlns:ma14="http://schemas.microsoft.com/office/mac/drawingml/2011/main" xmlns="" val="1"/>
               </a:ext>
             </a:extLst>
           </p:spPr>
@@ -38546,7 +39442,7 @@
           </a:ln>
           <a:extLst>
             <a:ext uri="{C572A759-6A51-4108-AA02-DFA0A04FC94B}">
-              <ma14:wrappingTextBoxFlag xmlns:ma14="http://schemas.microsoft.com/office/mac/drawingml/2011/main" val="1"/>
+              <ma14:wrappingTextBoxFlag xmlns:ma14="http://schemas.microsoft.com/office/mac/drawingml/2011/main" xmlns="" val="1"/>
             </a:ext>
           </a:extLst>
         </p:spPr>
@@ -39214,7 +40110,7 @@
   <p:clrMapOvr>
     <a:masterClrMapping/>
   </p:clrMapOvr>
-  <p:transition xmlns:p14="http://schemas.microsoft.com/office/powerpoint/2010/main" spd="med"/>
+  <p:transition spd="med"/>
 </p:sld>
 </file>
 
@@ -39663,7 +40559,7 @@
           </a:ln>
           <a:extLst>
             <a:ext uri="{C572A759-6A51-4108-AA02-DFA0A04FC94B}">
-              <ma14:wrappingTextBoxFlag xmlns:ma14="http://schemas.microsoft.com/office/mac/drawingml/2011/main" val="1"/>
+              <ma14:wrappingTextBoxFlag xmlns:ma14="http://schemas.microsoft.com/office/mac/drawingml/2011/main" xmlns="" val="1"/>
             </a:ext>
           </a:extLst>
         </p:spPr>
@@ -39789,7 +40685,7 @@
           </a:ln>
           <a:extLst>
             <a:ext uri="{C572A759-6A51-4108-AA02-DFA0A04FC94B}">
-              <ma14:wrappingTextBoxFlag xmlns:ma14="http://schemas.microsoft.com/office/mac/drawingml/2011/main" val="1"/>
+              <ma14:wrappingTextBoxFlag xmlns:ma14="http://schemas.microsoft.com/office/mac/drawingml/2011/main" xmlns="" val="1"/>
             </a:ext>
           </a:extLst>
         </p:spPr>
@@ -40196,7 +41092,7 @@
           </a:ln>
           <a:extLst>
             <a:ext uri="{C572A759-6A51-4108-AA02-DFA0A04FC94B}">
-              <ma14:wrappingTextBoxFlag xmlns:ma14="http://schemas.microsoft.com/office/mac/drawingml/2011/main" val="1"/>
+              <ma14:wrappingTextBoxFlag xmlns:ma14="http://schemas.microsoft.com/office/mac/drawingml/2011/main" xmlns="" val="1"/>
             </a:ext>
           </a:extLst>
         </p:spPr>
@@ -40410,7 +41306,7 @@
             <a:effectLst/>
             <a:extLst>
               <a:ext uri="{C572A759-6A51-4108-AA02-DFA0A04FC94B}">
-                <ma14:wrappingTextBoxFlag xmlns:ma14="http://schemas.microsoft.com/office/mac/drawingml/2011/main" val="1"/>
+                <ma14:wrappingTextBoxFlag xmlns:ma14="http://schemas.microsoft.com/office/mac/drawingml/2011/main" xmlns="" val="1"/>
               </a:ext>
             </a:extLst>
           </p:spPr>
@@ -40576,7 +41472,7 @@
           <p:cNvPr id="218" name="Group 217">
             <a:extLst>
               <a:ext uri="{FF2B5EF4-FFF2-40B4-BE49-F238E27FC236}">
-                <a16:creationId xmlns:a16="http://schemas.microsoft.com/office/drawing/2014/main" xmlns="" id="{5938EDDB-B2B2-6642-9D20-6D7C5F9FED31}"/>
+                <a16:creationId xmlns:a16="http://schemas.microsoft.com/office/drawing/2014/main" id="{5938EDDB-B2B2-6642-9D20-6D7C5F9FED31}"/>
               </a:ext>
             </a:extLst>
           </p:cNvPr>
@@ -40596,7 +41492,7 @@
             <p:cNvPr id="219" name="Group 218">
               <a:extLst>
                 <a:ext uri="{FF2B5EF4-FFF2-40B4-BE49-F238E27FC236}">
-                  <a16:creationId xmlns:a16="http://schemas.microsoft.com/office/drawing/2014/main" xmlns="" id="{3527AD53-90A2-7D45-A4B7-509C2FD1C32F}"/>
+                  <a16:creationId xmlns:a16="http://schemas.microsoft.com/office/drawing/2014/main" id="{3527AD53-90A2-7D45-A4B7-509C2FD1C32F}"/>
                 </a:ext>
               </a:extLst>
             </p:cNvPr>
@@ -40616,7 +41512,7 @@
               <p:cNvPr id="221" name="Oval 220">
                 <a:extLst>
                   <a:ext uri="{FF2B5EF4-FFF2-40B4-BE49-F238E27FC236}">
-                    <a16:creationId xmlns:a16="http://schemas.microsoft.com/office/drawing/2014/main" xmlns="" id="{38BE8895-77F2-3F48-BDC0-E7E0559BA7AD}"/>
+                    <a16:creationId xmlns:a16="http://schemas.microsoft.com/office/drawing/2014/main" id="{38BE8895-77F2-3F48-BDC0-E7E0559BA7AD}"/>
                   </a:ext>
                 </a:extLst>
               </p:cNvPr>
@@ -40672,7 +41568,7 @@
               <p:cNvPr id="222" name="Picture 221">
                 <a:extLst>
                   <a:ext uri="{FF2B5EF4-FFF2-40B4-BE49-F238E27FC236}">
-                    <a16:creationId xmlns:a16="http://schemas.microsoft.com/office/drawing/2014/main" xmlns="" id="{1E774A8B-C5DB-534E-8EE3-5D936B2F1BDA}"/>
+                    <a16:creationId xmlns:a16="http://schemas.microsoft.com/office/drawing/2014/main" id="{1E774A8B-C5DB-534E-8EE3-5D936B2F1BDA}"/>
                   </a:ext>
                 </a:extLst>
               </p:cNvPr>
@@ -40709,7 +41605,7 @@
             <p:cNvPr id="220" name="Shape 576">
               <a:extLst>
                 <a:ext uri="{FF2B5EF4-FFF2-40B4-BE49-F238E27FC236}">
-                  <a16:creationId xmlns:a16="http://schemas.microsoft.com/office/drawing/2014/main" xmlns="" id="{8D66F62C-0857-0C4E-B8A3-3F8DBC721692}"/>
+                  <a16:creationId xmlns:a16="http://schemas.microsoft.com/office/drawing/2014/main" id="{8D66F62C-0857-0C4E-B8A3-3F8DBC721692}"/>
                 </a:ext>
               </a:extLst>
             </p:cNvPr>
@@ -40729,7 +41625,7 @@
             </a:ln>
             <a:extLst>
               <a:ext uri="{C572A759-6A51-4108-AA02-DFA0A04FC94B}">
-                <ma14:wrappingTextBoxFlag xmlns:ma14="http://schemas.microsoft.com/office/mac/drawingml/2011/main" val="1"/>
+                <ma14:wrappingTextBoxFlag xmlns:ma14="http://schemas.microsoft.com/office/mac/drawingml/2011/main" xmlns="" val="1"/>
               </a:ext>
             </a:extLst>
           </p:spPr>
@@ -41212,7 +42108,7 @@
           </a:ln>
           <a:extLst>
             <a:ext uri="{C572A759-6A51-4108-AA02-DFA0A04FC94B}">
-              <ma14:wrappingTextBoxFlag xmlns:ma14="http://schemas.microsoft.com/office/mac/drawingml/2011/main" val="1"/>
+              <ma14:wrappingTextBoxFlag xmlns:ma14="http://schemas.microsoft.com/office/mac/drawingml/2011/main" xmlns="" val="1"/>
             </a:ext>
           </a:extLst>
         </p:spPr>
@@ -41904,7 +42800,7 @@
   <p:clrMapOvr>
     <a:masterClrMapping/>
   </p:clrMapOvr>
-  <p:transition xmlns:p14="http://schemas.microsoft.com/office/powerpoint/2010/main" spd="med"/>
+  <p:transition spd="med"/>
 </p:sld>
 </file>
 
@@ -42042,7 +42938,7 @@
             </a:ln>
             <a:extLst>
               <a:ext uri="{C572A759-6A51-4108-AA02-DFA0A04FC94B}">
-                <ma14:wrappingTextBoxFlag xmlns:ma14="http://schemas.microsoft.com/office/mac/drawingml/2011/main" val="1"/>
+                <ma14:wrappingTextBoxFlag xmlns:ma14="http://schemas.microsoft.com/office/mac/drawingml/2011/main" xmlns="" val="1"/>
               </a:ext>
             </a:extLst>
           </p:spPr>
@@ -42236,7 +43132,7 @@
           </a:ln>
           <a:extLst>
             <a:ext uri="{C572A759-6A51-4108-AA02-DFA0A04FC94B}">
-              <ma14:wrappingTextBoxFlag xmlns:ma14="http://schemas.microsoft.com/office/mac/drawingml/2011/main" val="1"/>
+              <ma14:wrappingTextBoxFlag xmlns:ma14="http://schemas.microsoft.com/office/mac/drawingml/2011/main" xmlns="" val="1"/>
             </a:ext>
           </a:extLst>
         </p:spPr>
@@ -42304,7 +43200,7 @@
           </a:ln>
           <a:extLst>
             <a:ext uri="{C572A759-6A51-4108-AA02-DFA0A04FC94B}">
-              <ma14:wrappingTextBoxFlag xmlns:ma14="http://schemas.microsoft.com/office/mac/drawingml/2011/main" val="1"/>
+              <ma14:wrappingTextBoxFlag xmlns:ma14="http://schemas.microsoft.com/office/mac/drawingml/2011/main" xmlns="" val="1"/>
             </a:ext>
           </a:extLst>
         </p:spPr>
@@ -42765,7 +43661,7 @@
             <a:effectLst/>
             <a:extLst>
               <a:ext uri="{C572A759-6A51-4108-AA02-DFA0A04FC94B}">
-                <ma14:wrappingTextBoxFlag xmlns:ma14="http://schemas.microsoft.com/office/mac/drawingml/2011/main" val="1"/>
+                <ma14:wrappingTextBoxFlag xmlns:ma14="http://schemas.microsoft.com/office/mac/drawingml/2011/main" xmlns="" val="1"/>
               </a:ext>
             </a:extLst>
           </p:spPr>
@@ -42856,7 +43752,7 @@
           <p:cNvPr id="188" name="Group 187">
             <a:extLst>
               <a:ext uri="{FF2B5EF4-FFF2-40B4-BE49-F238E27FC236}">
-                <a16:creationId xmlns:a16="http://schemas.microsoft.com/office/drawing/2014/main" xmlns="" id="{5938EDDB-B2B2-6642-9D20-6D7C5F9FED31}"/>
+                <a16:creationId xmlns:a16="http://schemas.microsoft.com/office/drawing/2014/main" id="{5938EDDB-B2B2-6642-9D20-6D7C5F9FED31}"/>
               </a:ext>
             </a:extLst>
           </p:cNvPr>
@@ -42876,7 +43772,7 @@
             <p:cNvPr id="189" name="Group 188">
               <a:extLst>
                 <a:ext uri="{FF2B5EF4-FFF2-40B4-BE49-F238E27FC236}">
-                  <a16:creationId xmlns:a16="http://schemas.microsoft.com/office/drawing/2014/main" xmlns="" id="{3527AD53-90A2-7D45-A4B7-509C2FD1C32F}"/>
+                  <a16:creationId xmlns:a16="http://schemas.microsoft.com/office/drawing/2014/main" id="{3527AD53-90A2-7D45-A4B7-509C2FD1C32F}"/>
                 </a:ext>
               </a:extLst>
             </p:cNvPr>
@@ -42896,7 +43792,7 @@
               <p:cNvPr id="191" name="Oval 190">
                 <a:extLst>
                   <a:ext uri="{FF2B5EF4-FFF2-40B4-BE49-F238E27FC236}">
-                    <a16:creationId xmlns:a16="http://schemas.microsoft.com/office/drawing/2014/main" xmlns="" id="{38BE8895-77F2-3F48-BDC0-E7E0559BA7AD}"/>
+                    <a16:creationId xmlns:a16="http://schemas.microsoft.com/office/drawing/2014/main" id="{38BE8895-77F2-3F48-BDC0-E7E0559BA7AD}"/>
                   </a:ext>
                 </a:extLst>
               </p:cNvPr>
@@ -42952,7 +43848,7 @@
               <p:cNvPr id="192" name="Picture 191">
                 <a:extLst>
                   <a:ext uri="{FF2B5EF4-FFF2-40B4-BE49-F238E27FC236}">
-                    <a16:creationId xmlns:a16="http://schemas.microsoft.com/office/drawing/2014/main" xmlns="" id="{1E774A8B-C5DB-534E-8EE3-5D936B2F1BDA}"/>
+                    <a16:creationId xmlns:a16="http://schemas.microsoft.com/office/drawing/2014/main" id="{1E774A8B-C5DB-534E-8EE3-5D936B2F1BDA}"/>
                   </a:ext>
                 </a:extLst>
               </p:cNvPr>
@@ -42989,7 +43885,7 @@
             <p:cNvPr id="190" name="Shape 576">
               <a:extLst>
                 <a:ext uri="{FF2B5EF4-FFF2-40B4-BE49-F238E27FC236}">
-                  <a16:creationId xmlns:a16="http://schemas.microsoft.com/office/drawing/2014/main" xmlns="" id="{8D66F62C-0857-0C4E-B8A3-3F8DBC721692}"/>
+                  <a16:creationId xmlns:a16="http://schemas.microsoft.com/office/drawing/2014/main" id="{8D66F62C-0857-0C4E-B8A3-3F8DBC721692}"/>
                 </a:ext>
               </a:extLst>
             </p:cNvPr>
@@ -43009,7 +43905,7 @@
             </a:ln>
             <a:extLst>
               <a:ext uri="{C572A759-6A51-4108-AA02-DFA0A04FC94B}">
-                <ma14:wrappingTextBoxFlag xmlns:ma14="http://schemas.microsoft.com/office/mac/drawingml/2011/main" val="1"/>
+                <ma14:wrappingTextBoxFlag xmlns:ma14="http://schemas.microsoft.com/office/mac/drawingml/2011/main" xmlns="" val="1"/>
               </a:ext>
             </a:extLst>
           </p:spPr>
@@ -43340,7 +44236,7 @@
           </a:ln>
           <a:extLst>
             <a:ext uri="{C572A759-6A51-4108-AA02-DFA0A04FC94B}">
-              <ma14:wrappingTextBoxFlag xmlns:ma14="http://schemas.microsoft.com/office/mac/drawingml/2011/main" val="1"/>
+              <ma14:wrappingTextBoxFlag xmlns:ma14="http://schemas.microsoft.com/office/mac/drawingml/2011/main" xmlns="" val="1"/>
             </a:ext>
           </a:extLst>
         </p:spPr>
@@ -43708,7 +44604,7 @@
   <p:clrMapOvr>
     <a:masterClrMapping/>
   </p:clrMapOvr>
-  <p:transition xmlns:p14="http://schemas.microsoft.com/office/powerpoint/2010/main" spd="med"/>
+  <p:transition spd="med"/>
 </p:sld>
 </file>
 
@@ -43894,7 +44790,7 @@
             </a:ln>
             <a:extLst>
               <a:ext uri="{C572A759-6A51-4108-AA02-DFA0A04FC94B}">
-                <ma14:wrappingTextBoxFlag xmlns:ma14="http://schemas.microsoft.com/office/mac/drawingml/2011/main" val="1"/>
+                <ma14:wrappingTextBoxFlag xmlns:ma14="http://schemas.microsoft.com/office/mac/drawingml/2011/main" xmlns="" val="1"/>
               </a:ext>
             </a:extLst>
           </p:spPr>
@@ -44100,7 +44996,7 @@
           </a:ln>
           <a:extLst>
             <a:ext uri="{C572A759-6A51-4108-AA02-DFA0A04FC94B}">
-              <ma14:wrappingTextBoxFlag xmlns:ma14="http://schemas.microsoft.com/office/mac/drawingml/2011/main" val="1"/>
+              <ma14:wrappingTextBoxFlag xmlns:ma14="http://schemas.microsoft.com/office/mac/drawingml/2011/main" xmlns="" val="1"/>
             </a:ext>
           </a:extLst>
         </p:spPr>
@@ -44168,7 +45064,7 @@
           </a:ln>
           <a:extLst>
             <a:ext uri="{C572A759-6A51-4108-AA02-DFA0A04FC94B}">
-              <ma14:wrappingTextBoxFlag xmlns:ma14="http://schemas.microsoft.com/office/mac/drawingml/2011/main" val="1"/>
+              <ma14:wrappingTextBoxFlag xmlns:ma14="http://schemas.microsoft.com/office/mac/drawingml/2011/main" xmlns="" val="1"/>
             </a:ext>
           </a:extLst>
         </p:spPr>
@@ -44539,7 +45435,7 @@
             <a:effectLst/>
             <a:extLst>
               <a:ext uri="{C572A759-6A51-4108-AA02-DFA0A04FC94B}">
-                <ma14:wrappingTextBoxFlag xmlns:ma14="http://schemas.microsoft.com/office/mac/drawingml/2011/main" val="1"/>
+                <ma14:wrappingTextBoxFlag xmlns:ma14="http://schemas.microsoft.com/office/mac/drawingml/2011/main" xmlns="" val="1"/>
               </a:ext>
             </a:extLst>
           </p:spPr>
@@ -44630,7 +45526,7 @@
           <p:cNvPr id="188" name="Group 187">
             <a:extLst>
               <a:ext uri="{FF2B5EF4-FFF2-40B4-BE49-F238E27FC236}">
-                <a16:creationId xmlns:a16="http://schemas.microsoft.com/office/drawing/2014/main" xmlns="" id="{5938EDDB-B2B2-6642-9D20-6D7C5F9FED31}"/>
+                <a16:creationId xmlns:a16="http://schemas.microsoft.com/office/drawing/2014/main" id="{5938EDDB-B2B2-6642-9D20-6D7C5F9FED31}"/>
               </a:ext>
             </a:extLst>
           </p:cNvPr>
@@ -44650,7 +45546,7 @@
             <p:cNvPr id="189" name="Group 188">
               <a:extLst>
                 <a:ext uri="{FF2B5EF4-FFF2-40B4-BE49-F238E27FC236}">
-                  <a16:creationId xmlns:a16="http://schemas.microsoft.com/office/drawing/2014/main" xmlns="" id="{3527AD53-90A2-7D45-A4B7-509C2FD1C32F}"/>
+                  <a16:creationId xmlns:a16="http://schemas.microsoft.com/office/drawing/2014/main" id="{3527AD53-90A2-7D45-A4B7-509C2FD1C32F}"/>
                 </a:ext>
               </a:extLst>
             </p:cNvPr>
@@ -44670,7 +45566,7 @@
               <p:cNvPr id="191" name="Oval 190">
                 <a:extLst>
                   <a:ext uri="{FF2B5EF4-FFF2-40B4-BE49-F238E27FC236}">
-                    <a16:creationId xmlns:a16="http://schemas.microsoft.com/office/drawing/2014/main" xmlns="" id="{38BE8895-77F2-3F48-BDC0-E7E0559BA7AD}"/>
+                    <a16:creationId xmlns:a16="http://schemas.microsoft.com/office/drawing/2014/main" id="{38BE8895-77F2-3F48-BDC0-E7E0559BA7AD}"/>
                   </a:ext>
                 </a:extLst>
               </p:cNvPr>
@@ -44726,7 +45622,7 @@
               <p:cNvPr id="192" name="Picture 191">
                 <a:extLst>
                   <a:ext uri="{FF2B5EF4-FFF2-40B4-BE49-F238E27FC236}">
-                    <a16:creationId xmlns:a16="http://schemas.microsoft.com/office/drawing/2014/main" xmlns="" id="{1E774A8B-C5DB-534E-8EE3-5D936B2F1BDA}"/>
+                    <a16:creationId xmlns:a16="http://schemas.microsoft.com/office/drawing/2014/main" id="{1E774A8B-C5DB-534E-8EE3-5D936B2F1BDA}"/>
                   </a:ext>
                 </a:extLst>
               </p:cNvPr>
@@ -44763,7 +45659,7 @@
             <p:cNvPr id="190" name="Shape 576">
               <a:extLst>
                 <a:ext uri="{FF2B5EF4-FFF2-40B4-BE49-F238E27FC236}">
-                  <a16:creationId xmlns:a16="http://schemas.microsoft.com/office/drawing/2014/main" xmlns="" id="{8D66F62C-0857-0C4E-B8A3-3F8DBC721692}"/>
+                  <a16:creationId xmlns:a16="http://schemas.microsoft.com/office/drawing/2014/main" id="{8D66F62C-0857-0C4E-B8A3-3F8DBC721692}"/>
                 </a:ext>
               </a:extLst>
             </p:cNvPr>
@@ -44783,7 +45679,7 @@
             </a:ln>
             <a:extLst>
               <a:ext uri="{C572A759-6A51-4108-AA02-DFA0A04FC94B}">
-                <ma14:wrappingTextBoxFlag xmlns:ma14="http://schemas.microsoft.com/office/mac/drawingml/2011/main" val="1"/>
+                <ma14:wrappingTextBoxFlag xmlns:ma14="http://schemas.microsoft.com/office/mac/drawingml/2011/main" xmlns="" val="1"/>
               </a:ext>
             </a:extLst>
           </p:spPr>
@@ -45078,7 +45974,7 @@
           </a:ln>
           <a:extLst>
             <a:ext uri="{C572A759-6A51-4108-AA02-DFA0A04FC94B}">
-              <ma14:wrappingTextBoxFlag xmlns:ma14="http://schemas.microsoft.com/office/mac/drawingml/2011/main" val="1"/>
+              <ma14:wrappingTextBoxFlag xmlns:ma14="http://schemas.microsoft.com/office/mac/drawingml/2011/main" xmlns="" val="1"/>
             </a:ext>
           </a:extLst>
         </p:spPr>
@@ -45453,7 +46349,7 @@
   <p:clrMapOvr>
     <a:masterClrMapping/>
   </p:clrMapOvr>
-  <p:transition xmlns:p14="http://schemas.microsoft.com/office/powerpoint/2010/main" spd="med"/>
+  <p:transition spd="med"/>
 </p:sld>
 </file>
 
@@ -45479,7 +46375,7 @@
           <p:cNvPr id="2" name="TextBox 1">
             <a:extLst>
               <a:ext uri="{FF2B5EF4-FFF2-40B4-BE49-F238E27FC236}">
-                <a16:creationId xmlns:a16="http://schemas.microsoft.com/office/drawing/2014/main" xmlns="" id="{87C07FF8-CBD9-BE44-A19C-3A5A734DAEA8}"/>
+                <a16:creationId xmlns:a16="http://schemas.microsoft.com/office/drawing/2014/main" id="{87C07FF8-CBD9-BE44-A19C-3A5A734DAEA8}"/>
               </a:ext>
             </a:extLst>
           </p:cNvPr>
@@ -45565,7 +46461,7 @@
   <p:clrMapOvr>
     <a:masterClrMapping/>
   </p:clrMapOvr>
-  <p:transition xmlns:p14="http://schemas.microsoft.com/office/powerpoint/2010/main" spd="med"/>
+  <p:transition spd="med"/>
 </p:sld>
 </file>
 

</xml_diff>

<commit_message>
change port and restructure Dockerfile and YAMLs for the scores service-
</commit_message>
<xml_diff>
--- a/images/architecture.pptx
+++ b/images/architecture.pptx
@@ -5,7 +5,7 @@
     <p:sldMasterId id="2147483648" r:id="rId1"/>
   </p:sldMasterIdLst>
   <p:notesMasterIdLst>
-    <p:notesMasterId r:id="rId20"/>
+    <p:notesMasterId r:id="rId22"/>
   </p:notesMasterIdLst>
   <p:sldIdLst>
     <p:sldId id="325" r:id="rId2"/>
@@ -26,6 +26,8 @@
     <p:sldId id="346" r:id="rId17"/>
     <p:sldId id="349" r:id="rId18"/>
     <p:sldId id="350" r:id="rId19"/>
+    <p:sldId id="352" r:id="rId20"/>
+    <p:sldId id="351" r:id="rId21"/>
   </p:sldIdLst>
   <p:sldSz cx="10058400" cy="7772400"/>
   <p:notesSz cx="6858000" cy="9144000"/>
@@ -27822,6 +27824,132 @@
 </p:sld>
 </file>
 
+<file path=ppt/slides/slide19.xml><?xml version="1.0" encoding="utf-8"?>
+<p:sld xmlns:a="http://schemas.openxmlformats.org/drawingml/2006/main" xmlns:r="http://schemas.openxmlformats.org/officeDocument/2006/relationships" xmlns:p="http://schemas.openxmlformats.org/presentationml/2006/main">
+  <p:cSld>
+    <p:spTree>
+      <p:nvGrpSpPr>
+        <p:cNvPr id="1" name=""/>
+        <p:cNvGrpSpPr/>
+        <p:nvPr/>
+      </p:nvGrpSpPr>
+      <p:grpSpPr>
+        <a:xfrm>
+          <a:off x="0" y="0"/>
+          <a:ext cx="0" cy="0"/>
+          <a:chOff x="0" y="0"/>
+          <a:chExt cx="0" cy="0"/>
+        </a:xfrm>
+      </p:grpSpPr>
+      <p:sp>
+        <p:nvSpPr>
+          <p:cNvPr id="2" name="TextBox 1">
+            <a:extLst>
+              <a:ext uri="{FF2B5EF4-FFF2-40B4-BE49-F238E27FC236}">
+                <a16:creationId xmlns:a16="http://schemas.microsoft.com/office/drawing/2014/main" id="{87C07FF8-CBD9-BE44-A19C-3A5A734DAEA8}"/>
+              </a:ext>
+            </a:extLst>
+          </p:cNvPr>
+          <p:cNvSpPr txBox="1"/>
+          <p:nvPr/>
+        </p:nvSpPr>
+        <p:spPr>
+          <a:xfrm>
+            <a:off x="873821" y="3083578"/>
+            <a:ext cx="8310768" cy="1095010"/>
+          </a:xfrm>
+          <a:prstGeom prst="rect">
+            <a:avLst/>
+          </a:prstGeom>
+          <a:noFill/>
+          <a:ln w="3175" cap="flat">
+            <a:noFill/>
+            <a:miter lim="400000"/>
+          </a:ln>
+          <a:effectLst/>
+        </p:spPr>
+        <p:style>
+          <a:lnRef idx="0">
+            <a:scrgbClr r="0" g="0" b="0"/>
+          </a:lnRef>
+          <a:fillRef idx="0">
+            <a:scrgbClr r="0" g="0" b="0"/>
+          </a:fillRef>
+          <a:effectRef idx="0">
+            <a:scrgbClr r="0" g="0" b="0"/>
+          </a:effectRef>
+          <a:fontRef idx="none"/>
+        </p:style>
+        <p:txBody>
+          <a:bodyPr rot="0" spcFirstLastPara="1" vertOverflow="overflow" horzOverflow="overflow" vert="horz" wrap="none" lIns="39290" tIns="39290" rIns="39290" bIns="39290" numCol="1" spcCol="38100" rtlCol="0" anchor="ctr">
+            <a:spAutoFit/>
+          </a:bodyPr>
+          <a:lstStyle/>
+          <a:p>
+            <a:pPr marL="0" marR="0" indent="0" algn="ctr" defTabSz="584200" rtl="0" fontAlgn="auto" latinLnBrk="1" hangingPunct="0">
+              <a:lnSpc>
+                <a:spcPct val="100000"/>
+              </a:lnSpc>
+              <a:spcBef>
+                <a:spcPts val="0"/>
+              </a:spcBef>
+              <a:spcAft>
+                <a:spcPts val="0"/>
+              </a:spcAft>
+              <a:buClrTx/>
+              <a:buSzTx/>
+              <a:buFontTx/>
+              <a:buNone/>
+              <a:tabLst/>
+            </a:pPr>
+            <a:r>
+              <a:rPr kumimoji="0" lang="de-DE" sz="6600" b="0" i="0" u="none" strike="noStrike" cap="none" spc="0" normalizeH="0" baseline="0">
+                <a:ln>
+                  <a:noFill/>
+                </a:ln>
+                <a:solidFill>
+                  <a:srgbClr val="000000"/>
+                </a:solidFill>
+                <a:effectLst/>
+                <a:uFillTx/>
+                <a:latin typeface="+mn-lt"/>
+                <a:ea typeface="+mn-ea"/>
+                <a:cs typeface="+mn-cs"/>
+                <a:sym typeface="Helvetica Light"/>
+              </a:rPr>
+              <a:t>SCORES IN DOCKER</a:t>
+            </a:r>
+            <a:endParaRPr kumimoji="0" lang="de-DE" sz="6600" b="0" i="0" u="none" strike="noStrike" cap="none" spc="0" normalizeH="0" baseline="0" dirty="0">
+              <a:ln>
+                <a:noFill/>
+              </a:ln>
+              <a:solidFill>
+                <a:srgbClr val="000000"/>
+              </a:solidFill>
+              <a:effectLst/>
+              <a:uFillTx/>
+              <a:latin typeface="+mn-lt"/>
+              <a:ea typeface="+mn-ea"/>
+              <a:cs typeface="+mn-cs"/>
+              <a:sym typeface="Helvetica Light"/>
+            </a:endParaRPr>
+          </a:p>
+        </p:txBody>
+      </p:sp>
+    </p:spTree>
+    <p:extLst>
+      <p:ext uri="{BB962C8B-B14F-4D97-AF65-F5344CB8AC3E}">
+        <p14:creationId xmlns:p14="http://schemas.microsoft.com/office/powerpoint/2010/main" val="4227854398"/>
+      </p:ext>
+    </p:extLst>
+  </p:cSld>
+  <p:clrMapOvr>
+    <a:masterClrMapping/>
+  </p:clrMapOvr>
+  <p:transition spd="med"/>
+</p:sld>
+</file>
+
 <file path=ppt/slides/slide2.xml><?xml version="1.0" encoding="utf-8"?>
 <p:sld xmlns:a="http://schemas.openxmlformats.org/drawingml/2006/main" xmlns:r="http://schemas.openxmlformats.org/officeDocument/2006/relationships" xmlns:p="http://schemas.openxmlformats.org/presentationml/2006/main">
   <p:cSld>
@@ -31099,6 +31227,695 @@
     <p:extLst>
       <p:ext uri="{BB962C8B-B14F-4D97-AF65-F5344CB8AC3E}">
         <p14:creationId xmlns:p14="http://schemas.microsoft.com/office/powerpoint/2010/main" val="3786448451"/>
+      </p:ext>
+    </p:extLst>
+  </p:cSld>
+  <p:clrMapOvr>
+    <a:masterClrMapping/>
+  </p:clrMapOvr>
+  <p:transition spd="med"/>
+</p:sld>
+</file>
+
+<file path=ppt/slides/slide20.xml><?xml version="1.0" encoding="utf-8"?>
+<p:sld xmlns:a="http://schemas.openxmlformats.org/drawingml/2006/main" xmlns:r="http://schemas.openxmlformats.org/officeDocument/2006/relationships" xmlns:p="http://schemas.openxmlformats.org/presentationml/2006/main">
+  <p:cSld>
+    <p:spTree>
+      <p:nvGrpSpPr>
+        <p:cNvPr id="1" name=""/>
+        <p:cNvGrpSpPr/>
+        <p:nvPr/>
+      </p:nvGrpSpPr>
+      <p:grpSpPr>
+        <a:xfrm>
+          <a:off x="0" y="0"/>
+          <a:ext cx="0" cy="0"/>
+          <a:chOff x="0" y="0"/>
+          <a:chExt cx="0" cy="0"/>
+        </a:xfrm>
+      </p:grpSpPr>
+      <p:sp>
+        <p:nvSpPr>
+          <p:cNvPr id="2" name="Rectangle 1">
+            <a:extLst>
+              <a:ext uri="{FF2B5EF4-FFF2-40B4-BE49-F238E27FC236}">
+                <a16:creationId xmlns:a16="http://schemas.microsoft.com/office/drawing/2014/main" id="{E4818AEB-5614-D543-ACD2-FAA9711F7DEE}"/>
+              </a:ext>
+            </a:extLst>
+          </p:cNvPr>
+          <p:cNvSpPr/>
+          <p:nvPr/>
+        </p:nvSpPr>
+        <p:spPr>
+          <a:xfrm>
+            <a:off x="1892177" y="2443499"/>
+            <a:ext cx="4590104" cy="2019860"/>
+          </a:xfrm>
+          <a:prstGeom prst="rect">
+            <a:avLst/>
+          </a:prstGeom>
+          <a:solidFill>
+            <a:srgbClr val="FFFFFF">
+              <a:alpha val="33000"/>
+            </a:srgbClr>
+          </a:solidFill>
+          <a:ln w="25400">
+            <a:solidFill>
+              <a:srgbClr val="4277BB"/>
+            </a:solidFill>
+            <a:miter lim="400000"/>
+          </a:ln>
+          <a:scene3d>
+            <a:camera prst="orthographicFront"/>
+            <a:lightRig rig="threePt" dir="t"/>
+          </a:scene3d>
+          <a:sp3d>
+            <a:bevelT w="133350" h="146050" prst="angle"/>
+          </a:sp3d>
+        </p:spPr>
+        <p:txBody>
+          <a:bodyPr lIns="0" tIns="0" rIns="0" bIns="0" rtlCol="0" anchor="ctr"/>
+          <a:lstStyle/>
+          <a:p>
+            <a:pPr algn="ctr"/>
+            <a:endParaRPr lang="de-DE" sz="1800">
+              <a:solidFill>
+                <a:srgbClr val="4277BB"/>
+              </a:solidFill>
+            </a:endParaRPr>
+          </a:p>
+        </p:txBody>
+      </p:sp>
+      <p:sp>
+        <p:nvSpPr>
+          <p:cNvPr id="3" name="Rectangle 2">
+            <a:extLst>
+              <a:ext uri="{FF2B5EF4-FFF2-40B4-BE49-F238E27FC236}">
+                <a16:creationId xmlns:a16="http://schemas.microsoft.com/office/drawing/2014/main" id="{83448774-E58B-5B40-91AE-6D2462D1D60D}"/>
+              </a:ext>
+            </a:extLst>
+          </p:cNvPr>
+          <p:cNvSpPr/>
+          <p:nvPr/>
+        </p:nvSpPr>
+        <p:spPr>
+          <a:xfrm>
+            <a:off x="2346431" y="2735140"/>
+            <a:ext cx="1461051" cy="1427487"/>
+          </a:xfrm>
+          <a:prstGeom prst="rect">
+            <a:avLst/>
+          </a:prstGeom>
+          <a:solidFill>
+            <a:schemeClr val="bg1"/>
+          </a:solidFill>
+          <a:ln w="25400">
+            <a:solidFill>
+              <a:srgbClr val="4277BB"/>
+            </a:solidFill>
+            <a:miter lim="400000"/>
+          </a:ln>
+        </p:spPr>
+        <p:txBody>
+          <a:bodyPr lIns="0" tIns="0" rIns="0" bIns="0" rtlCol="0" anchor="ctr"/>
+          <a:lstStyle/>
+          <a:p>
+            <a:pPr algn="ctr"/>
+            <a:endParaRPr lang="de-DE" sz="1800">
+              <a:solidFill>
+                <a:srgbClr val="4277BB"/>
+              </a:solidFill>
+            </a:endParaRPr>
+          </a:p>
+        </p:txBody>
+      </p:sp>
+      <p:sp>
+        <p:nvSpPr>
+          <p:cNvPr id="7" name="Shape 547">
+            <a:extLst>
+              <a:ext uri="{FF2B5EF4-FFF2-40B4-BE49-F238E27FC236}">
+                <a16:creationId xmlns:a16="http://schemas.microsoft.com/office/drawing/2014/main" id="{A84D3468-43D7-2B45-9576-127780443C39}"/>
+              </a:ext>
+            </a:extLst>
+          </p:cNvPr>
+          <p:cNvSpPr/>
+          <p:nvPr/>
+        </p:nvSpPr>
+        <p:spPr>
+          <a:xfrm>
+            <a:off x="4485555" y="2925134"/>
+            <a:ext cx="1407437" cy="184666"/>
+          </a:xfrm>
+          <a:prstGeom prst="rect">
+            <a:avLst/>
+          </a:prstGeom>
+          <a:ln w="3175">
+            <a:miter lim="400000"/>
+          </a:ln>
+          <a:extLst>
+            <a:ext uri="{C572A759-6A51-4108-AA02-DFA0A04FC94B}">
+              <ma14:wrappingTextBoxFlag xmlns:ma14="http://schemas.microsoft.com/office/mac/drawingml/2011/main" xmlns="" val="1"/>
+            </a:ext>
+          </a:extLst>
+        </p:spPr>
+        <p:txBody>
+          <a:bodyPr wrap="none" lIns="0" tIns="0" rIns="0" bIns="0">
+            <a:spAutoFit/>
+          </a:bodyPr>
+          <a:lstStyle>
+            <a:lvl1pPr>
+              <a:defRPr sz="900" b="1">
+                <a:latin typeface="Helvetica"/>
+                <a:ea typeface="Helvetica"/>
+                <a:cs typeface="Helvetica"/>
+                <a:sym typeface="Helvetica"/>
+              </a:defRPr>
+            </a:lvl1pPr>
+          </a:lstStyle>
+          <a:p>
+            <a:pPr lvl="0">
+              <a:defRPr sz="1800" b="0"/>
+            </a:pPr>
+            <a:r>
+              <a:rPr lang="en-US" sz="1200" b="0">
+                <a:latin typeface="Arial"/>
+                <a:cs typeface="Arial"/>
+              </a:rPr>
+              <a:t>Scores Core Service</a:t>
+            </a:r>
+          </a:p>
+        </p:txBody>
+      </p:sp>
+      <p:pic>
+        <p:nvPicPr>
+          <p:cNvPr id="9" name="Picture 8">
+            <a:extLst>
+              <a:ext uri="{FF2B5EF4-FFF2-40B4-BE49-F238E27FC236}">
+                <a16:creationId xmlns:a16="http://schemas.microsoft.com/office/drawing/2014/main" id="{AD9008AB-5948-3242-BDA2-08EF35F28222}"/>
+              </a:ext>
+            </a:extLst>
+          </p:cNvPr>
+          <p:cNvPicPr>
+            <a:picLocks noChangeAspect="1"/>
+          </p:cNvPicPr>
+          <p:nvPr/>
+        </p:nvPicPr>
+        <p:blipFill>
+          <a:blip r:embed="rId2"/>
+          <a:stretch>
+            <a:fillRect/>
+          </a:stretch>
+        </p:blipFill>
+        <p:spPr>
+          <a:xfrm>
+            <a:off x="7382155" y="2925134"/>
+            <a:ext cx="697633" cy="697633"/>
+          </a:xfrm>
+          <a:prstGeom prst="rect">
+            <a:avLst/>
+          </a:prstGeom>
+        </p:spPr>
+      </p:pic>
+      <p:sp>
+        <p:nvSpPr>
+          <p:cNvPr id="10" name="TextBox 9">
+            <a:extLst>
+              <a:ext uri="{FF2B5EF4-FFF2-40B4-BE49-F238E27FC236}">
+                <a16:creationId xmlns:a16="http://schemas.microsoft.com/office/drawing/2014/main" id="{A41299AB-026F-484F-AD49-382B5102AB5E}"/>
+              </a:ext>
+            </a:extLst>
+          </p:cNvPr>
+          <p:cNvSpPr txBox="1"/>
+          <p:nvPr/>
+        </p:nvSpPr>
+        <p:spPr>
+          <a:xfrm>
+            <a:off x="7117010" y="3694385"/>
+            <a:ext cx="1218324" cy="264013"/>
+          </a:xfrm>
+          <a:prstGeom prst="rect">
+            <a:avLst/>
+          </a:prstGeom>
+          <a:noFill/>
+          <a:ln w="3175" cap="flat">
+            <a:noFill/>
+            <a:miter lim="400000"/>
+          </a:ln>
+          <a:effectLst/>
+        </p:spPr>
+        <p:style>
+          <a:lnRef idx="0">
+            <a:scrgbClr r="0" g="0" b="0"/>
+          </a:lnRef>
+          <a:fillRef idx="0">
+            <a:scrgbClr r="0" g="0" b="0"/>
+          </a:fillRef>
+          <a:effectRef idx="0">
+            <a:scrgbClr r="0" g="0" b="0"/>
+          </a:effectRef>
+          <a:fontRef idx="none"/>
+        </p:style>
+        <p:txBody>
+          <a:bodyPr rot="0" spcFirstLastPara="1" vertOverflow="overflow" horzOverflow="overflow" vert="horz" wrap="square" lIns="39290" tIns="39290" rIns="39290" bIns="39290" numCol="1" spcCol="38100" rtlCol="0" anchor="ctr">
+            <a:spAutoFit/>
+          </a:bodyPr>
+          <a:lstStyle/>
+          <a:p>
+            <a:pPr marL="0" marR="0" indent="0" defTabSz="584200" rtl="0" fontAlgn="auto" latinLnBrk="1" hangingPunct="0">
+              <a:lnSpc>
+                <a:spcPct val="100000"/>
+              </a:lnSpc>
+              <a:spcBef>
+                <a:spcPts val="0"/>
+              </a:spcBef>
+              <a:spcAft>
+                <a:spcPts val="0"/>
+              </a:spcAft>
+              <a:buClrTx/>
+              <a:buSzTx/>
+              <a:buFontTx/>
+              <a:buNone/>
+              <a:tabLst/>
+            </a:pPr>
+            <a:r>
+              <a:rPr kumimoji="0" lang="en-US" sz="1200" b="0" i="0" u="none" strike="noStrike" cap="none" spc="0" normalizeH="0" baseline="0" dirty="0">
+                <a:ln>
+                  <a:noFill/>
+                </a:ln>
+                <a:solidFill>
+                  <a:srgbClr val="000000"/>
+                </a:solidFill>
+                <a:effectLst/>
+                <a:uFillTx/>
+                <a:latin typeface="Arial"/>
+                <a:ea typeface="+mn-ea"/>
+                <a:cs typeface="Arial"/>
+                <a:sym typeface="Helvetica Light"/>
+              </a:rPr>
+              <a:t>Cloudant</a:t>
+            </a:r>
+          </a:p>
+        </p:txBody>
+      </p:sp>
+      <p:cxnSp>
+        <p:nvCxnSpPr>
+          <p:cNvPr id="11" name="Straight Connector 10">
+            <a:extLst>
+              <a:ext uri="{FF2B5EF4-FFF2-40B4-BE49-F238E27FC236}">
+                <a16:creationId xmlns:a16="http://schemas.microsoft.com/office/drawing/2014/main" id="{6479DAB5-96D0-8240-B001-67D9EC5AFE1A}"/>
+              </a:ext>
+            </a:extLst>
+          </p:cNvPr>
+          <p:cNvCxnSpPr>
+            <a:cxnSpLocks/>
+          </p:cNvCxnSpPr>
+          <p:nvPr/>
+        </p:nvCxnSpPr>
+        <p:spPr>
+          <a:xfrm>
+            <a:off x="5762395" y="3361252"/>
+            <a:ext cx="1498484" cy="1"/>
+          </a:xfrm>
+          <a:prstGeom prst="line">
+            <a:avLst/>
+          </a:prstGeom>
+          <a:noFill/>
+          <a:ln w="34925" cap="flat">
+            <a:solidFill>
+              <a:schemeClr val="bg1">
+                <a:lumMod val="85000"/>
+              </a:schemeClr>
+            </a:solidFill>
+            <a:prstDash val="solid"/>
+            <a:miter lim="400000"/>
+          </a:ln>
+          <a:effectLst/>
+        </p:spPr>
+        <p:style>
+          <a:lnRef idx="0">
+            <a:scrgbClr r="0" g="0" b="0"/>
+          </a:lnRef>
+          <a:fillRef idx="0">
+            <a:scrgbClr r="0" g="0" b="0"/>
+          </a:fillRef>
+          <a:effectRef idx="0">
+            <a:scrgbClr r="0" g="0" b="0"/>
+          </a:effectRef>
+          <a:fontRef idx="none"/>
+        </p:style>
+      </p:cxnSp>
+      <p:sp>
+        <p:nvSpPr>
+          <p:cNvPr id="12" name="TextBox 11">
+            <a:extLst>
+              <a:ext uri="{FF2B5EF4-FFF2-40B4-BE49-F238E27FC236}">
+                <a16:creationId xmlns:a16="http://schemas.microsoft.com/office/drawing/2014/main" id="{09C8459E-2F2C-BC43-A791-514600CB744B}"/>
+              </a:ext>
+            </a:extLst>
+          </p:cNvPr>
+          <p:cNvSpPr txBox="1"/>
+          <p:nvPr/>
+        </p:nvSpPr>
+        <p:spPr>
+          <a:xfrm>
+            <a:off x="4410614" y="1909871"/>
+            <a:ext cx="1557317" cy="264013"/>
+          </a:xfrm>
+          <a:prstGeom prst="rect">
+            <a:avLst/>
+          </a:prstGeom>
+          <a:noFill/>
+          <a:ln w="3175" cap="flat">
+            <a:noFill/>
+            <a:miter lim="400000"/>
+          </a:ln>
+          <a:effectLst/>
+        </p:spPr>
+        <p:style>
+          <a:lnRef idx="0">
+            <a:scrgbClr r="0" g="0" b="0"/>
+          </a:lnRef>
+          <a:fillRef idx="0">
+            <a:scrgbClr r="0" g="0" b="0"/>
+          </a:fillRef>
+          <a:effectRef idx="0">
+            <a:scrgbClr r="0" g="0" b="0"/>
+          </a:effectRef>
+          <a:fontRef idx="none"/>
+        </p:style>
+        <p:txBody>
+          <a:bodyPr rot="0" spcFirstLastPara="1" vertOverflow="overflow" horzOverflow="overflow" vert="horz" wrap="square" lIns="39290" tIns="39290" rIns="39290" bIns="39290" numCol="1" spcCol="38100" rtlCol="0" anchor="ctr">
+            <a:spAutoFit/>
+          </a:bodyPr>
+          <a:lstStyle>
+            <a:lvl1pPr marL="0" marR="0" indent="0" rtl="0" fontAlgn="auto" latinLnBrk="1" hangingPunct="0">
+              <a:lnSpc>
+                <a:spcPct val="100000"/>
+              </a:lnSpc>
+              <a:spcBef>
+                <a:spcPts val="0"/>
+              </a:spcBef>
+              <a:spcAft>
+                <a:spcPts val="0"/>
+              </a:spcAft>
+              <a:buClrTx/>
+              <a:buSzTx/>
+              <a:buFontTx/>
+              <a:buNone/>
+              <a:tabLst/>
+              <a:defRPr kumimoji="0" sz="1400" b="1" i="0" u="none" strike="noStrike" cap="none" spc="0" normalizeH="0" baseline="0">
+                <a:ln>
+                  <a:noFill/>
+                </a:ln>
+                <a:solidFill>
+                  <a:srgbClr val="000000"/>
+                </a:solidFill>
+                <a:effectLst/>
+                <a:uFillTx/>
+                <a:latin typeface="Arial"/>
+                <a:cs typeface="Arial"/>
+              </a:defRPr>
+            </a:lvl1pPr>
+          </a:lstStyle>
+          <a:p>
+            <a:r>
+              <a:rPr lang="en-US" dirty="0"/>
+              <a:t>Scores Service</a:t>
+            </a:r>
+          </a:p>
+        </p:txBody>
+      </p:sp>
+      <p:pic>
+        <p:nvPicPr>
+          <p:cNvPr id="13" name="Picture 12">
+            <a:extLst>
+              <a:ext uri="{FF2B5EF4-FFF2-40B4-BE49-F238E27FC236}">
+                <a16:creationId xmlns:a16="http://schemas.microsoft.com/office/drawing/2014/main" id="{F92B54F2-A200-F44C-803F-99FF87911870}"/>
+              </a:ext>
+            </a:extLst>
+          </p:cNvPr>
+          <p:cNvPicPr>
+            <a:picLocks noChangeAspect="1"/>
+          </p:cNvPicPr>
+          <p:nvPr/>
+        </p:nvPicPr>
+        <p:blipFill>
+          <a:blip r:embed="rId3">
+            <a:extLst>
+              <a:ext uri="{28A0092B-C50C-407E-A947-70E740481C1C}">
+                <a14:useLocalDpi xmlns:a14="http://schemas.microsoft.com/office/drawing/2010/main" val="0"/>
+              </a:ext>
+            </a:extLst>
+          </a:blip>
+          <a:stretch>
+            <a:fillRect/>
+          </a:stretch>
+        </p:blipFill>
+        <p:spPr>
+          <a:xfrm>
+            <a:off x="2533377" y="2749688"/>
+            <a:ext cx="990895" cy="990895"/>
+          </a:xfrm>
+          <a:prstGeom prst="rect">
+            <a:avLst/>
+          </a:prstGeom>
+        </p:spPr>
+      </p:pic>
+      <p:cxnSp>
+        <p:nvCxnSpPr>
+          <p:cNvPr id="14" name="Straight Connector 13">
+            <a:extLst>
+              <a:ext uri="{FF2B5EF4-FFF2-40B4-BE49-F238E27FC236}">
+                <a16:creationId xmlns:a16="http://schemas.microsoft.com/office/drawing/2014/main" id="{C1D88E78-3F4D-1746-BA47-AB89ED25DF7C}"/>
+              </a:ext>
+            </a:extLst>
+          </p:cNvPr>
+          <p:cNvCxnSpPr>
+            <a:cxnSpLocks/>
+            <a:stCxn id="17" idx="1"/>
+          </p:cNvCxnSpPr>
+          <p:nvPr/>
+        </p:nvCxnSpPr>
+        <p:spPr>
+          <a:xfrm flipH="1">
+            <a:off x="3855614" y="3361252"/>
+            <a:ext cx="887967" cy="0"/>
+          </a:xfrm>
+          <a:prstGeom prst="line">
+            <a:avLst/>
+          </a:prstGeom>
+          <a:noFill/>
+          <a:ln w="34925" cap="flat">
+            <a:solidFill>
+              <a:schemeClr val="bg1">
+                <a:lumMod val="85000"/>
+              </a:schemeClr>
+            </a:solidFill>
+            <a:prstDash val="solid"/>
+            <a:miter lim="400000"/>
+          </a:ln>
+          <a:effectLst/>
+        </p:spPr>
+        <p:style>
+          <a:lnRef idx="0">
+            <a:scrgbClr r="0" g="0" b="0"/>
+          </a:lnRef>
+          <a:fillRef idx="0">
+            <a:scrgbClr r="0" g="0" b="0"/>
+          </a:fillRef>
+          <a:effectRef idx="0">
+            <a:scrgbClr r="0" g="0" b="0"/>
+          </a:effectRef>
+          <a:fontRef idx="none"/>
+        </p:style>
+      </p:cxnSp>
+      <p:sp>
+        <p:nvSpPr>
+          <p:cNvPr id="15" name="TextBox 14">
+            <a:extLst>
+              <a:ext uri="{FF2B5EF4-FFF2-40B4-BE49-F238E27FC236}">
+                <a16:creationId xmlns:a16="http://schemas.microsoft.com/office/drawing/2014/main" id="{919C2E5C-AB08-8B49-9C06-8B9735F8C13F}"/>
+              </a:ext>
+            </a:extLst>
+          </p:cNvPr>
+          <p:cNvSpPr txBox="1"/>
+          <p:nvPr/>
+        </p:nvSpPr>
+        <p:spPr>
+          <a:xfrm>
+            <a:off x="2250165" y="3843430"/>
+            <a:ext cx="1557317" cy="264013"/>
+          </a:xfrm>
+          <a:prstGeom prst="rect">
+            <a:avLst/>
+          </a:prstGeom>
+          <a:noFill/>
+          <a:ln w="3175" cap="flat">
+            <a:noFill/>
+            <a:miter lim="400000"/>
+          </a:ln>
+          <a:effectLst/>
+        </p:spPr>
+        <p:style>
+          <a:lnRef idx="0">
+            <a:scrgbClr r="0" g="0" b="0"/>
+          </a:lnRef>
+          <a:fillRef idx="0">
+            <a:scrgbClr r="0" g="0" b="0"/>
+          </a:fillRef>
+          <a:effectRef idx="0">
+            <a:scrgbClr r="0" g="0" b="0"/>
+          </a:effectRef>
+          <a:fontRef idx="none"/>
+        </p:style>
+        <p:txBody>
+          <a:bodyPr rot="0" spcFirstLastPara="1" vertOverflow="overflow" horzOverflow="overflow" vert="horz" wrap="square" lIns="39290" tIns="39290" rIns="39290" bIns="39290" numCol="1" spcCol="38100" rtlCol="0" anchor="ctr">
+            <a:spAutoFit/>
+          </a:bodyPr>
+          <a:lstStyle>
+            <a:lvl1pPr marL="0" marR="0" indent="0" rtl="0" fontAlgn="auto" latinLnBrk="1" hangingPunct="0">
+              <a:lnSpc>
+                <a:spcPct val="100000"/>
+              </a:lnSpc>
+              <a:spcBef>
+                <a:spcPts val="0"/>
+              </a:spcBef>
+              <a:spcAft>
+                <a:spcPts val="0"/>
+              </a:spcAft>
+              <a:buClrTx/>
+              <a:buSzTx/>
+              <a:buFontTx/>
+              <a:buNone/>
+              <a:tabLst/>
+              <a:defRPr kumimoji="0" sz="1200" i="0" u="none" strike="noStrike" cap="none" spc="0" normalizeH="0" baseline="0">
+                <a:ln>
+                  <a:noFill/>
+                </a:ln>
+                <a:solidFill>
+                  <a:srgbClr val="000000"/>
+                </a:solidFill>
+                <a:effectLst/>
+                <a:uFillTx/>
+                <a:latin typeface="Arial"/>
+                <a:cs typeface="Arial"/>
+              </a:defRPr>
+            </a:lvl1pPr>
+          </a:lstStyle>
+          <a:p>
+            <a:r>
+              <a:rPr lang="en-US" dirty="0"/>
+              <a:t>Scores Service UI</a:t>
+            </a:r>
+          </a:p>
+        </p:txBody>
+      </p:sp>
+      <p:pic>
+        <p:nvPicPr>
+          <p:cNvPr id="17" name="Picture 16">
+            <a:extLst>
+              <a:ext uri="{FF2B5EF4-FFF2-40B4-BE49-F238E27FC236}">
+                <a16:creationId xmlns:a16="http://schemas.microsoft.com/office/drawing/2014/main" id="{48CD3CFA-9665-4E4D-B1EC-4F4D048A3483}"/>
+              </a:ext>
+            </a:extLst>
+          </p:cNvPr>
+          <p:cNvPicPr>
+            <a:picLocks noChangeAspect="1"/>
+          </p:cNvPicPr>
+          <p:nvPr/>
+        </p:nvPicPr>
+        <p:blipFill>
+          <a:blip r:embed="rId4">
+            <a:extLst>
+              <a:ext uri="{28A0092B-C50C-407E-A947-70E740481C1C}">
+                <a14:useLocalDpi xmlns:a14="http://schemas.microsoft.com/office/drawing/2010/main" val="0"/>
+              </a:ext>
+            </a:extLst>
+          </a:blip>
+          <a:stretch>
+            <a:fillRect/>
+          </a:stretch>
+        </p:blipFill>
+        <p:spPr>
+          <a:xfrm>
+            <a:off x="4743581" y="3088225"/>
+            <a:ext cx="891387" cy="546053"/>
+          </a:xfrm>
+          <a:prstGeom prst="rect">
+            <a:avLst/>
+          </a:prstGeom>
+        </p:spPr>
+      </p:pic>
+      <p:pic>
+        <p:nvPicPr>
+          <p:cNvPr id="19" name="Picture 18">
+            <a:extLst>
+              <a:ext uri="{FF2B5EF4-FFF2-40B4-BE49-F238E27FC236}">
+                <a16:creationId xmlns:a16="http://schemas.microsoft.com/office/drawing/2014/main" id="{B0499EF2-B9C9-2945-8399-58BBCF695032}"/>
+              </a:ext>
+            </a:extLst>
+          </p:cNvPr>
+          <p:cNvPicPr>
+            <a:picLocks noChangeAspect="1"/>
+          </p:cNvPicPr>
+          <p:nvPr/>
+        </p:nvPicPr>
+        <p:blipFill>
+          <a:blip r:embed="rId5">
+            <a:extLst>
+              <a:ext uri="{28A0092B-C50C-407E-A947-70E740481C1C}">
+                <a14:useLocalDpi xmlns:a14="http://schemas.microsoft.com/office/drawing/2010/main" val="0"/>
+              </a:ext>
+            </a:extLst>
+          </a:blip>
+          <a:stretch>
+            <a:fillRect/>
+          </a:stretch>
+        </p:blipFill>
+        <p:spPr>
+          <a:xfrm>
+            <a:off x="1607515" y="1972690"/>
+            <a:ext cx="877730" cy="877730"/>
+          </a:xfrm>
+          <a:prstGeom prst="rect">
+            <a:avLst/>
+          </a:prstGeom>
+        </p:spPr>
+      </p:pic>
+      <p:pic>
+        <p:nvPicPr>
+          <p:cNvPr id="25" name="Picture 24">
+            <a:extLst>
+              <a:ext uri="{FF2B5EF4-FFF2-40B4-BE49-F238E27FC236}">
+                <a16:creationId xmlns:a16="http://schemas.microsoft.com/office/drawing/2014/main" id="{BB0CC76B-580A-634D-947C-190CDEDF38BB}"/>
+              </a:ext>
+            </a:extLst>
+          </p:cNvPr>
+          <p:cNvPicPr>
+            <a:picLocks noChangeAspect="1"/>
+          </p:cNvPicPr>
+          <p:nvPr/>
+        </p:nvPicPr>
+        <p:blipFill>
+          <a:blip r:embed="rId6"/>
+          <a:stretch>
+            <a:fillRect/>
+          </a:stretch>
+        </p:blipFill>
+        <p:spPr>
+          <a:xfrm>
+            <a:off x="7176885" y="1761063"/>
+            <a:ext cx="1098574" cy="996165"/>
+          </a:xfrm>
+          <a:prstGeom prst="rect">
+            <a:avLst/>
+          </a:prstGeom>
+        </p:spPr>
+      </p:pic>
+    </p:spTree>
+    <p:extLst>
+      <p:ext uri="{BB962C8B-B14F-4D97-AF65-F5344CB8AC3E}">
+        <p14:creationId xmlns:p14="http://schemas.microsoft.com/office/powerpoint/2010/main" val="4292059357"/>
       </p:ext>
     </p:extLst>
   </p:cSld>

</xml_diff>